<commit_message>
MakeVersionInfo: a couple minor changes
</commit_message>
<xml_diff>
--- a/MakeVersionInfo/MakeVersionInfo.pptx
+++ b/MakeVersionInfo/MakeVersionInfo.pptx
@@ -3347,7 +3347,7 @@
           <a:p>
             <a:fld id="{857CC94D-E614-4874-A919-F25B27309A09}" type="datetimeFigureOut">
               <a:rPr lang="en-CA" smtClean="0"/>
-              <a:t>2024-08-15</a:t>
+              <a:t>2024-08-17</a:t>
             </a:fld>
             <a:endParaRPr lang="en-CA"/>
           </a:p>
@@ -6750,7 +6750,7 @@
           <a:noFill/>
           <a:extLst>
             <a:ext uri="{909E8E84-426E-40dd-AFC4-6F175D3DCCD1}">
-              <a14:hiddenFill xmlns="" xmlns:a14="http://schemas.microsoft.com/office/drawing/2010/main">
+              <a14:hiddenFill xmlns:a14="http://schemas.microsoft.com/office/drawing/2010/main" xmlns="">
                 <a:solidFill>
                   <a:srgbClr val="FFFFFF"/>
                 </a:solidFill>
@@ -6816,7 +6816,7 @@
             </a:ln>
             <a:extLst>
               <a:ext uri="{91240B29-F687-4f45-9708-019B960494DF}">
-                <a14:hiddenLine xmlns="" xmlns:a14="http://schemas.microsoft.com/office/drawing/2010/main" w="9525">
+                <a14:hiddenLine xmlns:a14="http://schemas.microsoft.com/office/drawing/2010/main" xmlns="" w="9525">
                   <a:solidFill>
                     <a:srgbClr val="000000"/>
                   </a:solidFill>
@@ -6906,7 +6906,7 @@
             </a:ln>
             <a:extLst>
               <a:ext uri="{91240B29-F687-4f45-9708-019B960494DF}">
-                <a14:hiddenLine xmlns="" xmlns:a14="http://schemas.microsoft.com/office/drawing/2010/main" w="9525">
+                <a14:hiddenLine xmlns:a14="http://schemas.microsoft.com/office/drawing/2010/main" xmlns="" w="9525">
                   <a:solidFill>
                     <a:srgbClr val="000000"/>
                   </a:solidFill>
@@ -6996,7 +6996,7 @@
             </a:ln>
             <a:extLst>
               <a:ext uri="{91240B29-F687-4f45-9708-019B960494DF}">
-                <a14:hiddenLine xmlns="" xmlns:a14="http://schemas.microsoft.com/office/drawing/2010/main" w="9525">
+                <a14:hiddenLine xmlns:a14="http://schemas.microsoft.com/office/drawing/2010/main" xmlns="" w="9525">
                   <a:solidFill>
                     <a:srgbClr val="000000"/>
                   </a:solidFill>
@@ -7030,7 +7030,7 @@
             </a:ln>
             <a:extLst>
               <a:ext uri="{91240B29-F687-4f45-9708-019B960494DF}">
-                <a14:hiddenLine xmlns="" xmlns:a14="http://schemas.microsoft.com/office/drawing/2010/main" w="9525">
+                <a14:hiddenLine xmlns:a14="http://schemas.microsoft.com/office/drawing/2010/main" xmlns="" w="9525">
                   <a:solidFill>
                     <a:srgbClr val="000000"/>
                   </a:solidFill>
@@ -7120,7 +7120,7 @@
             </a:ln>
             <a:extLst>
               <a:ext uri="{91240B29-F687-4f45-9708-019B960494DF}">
-                <a14:hiddenLine xmlns="" xmlns:a14="http://schemas.microsoft.com/office/drawing/2010/main" w="9525">
+                <a14:hiddenLine xmlns:a14="http://schemas.microsoft.com/office/drawing/2010/main" xmlns="" w="9525">
                   <a:solidFill>
                     <a:srgbClr val="000000"/>
                   </a:solidFill>
@@ -7182,7 +7182,7 @@
             </a:ln>
             <a:extLst>
               <a:ext uri="{91240B29-F687-4f45-9708-019B960494DF}">
-                <a14:hiddenLine xmlns="" xmlns:a14="http://schemas.microsoft.com/office/drawing/2010/main" w="9525">
+                <a14:hiddenLine xmlns:a14="http://schemas.microsoft.com/office/drawing/2010/main" xmlns="" w="9525">
                   <a:solidFill>
                     <a:srgbClr val="000000"/>
                   </a:solidFill>
@@ -7244,7 +7244,7 @@
             </a:ln>
             <a:extLst>
               <a:ext uri="{91240B29-F687-4f45-9708-019B960494DF}">
-                <a14:hiddenLine xmlns="" xmlns:a14="http://schemas.microsoft.com/office/drawing/2010/main" w="9525">
+                <a14:hiddenLine xmlns:a14="http://schemas.microsoft.com/office/drawing/2010/main" xmlns="" w="9525">
                   <a:solidFill>
                     <a:srgbClr val="000000"/>
                   </a:solidFill>
@@ -7334,7 +7334,7 @@
             </a:ln>
             <a:extLst>
               <a:ext uri="{91240B29-F687-4f45-9708-019B960494DF}">
-                <a14:hiddenLine xmlns="" xmlns:a14="http://schemas.microsoft.com/office/drawing/2010/main" w="9525">
+                <a14:hiddenLine xmlns:a14="http://schemas.microsoft.com/office/drawing/2010/main" xmlns="" w="9525">
                   <a:solidFill>
                     <a:srgbClr val="000000"/>
                   </a:solidFill>
@@ -7396,7 +7396,7 @@
             </a:ln>
             <a:extLst>
               <a:ext uri="{91240B29-F687-4f45-9708-019B960494DF}">
-                <a14:hiddenLine xmlns="" xmlns:a14="http://schemas.microsoft.com/office/drawing/2010/main" w="9525">
+                <a14:hiddenLine xmlns:a14="http://schemas.microsoft.com/office/drawing/2010/main" xmlns="" w="9525">
                   <a:solidFill>
                     <a:srgbClr val="000000"/>
                   </a:solidFill>
@@ -7458,7 +7458,7 @@
             </a:ln>
             <a:extLst>
               <a:ext uri="{91240B29-F687-4f45-9708-019B960494DF}">
-                <a14:hiddenLine xmlns="" xmlns:a14="http://schemas.microsoft.com/office/drawing/2010/main" w="9525">
+                <a14:hiddenLine xmlns:a14="http://schemas.microsoft.com/office/drawing/2010/main" xmlns="" w="9525">
                   <a:solidFill>
                     <a:srgbClr val="000000"/>
                   </a:solidFill>
@@ -7548,7 +7548,7 @@
             </a:ln>
             <a:extLst>
               <a:ext uri="{91240B29-F687-4f45-9708-019B960494DF}">
-                <a14:hiddenLine xmlns="" xmlns:a14="http://schemas.microsoft.com/office/drawing/2010/main" w="9525">
+                <a14:hiddenLine xmlns:a14="http://schemas.microsoft.com/office/drawing/2010/main" xmlns="" w="9525">
                   <a:solidFill>
                     <a:srgbClr val="000000"/>
                   </a:solidFill>
@@ -7638,7 +7638,7 @@
             </a:ln>
             <a:extLst>
               <a:ext uri="{91240B29-F687-4f45-9708-019B960494DF}">
-                <a14:hiddenLine xmlns="" xmlns:a14="http://schemas.microsoft.com/office/drawing/2010/main" w="9525">
+                <a14:hiddenLine xmlns:a14="http://schemas.microsoft.com/office/drawing/2010/main" xmlns="" w="9525">
                   <a:solidFill>
                     <a:srgbClr val="000000"/>
                   </a:solidFill>
@@ -7700,7 +7700,7 @@
             </a:ln>
             <a:extLst>
               <a:ext uri="{91240B29-F687-4f45-9708-019B960494DF}">
-                <a14:hiddenLine xmlns="" xmlns:a14="http://schemas.microsoft.com/office/drawing/2010/main" w="9525">
+                <a14:hiddenLine xmlns:a14="http://schemas.microsoft.com/office/drawing/2010/main" xmlns="" w="9525">
                   <a:solidFill>
                     <a:srgbClr val="000000"/>
                   </a:solidFill>
@@ -7810,7 +7810,7 @@
             </a:ln>
             <a:extLst>
               <a:ext uri="{91240B29-F687-4f45-9708-019B960494DF}">
-                <a14:hiddenLine xmlns="" xmlns:a14="http://schemas.microsoft.com/office/drawing/2010/main" w="9525">
+                <a14:hiddenLine xmlns:a14="http://schemas.microsoft.com/office/drawing/2010/main" xmlns="" w="9525">
                   <a:solidFill>
                     <a:srgbClr val="000000"/>
                   </a:solidFill>
@@ -7872,7 +7872,7 @@
             </a:ln>
             <a:extLst>
               <a:ext uri="{91240B29-F687-4f45-9708-019B960494DF}">
-                <a14:hiddenLine xmlns="" xmlns:a14="http://schemas.microsoft.com/office/drawing/2010/main" w="9525">
+                <a14:hiddenLine xmlns:a14="http://schemas.microsoft.com/office/drawing/2010/main" xmlns="" w="9525">
                   <a:solidFill>
                     <a:srgbClr val="000000"/>
                   </a:solidFill>
@@ -7962,7 +7962,7 @@
             </a:ln>
             <a:extLst>
               <a:ext uri="{91240B29-F687-4f45-9708-019B960494DF}">
-                <a14:hiddenLine xmlns="" xmlns:a14="http://schemas.microsoft.com/office/drawing/2010/main" w="9525">
+                <a14:hiddenLine xmlns:a14="http://schemas.microsoft.com/office/drawing/2010/main" xmlns="" w="9525">
                   <a:solidFill>
                     <a:srgbClr val="000000"/>
                   </a:solidFill>
@@ -8052,7 +8052,7 @@
             </a:ln>
             <a:extLst>
               <a:ext uri="{91240B29-F687-4f45-9708-019B960494DF}">
-                <a14:hiddenLine xmlns="" xmlns:a14="http://schemas.microsoft.com/office/drawing/2010/main" w="9525">
+                <a14:hiddenLine xmlns:a14="http://schemas.microsoft.com/office/drawing/2010/main" xmlns="" w="9525">
                   <a:solidFill>
                     <a:srgbClr val="000000"/>
                   </a:solidFill>
@@ -8114,7 +8114,7 @@
             </a:ln>
             <a:extLst>
               <a:ext uri="{91240B29-F687-4f45-9708-019B960494DF}">
-                <a14:hiddenLine xmlns="" xmlns:a14="http://schemas.microsoft.com/office/drawing/2010/main" w="9525">
+                <a14:hiddenLine xmlns:a14="http://schemas.microsoft.com/office/drawing/2010/main" xmlns="" w="9525">
                   <a:solidFill>
                     <a:srgbClr val="000000"/>
                   </a:solidFill>
@@ -8204,7 +8204,7 @@
             </a:ln>
             <a:extLst>
               <a:ext uri="{91240B29-F687-4f45-9708-019B960494DF}">
-                <a14:hiddenLine xmlns="" xmlns:a14="http://schemas.microsoft.com/office/drawing/2010/main" w="9525">
+                <a14:hiddenLine xmlns:a14="http://schemas.microsoft.com/office/drawing/2010/main" xmlns="" w="9525">
                   <a:solidFill>
                     <a:srgbClr val="000000"/>
                   </a:solidFill>
@@ -8294,7 +8294,7 @@
             </a:ln>
             <a:extLst>
               <a:ext uri="{91240B29-F687-4f45-9708-019B960494DF}">
-                <a14:hiddenLine xmlns="" xmlns:a14="http://schemas.microsoft.com/office/drawing/2010/main" w="9525">
+                <a14:hiddenLine xmlns:a14="http://schemas.microsoft.com/office/drawing/2010/main" xmlns="" w="9525">
                   <a:solidFill>
                     <a:srgbClr val="000000"/>
                   </a:solidFill>
@@ -8350,7 +8350,7 @@
             </a:ln>
             <a:extLst>
               <a:ext uri="{91240B29-F687-4f45-9708-019B960494DF}">
-                <a14:hiddenLine xmlns="" xmlns:a14="http://schemas.microsoft.com/office/drawing/2010/main" w="9525">
+                <a14:hiddenLine xmlns:a14="http://schemas.microsoft.com/office/drawing/2010/main" xmlns="" w="9525">
                   <a:solidFill>
                     <a:srgbClr val="000000"/>
                   </a:solidFill>
@@ -8440,7 +8440,7 @@
             </a:ln>
             <a:extLst>
               <a:ext uri="{91240B29-F687-4f45-9708-019B960494DF}">
-                <a14:hiddenLine xmlns="" xmlns:a14="http://schemas.microsoft.com/office/drawing/2010/main" w="9525">
+                <a14:hiddenLine xmlns:a14="http://schemas.microsoft.com/office/drawing/2010/main" xmlns="" w="9525">
                   <a:solidFill>
                     <a:srgbClr val="000000"/>
                   </a:solidFill>
@@ -8496,7 +8496,7 @@
             </a:ln>
             <a:extLst>
               <a:ext uri="{91240B29-F687-4f45-9708-019B960494DF}">
-                <a14:hiddenLine xmlns="" xmlns:a14="http://schemas.microsoft.com/office/drawing/2010/main" w="9525">
+                <a14:hiddenLine xmlns:a14="http://schemas.microsoft.com/office/drawing/2010/main" xmlns="" w="9525">
                   <a:solidFill>
                     <a:srgbClr val="000000"/>
                   </a:solidFill>
@@ -8586,7 +8586,7 @@
             </a:ln>
             <a:extLst>
               <a:ext uri="{91240B29-F687-4f45-9708-019B960494DF}">
-                <a14:hiddenLine xmlns="" xmlns:a14="http://schemas.microsoft.com/office/drawing/2010/main" w="9525">
+                <a14:hiddenLine xmlns:a14="http://schemas.microsoft.com/office/drawing/2010/main" xmlns="" w="9525">
                   <a:solidFill>
                     <a:srgbClr val="000000"/>
                   </a:solidFill>
@@ -8654,7 +8654,7 @@
             </a:ln>
             <a:extLst>
               <a:ext uri="{91240B29-F687-4f45-9708-019B960494DF}">
-                <a14:hiddenLine xmlns="" xmlns:a14="http://schemas.microsoft.com/office/drawing/2010/main" w="9525">
+                <a14:hiddenLine xmlns:a14="http://schemas.microsoft.com/office/drawing/2010/main" xmlns="" w="9525">
                   <a:solidFill>
                     <a:srgbClr val="000000"/>
                   </a:solidFill>
@@ -8744,7 +8744,7 @@
             </a:ln>
             <a:extLst>
               <a:ext uri="{91240B29-F687-4f45-9708-019B960494DF}">
-                <a14:hiddenLine xmlns="" xmlns:a14="http://schemas.microsoft.com/office/drawing/2010/main" w="9525">
+                <a14:hiddenLine xmlns:a14="http://schemas.microsoft.com/office/drawing/2010/main" xmlns="" w="9525">
                   <a:solidFill>
                     <a:srgbClr val="000000"/>
                   </a:solidFill>
@@ -8812,7 +8812,7 @@
             </a:ln>
             <a:extLst>
               <a:ext uri="{91240B29-F687-4f45-9708-019B960494DF}">
-                <a14:hiddenLine xmlns="" xmlns:a14="http://schemas.microsoft.com/office/drawing/2010/main" w="9525">
+                <a14:hiddenLine xmlns:a14="http://schemas.microsoft.com/office/drawing/2010/main" xmlns="" w="9525">
                   <a:solidFill>
                     <a:srgbClr val="000000"/>
                   </a:solidFill>
@@ -8902,7 +8902,7 @@
             </a:ln>
             <a:extLst>
               <a:ext uri="{91240B29-F687-4f45-9708-019B960494DF}">
-                <a14:hiddenLine xmlns="" xmlns:a14="http://schemas.microsoft.com/office/drawing/2010/main" w="9525">
+                <a14:hiddenLine xmlns:a14="http://schemas.microsoft.com/office/drawing/2010/main" xmlns="" w="9525">
                   <a:solidFill>
                     <a:srgbClr val="000000"/>
                   </a:solidFill>
@@ -8936,7 +8936,7 @@
             </a:ln>
             <a:extLst>
               <a:ext uri="{91240B29-F687-4f45-9708-019B960494DF}">
-                <a14:hiddenLine xmlns="" xmlns:a14="http://schemas.microsoft.com/office/drawing/2010/main" w="9525">
+                <a14:hiddenLine xmlns:a14="http://schemas.microsoft.com/office/drawing/2010/main" xmlns="" w="9525">
                   <a:solidFill>
                     <a:srgbClr val="000000"/>
                   </a:solidFill>
@@ -9026,7 +9026,7 @@
             </a:ln>
             <a:extLst>
               <a:ext uri="{91240B29-F687-4f45-9708-019B960494DF}">
-                <a14:hiddenLine xmlns="" xmlns:a14="http://schemas.microsoft.com/office/drawing/2010/main" w="9525">
+                <a14:hiddenLine xmlns:a14="http://schemas.microsoft.com/office/drawing/2010/main" xmlns="" w="9525">
                   <a:solidFill>
                     <a:srgbClr val="000000"/>
                   </a:solidFill>
@@ -9088,7 +9088,7 @@
             </a:ln>
             <a:extLst>
               <a:ext uri="{91240B29-F687-4f45-9708-019B960494DF}">
-                <a14:hiddenLine xmlns="" xmlns:a14="http://schemas.microsoft.com/office/drawing/2010/main" w="9525">
+                <a14:hiddenLine xmlns:a14="http://schemas.microsoft.com/office/drawing/2010/main" xmlns="" w="9525">
                   <a:solidFill>
                     <a:srgbClr val="000000"/>
                   </a:solidFill>
@@ -9150,7 +9150,7 @@
             </a:ln>
             <a:extLst>
               <a:ext uri="{91240B29-F687-4f45-9708-019B960494DF}">
-                <a14:hiddenLine xmlns="" xmlns:a14="http://schemas.microsoft.com/office/drawing/2010/main" w="9525">
+                <a14:hiddenLine xmlns:a14="http://schemas.microsoft.com/office/drawing/2010/main" xmlns="" w="9525">
                   <a:solidFill>
                     <a:srgbClr val="000000"/>
                   </a:solidFill>
@@ -9240,7 +9240,7 @@
             </a:ln>
             <a:extLst>
               <a:ext uri="{91240B29-F687-4f45-9708-019B960494DF}">
-                <a14:hiddenLine xmlns="" xmlns:a14="http://schemas.microsoft.com/office/drawing/2010/main" w="9525">
+                <a14:hiddenLine xmlns:a14="http://schemas.microsoft.com/office/drawing/2010/main" xmlns="" w="9525">
                   <a:solidFill>
                     <a:srgbClr val="000000"/>
                   </a:solidFill>
@@ -9308,7 +9308,7 @@
             </a:ln>
             <a:extLst>
               <a:ext uri="{91240B29-F687-4f45-9708-019B960494DF}">
-                <a14:hiddenLine xmlns="" xmlns:a14="http://schemas.microsoft.com/office/drawing/2010/main" w="9525">
+                <a14:hiddenLine xmlns:a14="http://schemas.microsoft.com/office/drawing/2010/main" xmlns="" w="9525">
                   <a:solidFill>
                     <a:srgbClr val="000000"/>
                   </a:solidFill>
@@ -9370,7 +9370,7 @@
             </a:ln>
             <a:extLst>
               <a:ext uri="{91240B29-F687-4f45-9708-019B960494DF}">
-                <a14:hiddenLine xmlns="" xmlns:a14="http://schemas.microsoft.com/office/drawing/2010/main" w="9525">
+                <a14:hiddenLine xmlns:a14="http://schemas.microsoft.com/office/drawing/2010/main" xmlns="" w="9525">
                   <a:solidFill>
                     <a:srgbClr val="000000"/>
                   </a:solidFill>
@@ -9460,7 +9460,7 @@
             </a:ln>
             <a:extLst>
               <a:ext uri="{91240B29-F687-4f45-9708-019B960494DF}">
-                <a14:hiddenLine xmlns="" xmlns:a14="http://schemas.microsoft.com/office/drawing/2010/main" w="9525">
+                <a14:hiddenLine xmlns:a14="http://schemas.microsoft.com/office/drawing/2010/main" xmlns="" w="9525">
                   <a:solidFill>
                     <a:srgbClr val="000000"/>
                   </a:solidFill>
@@ -9522,7 +9522,7 @@
             </a:ln>
             <a:extLst>
               <a:ext uri="{91240B29-F687-4f45-9708-019B960494DF}">
-                <a14:hiddenLine xmlns="" xmlns:a14="http://schemas.microsoft.com/office/drawing/2010/main" w="9525">
+                <a14:hiddenLine xmlns:a14="http://schemas.microsoft.com/office/drawing/2010/main" xmlns="" w="9525">
                   <a:solidFill>
                     <a:srgbClr val="000000"/>
                   </a:solidFill>
@@ -9612,7 +9612,7 @@
             </a:ln>
             <a:extLst>
               <a:ext uri="{91240B29-F687-4f45-9708-019B960494DF}">
-                <a14:hiddenLine xmlns="" xmlns:a14="http://schemas.microsoft.com/office/drawing/2010/main" w="9525">
+                <a14:hiddenLine xmlns:a14="http://schemas.microsoft.com/office/drawing/2010/main" xmlns="" w="9525">
                   <a:solidFill>
                     <a:srgbClr val="000000"/>
                   </a:solidFill>
@@ -9674,7 +9674,7 @@
             </a:ln>
             <a:extLst>
               <a:ext uri="{91240B29-F687-4f45-9708-019B960494DF}">
-                <a14:hiddenLine xmlns="" xmlns:a14="http://schemas.microsoft.com/office/drawing/2010/main" w="9525">
+                <a14:hiddenLine xmlns:a14="http://schemas.microsoft.com/office/drawing/2010/main" xmlns="" w="9525">
                   <a:solidFill>
                     <a:srgbClr val="000000"/>
                   </a:solidFill>
@@ -9764,7 +9764,7 @@
             </a:ln>
             <a:extLst>
               <a:ext uri="{91240B29-F687-4f45-9708-019B960494DF}">
-                <a14:hiddenLine xmlns="" xmlns:a14="http://schemas.microsoft.com/office/drawing/2010/main" w="9525">
+                <a14:hiddenLine xmlns:a14="http://schemas.microsoft.com/office/drawing/2010/main" xmlns="" w="9525">
                   <a:solidFill>
                     <a:srgbClr val="000000"/>
                   </a:solidFill>
@@ -9798,7 +9798,7 @@
             </a:ln>
             <a:extLst>
               <a:ext uri="{91240B29-F687-4f45-9708-019B960494DF}">
-                <a14:hiddenLine xmlns="" xmlns:a14="http://schemas.microsoft.com/office/drawing/2010/main" w="9525">
+                <a14:hiddenLine xmlns:a14="http://schemas.microsoft.com/office/drawing/2010/main" xmlns="" w="9525">
                   <a:solidFill>
                     <a:srgbClr val="000000"/>
                   </a:solidFill>
@@ -9863,7 +9863,7 @@
             </a:ln>
             <a:extLst>
               <a:ext uri="{91240B29-F687-4f45-9708-019B960494DF}">
-                <a14:hiddenLine xmlns="" xmlns:a14="http://schemas.microsoft.com/office/drawing/2010/main" w="9525">
+                <a14:hiddenLine xmlns:a14="http://schemas.microsoft.com/office/drawing/2010/main" xmlns="" w="9525">
                   <a:solidFill>
                     <a:srgbClr val="000000"/>
                   </a:solidFill>
@@ -9953,7 +9953,7 @@
             </a:ln>
             <a:extLst>
               <a:ext uri="{91240B29-F687-4f45-9708-019B960494DF}">
-                <a14:hiddenLine xmlns="" xmlns:a14="http://schemas.microsoft.com/office/drawing/2010/main" w="9525">
+                <a14:hiddenLine xmlns:a14="http://schemas.microsoft.com/office/drawing/2010/main" xmlns="" w="9525">
                   <a:solidFill>
                     <a:srgbClr val="000000"/>
                   </a:solidFill>
@@ -10015,7 +10015,7 @@
             </a:ln>
             <a:extLst>
               <a:ext uri="{91240B29-F687-4f45-9708-019B960494DF}">
-                <a14:hiddenLine xmlns="" xmlns:a14="http://schemas.microsoft.com/office/drawing/2010/main" w="9525">
+                <a14:hiddenLine xmlns:a14="http://schemas.microsoft.com/office/drawing/2010/main" xmlns="" w="9525">
                   <a:solidFill>
                     <a:srgbClr val="000000"/>
                   </a:solidFill>
@@ -10105,7 +10105,7 @@
             </a:ln>
             <a:extLst>
               <a:ext uri="{91240B29-F687-4f45-9708-019B960494DF}">
-                <a14:hiddenLine xmlns="" xmlns:a14="http://schemas.microsoft.com/office/drawing/2010/main" w="9525">
+                <a14:hiddenLine xmlns:a14="http://schemas.microsoft.com/office/drawing/2010/main" xmlns="" w="9525">
                   <a:solidFill>
                     <a:srgbClr val="000000"/>
                   </a:solidFill>
@@ -10195,7 +10195,7 @@
             </a:ln>
             <a:extLst>
               <a:ext uri="{91240B29-F687-4f45-9708-019B960494DF}">
-                <a14:hiddenLine xmlns="" xmlns:a14="http://schemas.microsoft.com/office/drawing/2010/main" w="9525">
+                <a14:hiddenLine xmlns:a14="http://schemas.microsoft.com/office/drawing/2010/main" xmlns="" w="9525">
                   <a:solidFill>
                     <a:srgbClr val="000000"/>
                   </a:solidFill>
@@ -10260,7 +10260,7 @@
             </a:ln>
             <a:extLst>
               <a:ext uri="{91240B29-F687-4f45-9708-019B960494DF}">
-                <a14:hiddenLine xmlns="" xmlns:a14="http://schemas.microsoft.com/office/drawing/2010/main" w="9525">
+                <a14:hiddenLine xmlns:a14="http://schemas.microsoft.com/office/drawing/2010/main" xmlns="" w="9525">
                   <a:solidFill>
                     <a:srgbClr val="000000"/>
                   </a:solidFill>
@@ -10322,7 +10322,7 @@
             </a:ln>
             <a:extLst>
               <a:ext uri="{91240B29-F687-4f45-9708-019B960494DF}">
-                <a14:hiddenLine xmlns="" xmlns:a14="http://schemas.microsoft.com/office/drawing/2010/main" w="9525">
+                <a14:hiddenLine xmlns:a14="http://schemas.microsoft.com/office/drawing/2010/main" xmlns="" w="9525">
                   <a:solidFill>
                     <a:srgbClr val="000000"/>
                   </a:solidFill>
@@ -10412,7 +10412,7 @@
             </a:ln>
             <a:extLst>
               <a:ext uri="{91240B29-F687-4f45-9708-019B960494DF}">
-                <a14:hiddenLine xmlns="" xmlns:a14="http://schemas.microsoft.com/office/drawing/2010/main" w="9525">
+                <a14:hiddenLine xmlns:a14="http://schemas.microsoft.com/office/drawing/2010/main" xmlns="" w="9525">
                   <a:solidFill>
                     <a:srgbClr val="000000"/>
                   </a:solidFill>
@@ -10502,7 +10502,7 @@
             </a:ln>
             <a:extLst>
               <a:ext uri="{91240B29-F687-4f45-9708-019B960494DF}">
-                <a14:hiddenLine xmlns="" xmlns:a14="http://schemas.microsoft.com/office/drawing/2010/main" w="9525">
+                <a14:hiddenLine xmlns:a14="http://schemas.microsoft.com/office/drawing/2010/main" xmlns="" w="9525">
                   <a:solidFill>
                     <a:srgbClr val="000000"/>
                   </a:solidFill>
@@ -10564,7 +10564,7 @@
             </a:ln>
             <a:extLst>
               <a:ext uri="{91240B29-F687-4f45-9708-019B960494DF}">
-                <a14:hiddenLine xmlns="" xmlns:a14="http://schemas.microsoft.com/office/drawing/2010/main" w="9525">
+                <a14:hiddenLine xmlns:a14="http://schemas.microsoft.com/office/drawing/2010/main" xmlns="" w="9525">
                   <a:solidFill>
                     <a:srgbClr val="000000"/>
                   </a:solidFill>
@@ -10684,7 +10684,7 @@
             </a:ln>
             <a:extLst>
               <a:ext uri="{91240B29-F687-4f45-9708-019B960494DF}">
-                <a14:hiddenLine xmlns="" xmlns:a14="http://schemas.microsoft.com/office/drawing/2010/main" w="9525">
+                <a14:hiddenLine xmlns:a14="http://schemas.microsoft.com/office/drawing/2010/main" xmlns="" w="9525">
                   <a:solidFill>
                     <a:srgbClr val="000000"/>
                   </a:solidFill>
@@ -10752,7 +10752,7 @@
             </a:ln>
             <a:extLst>
               <a:ext uri="{91240B29-F687-4f45-9708-019B960494DF}">
-                <a14:hiddenLine xmlns="" xmlns:a14="http://schemas.microsoft.com/office/drawing/2010/main" w="9525">
+                <a14:hiddenLine xmlns:a14="http://schemas.microsoft.com/office/drawing/2010/main" xmlns="" w="9525">
                   <a:solidFill>
                     <a:srgbClr val="000000"/>
                   </a:solidFill>
@@ -10842,7 +10842,7 @@
             </a:ln>
             <a:extLst>
               <a:ext uri="{91240B29-F687-4f45-9708-019B960494DF}">
-                <a14:hiddenLine xmlns="" xmlns:a14="http://schemas.microsoft.com/office/drawing/2010/main" w="9525">
+                <a14:hiddenLine xmlns:a14="http://schemas.microsoft.com/office/drawing/2010/main" xmlns="" w="9525">
                   <a:solidFill>
                     <a:srgbClr val="000000"/>
                   </a:solidFill>
@@ -16962,7 +16962,7 @@
           <a:noFill/>
           <a:extLst>
             <a:ext uri="{909E8E84-426E-40dd-AFC4-6F175D3DCCD1}">
-              <a14:hiddenFill xmlns="" xmlns:a14="http://schemas.microsoft.com/office/drawing/2010/main">
+              <a14:hiddenFill xmlns:a14="http://schemas.microsoft.com/office/drawing/2010/main" xmlns="">
                 <a:solidFill>
                   <a:srgbClr val="FFFFFF"/>
                 </a:solidFill>
@@ -17042,7 +17042,7 @@
               </a:ln>
               <a:extLst>
                 <a:ext uri="{91240B29-F687-4f45-9708-019B960494DF}">
-                  <a14:hiddenLine xmlns="" xmlns:a14="http://schemas.microsoft.com/office/drawing/2010/main" w="9525">
+                  <a14:hiddenLine xmlns:a14="http://schemas.microsoft.com/office/drawing/2010/main" xmlns="" w="9525">
                     <a:solidFill>
                       <a:srgbClr val="000000"/>
                     </a:solidFill>
@@ -17132,7 +17132,7 @@
               </a:ln>
               <a:extLst>
                 <a:ext uri="{91240B29-F687-4f45-9708-019B960494DF}">
-                  <a14:hiddenLine xmlns="" xmlns:a14="http://schemas.microsoft.com/office/drawing/2010/main" w="9525">
+                  <a14:hiddenLine xmlns:a14="http://schemas.microsoft.com/office/drawing/2010/main" xmlns="" w="9525">
                     <a:solidFill>
                       <a:srgbClr val="000000"/>
                     </a:solidFill>
@@ -17222,7 +17222,7 @@
               </a:ln>
               <a:extLst>
                 <a:ext uri="{91240B29-F687-4f45-9708-019B960494DF}">
-                  <a14:hiddenLine xmlns="" xmlns:a14="http://schemas.microsoft.com/office/drawing/2010/main" w="9525">
+                  <a14:hiddenLine xmlns:a14="http://schemas.microsoft.com/office/drawing/2010/main" xmlns="" w="9525">
                     <a:solidFill>
                       <a:srgbClr val="000000"/>
                     </a:solidFill>
@@ -17284,7 +17284,7 @@
               </a:ln>
               <a:extLst>
                 <a:ext uri="{91240B29-F687-4f45-9708-019B960494DF}">
-                  <a14:hiddenLine xmlns="" xmlns:a14="http://schemas.microsoft.com/office/drawing/2010/main" w="9525">
+                  <a14:hiddenLine xmlns:a14="http://schemas.microsoft.com/office/drawing/2010/main" xmlns="" w="9525">
                     <a:solidFill>
                       <a:srgbClr val="000000"/>
                     </a:solidFill>
@@ -17374,7 +17374,7 @@
               </a:ln>
               <a:extLst>
                 <a:ext uri="{91240B29-F687-4f45-9708-019B960494DF}">
-                  <a14:hiddenLine xmlns="" xmlns:a14="http://schemas.microsoft.com/office/drawing/2010/main" w="9525">
+                  <a14:hiddenLine xmlns:a14="http://schemas.microsoft.com/office/drawing/2010/main" xmlns="" w="9525">
                     <a:solidFill>
                       <a:srgbClr val="000000"/>
                     </a:solidFill>
@@ -17436,7 +17436,7 @@
               </a:ln>
               <a:extLst>
                 <a:ext uri="{91240B29-F687-4f45-9708-019B960494DF}">
-                  <a14:hiddenLine xmlns="" xmlns:a14="http://schemas.microsoft.com/office/drawing/2010/main" w="9525">
+                  <a14:hiddenLine xmlns:a14="http://schemas.microsoft.com/office/drawing/2010/main" xmlns="" w="9525">
                     <a:solidFill>
                       <a:srgbClr val="000000"/>
                     </a:solidFill>
@@ -17498,7 +17498,7 @@
               </a:ln>
               <a:extLst>
                 <a:ext uri="{91240B29-F687-4f45-9708-019B960494DF}">
-                  <a14:hiddenLine xmlns="" xmlns:a14="http://schemas.microsoft.com/office/drawing/2010/main" w="9525">
+                  <a14:hiddenLine xmlns:a14="http://schemas.microsoft.com/office/drawing/2010/main" xmlns="" w="9525">
                     <a:solidFill>
                       <a:srgbClr val="000000"/>
                     </a:solidFill>
@@ -17588,7 +17588,7 @@
               </a:ln>
               <a:extLst>
                 <a:ext uri="{91240B29-F687-4f45-9708-019B960494DF}">
-                  <a14:hiddenLine xmlns="" xmlns:a14="http://schemas.microsoft.com/office/drawing/2010/main" w="9525">
+                  <a14:hiddenLine xmlns:a14="http://schemas.microsoft.com/office/drawing/2010/main" xmlns="" w="9525">
                     <a:solidFill>
                       <a:srgbClr val="000000"/>
                     </a:solidFill>
@@ -17678,7 +17678,7 @@
               </a:ln>
               <a:extLst>
                 <a:ext uri="{91240B29-F687-4f45-9708-019B960494DF}">
-                  <a14:hiddenLine xmlns="" xmlns:a14="http://schemas.microsoft.com/office/drawing/2010/main" w="9525">
+                  <a14:hiddenLine xmlns:a14="http://schemas.microsoft.com/office/drawing/2010/main" xmlns="" w="9525">
                     <a:solidFill>
                       <a:srgbClr val="000000"/>
                     </a:solidFill>
@@ -17740,7 +17740,7 @@
               </a:ln>
               <a:extLst>
                 <a:ext uri="{91240B29-F687-4f45-9708-019B960494DF}">
-                  <a14:hiddenLine xmlns="" xmlns:a14="http://schemas.microsoft.com/office/drawing/2010/main" w="9525">
+                  <a14:hiddenLine xmlns:a14="http://schemas.microsoft.com/office/drawing/2010/main" xmlns="" w="9525">
                     <a:solidFill>
                       <a:srgbClr val="000000"/>
                     </a:solidFill>
@@ -17850,7 +17850,7 @@
               </a:ln>
               <a:extLst>
                 <a:ext uri="{91240B29-F687-4f45-9708-019B960494DF}">
-                  <a14:hiddenLine xmlns="" xmlns:a14="http://schemas.microsoft.com/office/drawing/2010/main" w="9525">
+                  <a14:hiddenLine xmlns:a14="http://schemas.microsoft.com/office/drawing/2010/main" xmlns="" w="9525">
                     <a:solidFill>
                       <a:srgbClr val="000000"/>
                     </a:solidFill>
@@ -17934,7 +17934,7 @@
               </a:ln>
               <a:extLst>
                 <a:ext uri="{91240B29-F687-4f45-9708-019B960494DF}">
-                  <a14:hiddenLine xmlns="" xmlns:a14="http://schemas.microsoft.com/office/drawing/2010/main" w="9525">
+                  <a14:hiddenLine xmlns:a14="http://schemas.microsoft.com/office/drawing/2010/main" xmlns="" w="9525">
                     <a:solidFill>
                       <a:srgbClr val="000000"/>
                     </a:solidFill>
@@ -17996,7 +17996,7 @@
               </a:ln>
               <a:extLst>
                 <a:ext uri="{91240B29-F687-4f45-9708-019B960494DF}">
-                  <a14:hiddenLine xmlns="" xmlns:a14="http://schemas.microsoft.com/office/drawing/2010/main" w="9525">
+                  <a14:hiddenLine xmlns:a14="http://schemas.microsoft.com/office/drawing/2010/main" xmlns="" w="9525">
                     <a:solidFill>
                       <a:srgbClr val="000000"/>
                     </a:solidFill>
@@ -18058,7 +18058,7 @@
               </a:ln>
               <a:extLst>
                 <a:ext uri="{91240B29-F687-4f45-9708-019B960494DF}">
-                  <a14:hiddenLine xmlns="" xmlns:a14="http://schemas.microsoft.com/office/drawing/2010/main" w="9525">
+                  <a14:hiddenLine xmlns:a14="http://schemas.microsoft.com/office/drawing/2010/main" xmlns="" w="9525">
                     <a:solidFill>
                       <a:srgbClr val="000000"/>
                     </a:solidFill>
@@ -18148,7 +18148,7 @@
               </a:ln>
               <a:extLst>
                 <a:ext uri="{91240B29-F687-4f45-9708-019B960494DF}">
-                  <a14:hiddenLine xmlns="" xmlns:a14="http://schemas.microsoft.com/office/drawing/2010/main" w="9525">
+                  <a14:hiddenLine xmlns:a14="http://schemas.microsoft.com/office/drawing/2010/main" xmlns="" w="9525">
                     <a:solidFill>
                       <a:srgbClr val="000000"/>
                     </a:solidFill>
@@ -18182,7 +18182,7 @@
               </a:ln>
               <a:extLst>
                 <a:ext uri="{91240B29-F687-4f45-9708-019B960494DF}">
-                  <a14:hiddenLine xmlns="" xmlns:a14="http://schemas.microsoft.com/office/drawing/2010/main" w="9525">
+                  <a14:hiddenLine xmlns:a14="http://schemas.microsoft.com/office/drawing/2010/main" xmlns="" w="9525">
                     <a:solidFill>
                       <a:srgbClr val="000000"/>
                     </a:solidFill>
@@ -18247,7 +18247,7 @@
               </a:ln>
               <a:extLst>
                 <a:ext uri="{91240B29-F687-4f45-9708-019B960494DF}">
-                  <a14:hiddenLine xmlns="" xmlns:a14="http://schemas.microsoft.com/office/drawing/2010/main" w="9525">
+                  <a14:hiddenLine xmlns:a14="http://schemas.microsoft.com/office/drawing/2010/main" xmlns="" w="9525">
                     <a:solidFill>
                       <a:srgbClr val="000000"/>
                     </a:solidFill>
@@ -18337,7 +18337,7 @@
               </a:ln>
               <a:extLst>
                 <a:ext uri="{91240B29-F687-4f45-9708-019B960494DF}">
-                  <a14:hiddenLine xmlns="" xmlns:a14="http://schemas.microsoft.com/office/drawing/2010/main" w="9525">
+                  <a14:hiddenLine xmlns:a14="http://schemas.microsoft.com/office/drawing/2010/main" xmlns="" w="9525">
                     <a:solidFill>
                       <a:srgbClr val="000000"/>
                     </a:solidFill>
@@ -18399,7 +18399,7 @@
               </a:ln>
               <a:extLst>
                 <a:ext uri="{91240B29-F687-4f45-9708-019B960494DF}">
-                  <a14:hiddenLine xmlns="" xmlns:a14="http://schemas.microsoft.com/office/drawing/2010/main" w="9525">
+                  <a14:hiddenLine xmlns:a14="http://schemas.microsoft.com/office/drawing/2010/main" xmlns="" w="9525">
                     <a:solidFill>
                       <a:srgbClr val="000000"/>
                     </a:solidFill>
@@ -18489,7 +18489,7 @@
               </a:ln>
               <a:extLst>
                 <a:ext uri="{91240B29-F687-4f45-9708-019B960494DF}">
-                  <a14:hiddenLine xmlns="" xmlns:a14="http://schemas.microsoft.com/office/drawing/2010/main" w="9525">
+                  <a14:hiddenLine xmlns:a14="http://schemas.microsoft.com/office/drawing/2010/main" xmlns="" w="9525">
                     <a:solidFill>
                       <a:srgbClr val="000000"/>
                     </a:solidFill>
@@ -18554,7 +18554,7 @@
               </a:ln>
               <a:extLst>
                 <a:ext uri="{91240B29-F687-4f45-9708-019B960494DF}">
-                  <a14:hiddenLine xmlns="" xmlns:a14="http://schemas.microsoft.com/office/drawing/2010/main" w="9525">
+                  <a14:hiddenLine xmlns:a14="http://schemas.microsoft.com/office/drawing/2010/main" xmlns="" w="9525">
                     <a:solidFill>
                       <a:srgbClr val="000000"/>
                     </a:solidFill>
@@ -18616,7 +18616,7 @@
               </a:ln>
               <a:extLst>
                 <a:ext uri="{91240B29-F687-4f45-9708-019B960494DF}">
-                  <a14:hiddenLine xmlns="" xmlns:a14="http://schemas.microsoft.com/office/drawing/2010/main" w="9525">
+                  <a14:hiddenLine xmlns:a14="http://schemas.microsoft.com/office/drawing/2010/main" xmlns="" w="9525">
                     <a:solidFill>
                       <a:srgbClr val="000000"/>
                     </a:solidFill>
@@ -18706,7 +18706,7 @@
               </a:ln>
               <a:extLst>
                 <a:ext uri="{91240B29-F687-4f45-9708-019B960494DF}">
-                  <a14:hiddenLine xmlns="" xmlns:a14="http://schemas.microsoft.com/office/drawing/2010/main" w="9525">
+                  <a14:hiddenLine xmlns:a14="http://schemas.microsoft.com/office/drawing/2010/main" xmlns="" w="9525">
                     <a:solidFill>
                       <a:srgbClr val="000000"/>
                     </a:solidFill>
@@ -18796,7 +18796,7 @@
               </a:ln>
               <a:extLst>
                 <a:ext uri="{91240B29-F687-4f45-9708-019B960494DF}">
-                  <a14:hiddenLine xmlns="" xmlns:a14="http://schemas.microsoft.com/office/drawing/2010/main" w="9525">
+                  <a14:hiddenLine xmlns:a14="http://schemas.microsoft.com/office/drawing/2010/main" xmlns="" w="9525">
                     <a:solidFill>
                       <a:srgbClr val="000000"/>
                     </a:solidFill>
@@ -18861,7 +18861,7 @@
               </a:ln>
               <a:extLst>
                 <a:ext uri="{91240B29-F687-4f45-9708-019B960494DF}">
-                  <a14:hiddenLine xmlns="" xmlns:a14="http://schemas.microsoft.com/office/drawing/2010/main" w="9525">
+                  <a14:hiddenLine xmlns:a14="http://schemas.microsoft.com/office/drawing/2010/main" xmlns="" w="9525">
                     <a:solidFill>
                       <a:srgbClr val="000000"/>
                     </a:solidFill>
@@ -18981,7 +18981,7 @@
               </a:ln>
               <a:extLst>
                 <a:ext uri="{91240B29-F687-4f45-9708-019B960494DF}">
-                  <a14:hiddenLine xmlns="" xmlns:a14="http://schemas.microsoft.com/office/drawing/2010/main" w="9525">
+                  <a14:hiddenLine xmlns:a14="http://schemas.microsoft.com/office/drawing/2010/main" xmlns="" w="9525">
                     <a:solidFill>
                       <a:srgbClr val="000000"/>
                     </a:solidFill>
@@ -19079,7 +19079,7 @@
               </a:ln>
               <a:extLst>
                 <a:ext uri="{91240B29-F687-4f45-9708-019B960494DF}">
-                  <a14:hiddenLine xmlns="" xmlns:a14="http://schemas.microsoft.com/office/drawing/2010/main" w="9525">
+                  <a14:hiddenLine xmlns:a14="http://schemas.microsoft.com/office/drawing/2010/main" xmlns="" w="9525">
                     <a:solidFill>
                       <a:srgbClr val="000000"/>
                     </a:solidFill>
@@ -19194,7 +19194,7 @@
               </a:ln>
               <a:extLst>
                 <a:ext uri="{91240B29-F687-4f45-9708-019B960494DF}">
-                  <a14:hiddenLine xmlns="" xmlns:a14="http://schemas.microsoft.com/office/drawing/2010/main" w="9525">
+                  <a14:hiddenLine xmlns:a14="http://schemas.microsoft.com/office/drawing/2010/main" xmlns="" w="9525">
                     <a:solidFill>
                       <a:srgbClr val="000000"/>
                     </a:solidFill>
@@ -19284,7 +19284,7 @@
               </a:ln>
               <a:extLst>
                 <a:ext uri="{91240B29-F687-4f45-9708-019B960494DF}">
-                  <a14:hiddenLine xmlns="" xmlns:a14="http://schemas.microsoft.com/office/drawing/2010/main" w="9525">
+                  <a14:hiddenLine xmlns:a14="http://schemas.microsoft.com/office/drawing/2010/main" xmlns="" w="9525">
                     <a:solidFill>
                       <a:srgbClr val="000000"/>
                     </a:solidFill>
@@ -19349,7 +19349,7 @@
               </a:ln>
               <a:extLst>
                 <a:ext uri="{91240B29-F687-4f45-9708-019B960494DF}">
-                  <a14:hiddenLine xmlns="" xmlns:a14="http://schemas.microsoft.com/office/drawing/2010/main" w="9525">
+                  <a14:hiddenLine xmlns:a14="http://schemas.microsoft.com/office/drawing/2010/main" xmlns="" w="9525">
                     <a:solidFill>
                       <a:srgbClr val="000000"/>
                     </a:solidFill>
@@ -19439,7 +19439,7 @@
               </a:ln>
               <a:extLst>
                 <a:ext uri="{91240B29-F687-4f45-9708-019B960494DF}">
-                  <a14:hiddenLine xmlns="" xmlns:a14="http://schemas.microsoft.com/office/drawing/2010/main" w="9525">
+                  <a14:hiddenLine xmlns:a14="http://schemas.microsoft.com/office/drawing/2010/main" xmlns="" w="9525">
                     <a:solidFill>
                       <a:srgbClr val="000000"/>
                     </a:solidFill>
@@ -19507,7 +19507,7 @@
               </a:ln>
               <a:extLst>
                 <a:ext uri="{91240B29-F687-4f45-9708-019B960494DF}">
-                  <a14:hiddenLine xmlns="" xmlns:a14="http://schemas.microsoft.com/office/drawing/2010/main" w="9525">
+                  <a14:hiddenLine xmlns:a14="http://schemas.microsoft.com/office/drawing/2010/main" xmlns="" w="9525">
                     <a:solidFill>
                       <a:srgbClr val="000000"/>
                     </a:solidFill>
@@ -19597,7 +19597,7 @@
               </a:ln>
               <a:extLst>
                 <a:ext uri="{91240B29-F687-4f45-9708-019B960494DF}">
-                  <a14:hiddenLine xmlns="" xmlns:a14="http://schemas.microsoft.com/office/drawing/2010/main" w="9525">
+                  <a14:hiddenLine xmlns:a14="http://schemas.microsoft.com/office/drawing/2010/main" xmlns="" w="9525">
                     <a:solidFill>
                       <a:srgbClr val="000000"/>
                     </a:solidFill>
@@ -19665,7 +19665,7 @@
               </a:ln>
               <a:extLst>
                 <a:ext uri="{91240B29-F687-4f45-9708-019B960494DF}">
-                  <a14:hiddenLine xmlns="" xmlns:a14="http://schemas.microsoft.com/office/drawing/2010/main" w="9525">
+                  <a14:hiddenLine xmlns:a14="http://schemas.microsoft.com/office/drawing/2010/main" xmlns="" w="9525">
                     <a:solidFill>
                       <a:srgbClr val="000000"/>
                     </a:solidFill>
@@ -19755,7 +19755,7 @@
               </a:ln>
               <a:extLst>
                 <a:ext uri="{91240B29-F687-4f45-9708-019B960494DF}">
-                  <a14:hiddenLine xmlns="" xmlns:a14="http://schemas.microsoft.com/office/drawing/2010/main" w="9525">
+                  <a14:hiddenLine xmlns:a14="http://schemas.microsoft.com/office/drawing/2010/main" xmlns="" w="9525">
                     <a:solidFill>
                       <a:srgbClr val="000000"/>
                     </a:solidFill>
@@ -19789,7 +19789,7 @@
               </a:ln>
               <a:extLst>
                 <a:ext uri="{91240B29-F687-4f45-9708-019B960494DF}">
-                  <a14:hiddenLine xmlns="" xmlns:a14="http://schemas.microsoft.com/office/drawing/2010/main" w="9525">
+                  <a14:hiddenLine xmlns:a14="http://schemas.microsoft.com/office/drawing/2010/main" xmlns="" w="9525">
                     <a:solidFill>
                       <a:srgbClr val="000000"/>
                     </a:solidFill>
@@ -23766,7 +23766,9 @@
           </a:xfrm>
         </p:spPr>
         <p:txBody>
-          <a:bodyPr/>
+          <a:bodyPr>
+            <a:normAutofit/>
+          </a:bodyPr>
           <a:lstStyle/>
           <a:p>
             <a:pPr lvl="0"/>
@@ -23799,8 +23801,20 @@
           <a:p>
             <a:pPr lvl="0"/>
             <a:r>
+              <a:rPr lang="en-US" dirty="0"/>
+              <a:t>For other projects I use VS Code</a:t>
+            </a:r>
+            <a:r>
               <a:rPr lang="en-CA" dirty="0"/>
-              <a:t>I also do this with VS Code / CMake projects (with a few changes)</a:t>
+              <a:t> </a:t>
+            </a:r>
+            <a:r>
+              <a:rPr lang="en-US" dirty="0"/>
+              <a:t>with make or CMake </a:t>
+            </a:r>
+            <a:r>
+              <a:rPr lang="en-CA" dirty="0"/>
+              <a:t>(with a few changes)</a:t>
             </a:r>
           </a:p>
           <a:p>
@@ -27937,6 +27951,78 @@
           </a:prstGeom>
         </p:spPr>
       </p:pic>
+      <p:pic>
+        <p:nvPicPr>
+          <p:cNvPr id="7" name="Picture 6">
+            <a:extLst>
+              <a:ext uri="{FF2B5EF4-FFF2-40B4-BE49-F238E27FC236}">
+                <a16:creationId xmlns:a16="http://schemas.microsoft.com/office/drawing/2014/main" id="{4B0CB636-7B1D-98CE-25CD-E3C4BFE10536}"/>
+              </a:ext>
+              <a:ext uri="{C183D7F6-B498-43B3-948B-1728B52AA6E4}">
+                <adec:decorative xmlns:adec="http://schemas.microsoft.com/office/drawing/2017/decorative" val="1"/>
+              </a:ext>
+            </a:extLst>
+          </p:cNvPr>
+          <p:cNvPicPr>
+            <a:picLocks noChangeAspect="1"/>
+          </p:cNvPicPr>
+          <p:nvPr/>
+        </p:nvPicPr>
+        <p:blipFill>
+          <a:blip r:embed="rId3"/>
+          <a:stretch>
+            <a:fillRect/>
+          </a:stretch>
+        </p:blipFill>
+        <p:spPr>
+          <a:xfrm rot="20974180">
+            <a:off x="2237077" y="2915326"/>
+            <a:ext cx="1313066" cy="567882"/>
+          </a:xfrm>
+          <a:prstGeom prst="rect">
+            <a:avLst/>
+          </a:prstGeom>
+        </p:spPr>
+      </p:pic>
+      <p:sp>
+        <p:nvSpPr>
+          <p:cNvPr id="8" name="TextBox 7">
+            <a:extLst>
+              <a:ext uri="{FF2B5EF4-FFF2-40B4-BE49-F238E27FC236}">
+                <a16:creationId xmlns:a16="http://schemas.microsoft.com/office/drawing/2014/main" id="{3C6A1AD9-7540-FCCE-8482-B2102539D68C}"/>
+              </a:ext>
+            </a:extLst>
+          </p:cNvPr>
+          <p:cNvSpPr txBox="1"/>
+          <p:nvPr/>
+        </p:nvSpPr>
+        <p:spPr>
+          <a:xfrm>
+            <a:off x="2429032" y="3307719"/>
+            <a:ext cx="809837" cy="369332"/>
+          </a:xfrm>
+          <a:prstGeom prst="rect">
+            <a:avLst/>
+          </a:prstGeom>
+          <a:noFill/>
+        </p:spPr>
+        <p:txBody>
+          <a:bodyPr wrap="none" rtlCol="0">
+            <a:spAutoFit/>
+          </a:bodyPr>
+          <a:lstStyle/>
+          <a:p>
+            <a:r>
+              <a:rPr lang="en-CA" dirty="0">
+                <a:solidFill>
+                  <a:schemeClr val="bg2"/>
+                </a:solidFill>
+              </a:rPr>
+              <a:t>commit</a:t>
+            </a:r>
+          </a:p>
+        </p:txBody>
+      </p:sp>
     </p:spTree>
     <p:extLst>
       <p:ext uri="{BB962C8B-B14F-4D97-AF65-F5344CB8AC3E}">
@@ -28386,7 +28472,7 @@
                                           </p:stCondLst>
                                         </p:cTn>
                                         <p:tgtEl>
-                                          <p:spTgt spid="14"/>
+                                          <p:spTgt spid="7"/>
                                         </p:tgtEl>
                                         <p:attrNameLst>
                                           <p:attrName>style.visibility</p:attrName>
@@ -28400,7 +28486,7 @@
                                       <p:cBhvr>
                                         <p:cTn id="36" dur="250"/>
                                         <p:tgtEl>
-                                          <p:spTgt spid="14"/>
+                                          <p:spTgt spid="7"/>
                                         </p:tgtEl>
                                       </p:cBhvr>
                                     </p:animEffect>
@@ -28410,7 +28496,7 @@
                                       <p:cBhvr override="childStyle">
                                         <p:cTn dur="1" fill="hold" display="0" masterRel="nextClick" afterEffect="1"/>
                                         <p:tgtEl>
-                                          <p:spTgt spid="14"/>
+                                          <p:spTgt spid="7"/>
                                         </p:tgtEl>
                                         <p:attrNameLst>
                                           <p:attrName>style.visibility</p:attrName>
@@ -28437,6 +28523,126 @@
                                           </p:stCondLst>
                                         </p:cTn>
                                         <p:tgtEl>
+                                          <p:spTgt spid="8"/>
+                                        </p:tgtEl>
+                                        <p:attrNameLst>
+                                          <p:attrName>style.visibility</p:attrName>
+                                        </p:attrNameLst>
+                                      </p:cBhvr>
+                                      <p:to>
+                                        <p:strVal val="visible"/>
+                                      </p:to>
+                                    </p:set>
+                                    <p:animEffect transition="in" filter="fade">
+                                      <p:cBhvr>
+                                        <p:cTn id="39" dur="250"/>
+                                        <p:tgtEl>
+                                          <p:spTgt spid="8"/>
+                                        </p:tgtEl>
+                                      </p:cBhvr>
+                                    </p:animEffect>
+                                  </p:childTnLst>
+                                  <p:subTnLst>
+                                    <p:set>
+                                      <p:cBhvr override="childStyle">
+                                        <p:cTn dur="1" fill="hold" display="0" masterRel="nextClick" afterEffect="1"/>
+                                        <p:tgtEl>
+                                          <p:spTgt spid="8"/>
+                                        </p:tgtEl>
+                                        <p:attrNameLst>
+                                          <p:attrName>style.visibility</p:attrName>
+                                        </p:attrNameLst>
+                                      </p:cBhvr>
+                                      <p:to>
+                                        <p:strVal val="hidden"/>
+                                      </p:to>
+                                    </p:set>
+                                  </p:subTnLst>
+                                </p:cTn>
+                              </p:par>
+                            </p:childTnLst>
+                          </p:cTn>
+                        </p:par>
+                      </p:childTnLst>
+                    </p:cTn>
+                  </p:par>
+                  <p:par>
+                    <p:cTn id="40" fill="hold">
+                      <p:stCondLst>
+                        <p:cond delay="indefinite"/>
+                      </p:stCondLst>
+                      <p:childTnLst>
+                        <p:par>
+                          <p:cTn id="41" fill="hold">
+                            <p:stCondLst>
+                              <p:cond delay="0"/>
+                            </p:stCondLst>
+                            <p:childTnLst>
+                              <p:par>
+                                <p:cTn id="42" presetID="10" presetClass="entr" presetSubtype="0" fill="hold" nodeType="clickEffect">
+                                  <p:stCondLst>
+                                    <p:cond delay="0"/>
+                                  </p:stCondLst>
+                                  <p:childTnLst>
+                                    <p:set>
+                                      <p:cBhvr>
+                                        <p:cTn id="43" dur="1" fill="hold">
+                                          <p:stCondLst>
+                                            <p:cond delay="0"/>
+                                          </p:stCondLst>
+                                        </p:cTn>
+                                        <p:tgtEl>
+                                          <p:spTgt spid="14"/>
+                                        </p:tgtEl>
+                                        <p:attrNameLst>
+                                          <p:attrName>style.visibility</p:attrName>
+                                        </p:attrNameLst>
+                                      </p:cBhvr>
+                                      <p:to>
+                                        <p:strVal val="visible"/>
+                                      </p:to>
+                                    </p:set>
+                                    <p:animEffect transition="in" filter="fade">
+                                      <p:cBhvr>
+                                        <p:cTn id="44" dur="250"/>
+                                        <p:tgtEl>
+                                          <p:spTgt spid="14"/>
+                                        </p:tgtEl>
+                                      </p:cBhvr>
+                                    </p:animEffect>
+                                  </p:childTnLst>
+                                  <p:subTnLst>
+                                    <p:set>
+                                      <p:cBhvr override="childStyle">
+                                        <p:cTn dur="1" fill="hold" display="0" masterRel="nextClick" afterEffect="1"/>
+                                        <p:tgtEl>
+                                          <p:spTgt spid="14"/>
+                                        </p:tgtEl>
+                                        <p:attrNameLst>
+                                          <p:attrName>style.visibility</p:attrName>
+                                        </p:attrNameLst>
+                                      </p:cBhvr>
+                                      <p:to>
+                                        <p:strVal val="hidden"/>
+                                      </p:to>
+                                    </p:set>
+                                  </p:subTnLst>
+                                </p:cTn>
+                              </p:par>
+                              <p:par>
+                                <p:cTn id="45" presetID="10" presetClass="entr" presetSubtype="0" fill="hold" grpId="0" nodeType="withEffect">
+                                  <p:stCondLst>
+                                    <p:cond delay="0"/>
+                                  </p:stCondLst>
+                                  <p:childTnLst>
+                                    <p:set>
+                                      <p:cBhvr>
+                                        <p:cTn id="46" dur="1" fill="hold">
+                                          <p:stCondLst>
+                                            <p:cond delay="0"/>
+                                          </p:stCondLst>
+                                        </p:cTn>
+                                        <p:tgtEl>
                                           <p:spTgt spid="15"/>
                                         </p:tgtEl>
                                         <p:attrNameLst>
@@ -28449,7 +28655,7 @@
                                     </p:set>
                                     <p:animEffect transition="in" filter="fade">
                                       <p:cBhvr>
-                                        <p:cTn id="39" dur="250"/>
+                                        <p:cTn id="47" dur="250"/>
                                         <p:tgtEl>
                                           <p:spTgt spid="15"/>
                                         </p:tgtEl>
@@ -28481,26 +28687,26 @@
                     </p:cTn>
                   </p:par>
                   <p:par>
-                    <p:cTn id="40" fill="hold">
+                    <p:cTn id="48" fill="hold">
                       <p:stCondLst>
                         <p:cond delay="indefinite"/>
                       </p:stCondLst>
                       <p:childTnLst>
                         <p:par>
-                          <p:cTn id="41" fill="hold">
+                          <p:cTn id="49" fill="hold">
                             <p:stCondLst>
                               <p:cond delay="0"/>
                             </p:stCondLst>
                             <p:childTnLst>
                               <p:par>
-                                <p:cTn id="42" presetID="10" presetClass="entr" presetSubtype="0" fill="hold" grpId="0" nodeType="clickEffect">
+                                <p:cTn id="50" presetID="10" presetClass="entr" presetSubtype="0" fill="hold" grpId="0" nodeType="clickEffect">
                                   <p:stCondLst>
                                     <p:cond delay="0"/>
                                   </p:stCondLst>
                                   <p:childTnLst>
                                     <p:set>
                                       <p:cBhvr>
-                                        <p:cTn id="43" dur="1" fill="hold">
+                                        <p:cTn id="51" dur="1" fill="hold">
                                           <p:stCondLst>
                                             <p:cond delay="0"/>
                                           </p:stCondLst>
@@ -28522,115 +28728,11 @@
                                     </p:set>
                                     <p:animEffect transition="in" filter="fade">
                                       <p:cBhvr>
-                                        <p:cTn id="44" dur="250"/>
+                                        <p:cTn id="52" dur="250"/>
                                         <p:tgtEl>
                                           <p:spTgt spid="3">
                                             <p:txEl>
                                               <p:pRg st="3" end="3"/>
-                                            </p:txEl>
-                                          </p:spTgt>
-                                        </p:tgtEl>
-                                      </p:cBhvr>
-                                    </p:animEffect>
-                                  </p:childTnLst>
-                                </p:cTn>
-                              </p:par>
-                            </p:childTnLst>
-                          </p:cTn>
-                        </p:par>
-                      </p:childTnLst>
-                    </p:cTn>
-                  </p:par>
-                  <p:par>
-                    <p:cTn id="45" fill="hold">
-                      <p:stCondLst>
-                        <p:cond delay="indefinite"/>
-                      </p:stCondLst>
-                      <p:childTnLst>
-                        <p:par>
-                          <p:cTn id="46" fill="hold">
-                            <p:stCondLst>
-                              <p:cond delay="0"/>
-                            </p:stCondLst>
-                            <p:childTnLst>
-                              <p:par>
-                                <p:cTn id="47" presetID="10" presetClass="entr" presetSubtype="0" fill="hold" grpId="0" nodeType="clickEffect">
-                                  <p:stCondLst>
-                                    <p:cond delay="0"/>
-                                  </p:stCondLst>
-                                  <p:childTnLst>
-                                    <p:set>
-                                      <p:cBhvr>
-                                        <p:cTn id="48" dur="1" fill="hold">
-                                          <p:stCondLst>
-                                            <p:cond delay="0"/>
-                                          </p:stCondLst>
-                                        </p:cTn>
-                                        <p:tgtEl>
-                                          <p:spTgt spid="3">
-                                            <p:txEl>
-                                              <p:pRg st="4" end="4"/>
-                                            </p:txEl>
-                                          </p:spTgt>
-                                        </p:tgtEl>
-                                        <p:attrNameLst>
-                                          <p:attrName>style.visibility</p:attrName>
-                                        </p:attrNameLst>
-                                      </p:cBhvr>
-                                      <p:to>
-                                        <p:strVal val="visible"/>
-                                      </p:to>
-                                    </p:set>
-                                    <p:animEffect transition="in" filter="fade">
-                                      <p:cBhvr>
-                                        <p:cTn id="49" dur="250"/>
-                                        <p:tgtEl>
-                                          <p:spTgt spid="3">
-                                            <p:txEl>
-                                              <p:pRg st="4" end="4"/>
-                                            </p:txEl>
-                                          </p:spTgt>
-                                        </p:tgtEl>
-                                      </p:cBhvr>
-                                    </p:animEffect>
-                                  </p:childTnLst>
-                                </p:cTn>
-                              </p:par>
-                              <p:par>
-                                <p:cTn id="50" presetID="10" presetClass="entr" presetSubtype="0" fill="hold" grpId="0" nodeType="withEffect">
-                                  <p:stCondLst>
-                                    <p:cond delay="0"/>
-                                  </p:stCondLst>
-                                  <p:childTnLst>
-                                    <p:set>
-                                      <p:cBhvr>
-                                        <p:cTn id="51" dur="1" fill="hold">
-                                          <p:stCondLst>
-                                            <p:cond delay="0"/>
-                                          </p:stCondLst>
-                                        </p:cTn>
-                                        <p:tgtEl>
-                                          <p:spTgt spid="3">
-                                            <p:txEl>
-                                              <p:pRg st="5" end="5"/>
-                                            </p:txEl>
-                                          </p:spTgt>
-                                        </p:tgtEl>
-                                        <p:attrNameLst>
-                                          <p:attrName>style.visibility</p:attrName>
-                                        </p:attrNameLst>
-                                      </p:cBhvr>
-                                      <p:to>
-                                        <p:strVal val="visible"/>
-                                      </p:to>
-                                    </p:set>
-                                    <p:animEffect transition="in" filter="fade">
-                                      <p:cBhvr>
-                                        <p:cTn id="52" dur="250"/>
-                                        <p:tgtEl>
-                                          <p:spTgt spid="3">
-                                            <p:txEl>
-                                              <p:pRg st="5" end="5"/>
                                             </p:txEl>
                                           </p:spTgt>
                                         </p:tgtEl>
@@ -28673,7 +28775,7 @@
                                         <p:tgtEl>
                                           <p:spTgt spid="3">
                                             <p:txEl>
-                                              <p:pRg st="6" end="6"/>
+                                              <p:pRg st="4" end="4"/>
                                             </p:txEl>
                                           </p:spTgt>
                                         </p:tgtEl>
@@ -28691,6 +28793,110 @@
                                         <p:tgtEl>
                                           <p:spTgt spid="3">
                                             <p:txEl>
+                                              <p:pRg st="4" end="4"/>
+                                            </p:txEl>
+                                          </p:spTgt>
+                                        </p:tgtEl>
+                                      </p:cBhvr>
+                                    </p:animEffect>
+                                  </p:childTnLst>
+                                </p:cTn>
+                              </p:par>
+                              <p:par>
+                                <p:cTn id="58" presetID="10" presetClass="entr" presetSubtype="0" fill="hold" grpId="0" nodeType="withEffect">
+                                  <p:stCondLst>
+                                    <p:cond delay="0"/>
+                                  </p:stCondLst>
+                                  <p:childTnLst>
+                                    <p:set>
+                                      <p:cBhvr>
+                                        <p:cTn id="59" dur="1" fill="hold">
+                                          <p:stCondLst>
+                                            <p:cond delay="0"/>
+                                          </p:stCondLst>
+                                        </p:cTn>
+                                        <p:tgtEl>
+                                          <p:spTgt spid="3">
+                                            <p:txEl>
+                                              <p:pRg st="5" end="5"/>
+                                            </p:txEl>
+                                          </p:spTgt>
+                                        </p:tgtEl>
+                                        <p:attrNameLst>
+                                          <p:attrName>style.visibility</p:attrName>
+                                        </p:attrNameLst>
+                                      </p:cBhvr>
+                                      <p:to>
+                                        <p:strVal val="visible"/>
+                                      </p:to>
+                                    </p:set>
+                                    <p:animEffect transition="in" filter="fade">
+                                      <p:cBhvr>
+                                        <p:cTn id="60" dur="250"/>
+                                        <p:tgtEl>
+                                          <p:spTgt spid="3">
+                                            <p:txEl>
+                                              <p:pRg st="5" end="5"/>
+                                            </p:txEl>
+                                          </p:spTgt>
+                                        </p:tgtEl>
+                                      </p:cBhvr>
+                                    </p:animEffect>
+                                  </p:childTnLst>
+                                </p:cTn>
+                              </p:par>
+                            </p:childTnLst>
+                          </p:cTn>
+                        </p:par>
+                      </p:childTnLst>
+                    </p:cTn>
+                  </p:par>
+                  <p:par>
+                    <p:cTn id="61" fill="hold">
+                      <p:stCondLst>
+                        <p:cond delay="indefinite"/>
+                      </p:stCondLst>
+                      <p:childTnLst>
+                        <p:par>
+                          <p:cTn id="62" fill="hold">
+                            <p:stCondLst>
+                              <p:cond delay="0"/>
+                            </p:stCondLst>
+                            <p:childTnLst>
+                              <p:par>
+                                <p:cTn id="63" presetID="10" presetClass="entr" presetSubtype="0" fill="hold" grpId="0" nodeType="clickEffect">
+                                  <p:stCondLst>
+                                    <p:cond delay="0"/>
+                                  </p:stCondLst>
+                                  <p:childTnLst>
+                                    <p:set>
+                                      <p:cBhvr>
+                                        <p:cTn id="64" dur="1" fill="hold">
+                                          <p:stCondLst>
+                                            <p:cond delay="0"/>
+                                          </p:stCondLst>
+                                        </p:cTn>
+                                        <p:tgtEl>
+                                          <p:spTgt spid="3">
+                                            <p:txEl>
+                                              <p:pRg st="6" end="6"/>
+                                            </p:txEl>
+                                          </p:spTgt>
+                                        </p:tgtEl>
+                                        <p:attrNameLst>
+                                          <p:attrName>style.visibility</p:attrName>
+                                        </p:attrNameLst>
+                                      </p:cBhvr>
+                                      <p:to>
+                                        <p:strVal val="visible"/>
+                                      </p:to>
+                                    </p:set>
+                                    <p:animEffect transition="in" filter="fade">
+                                      <p:cBhvr>
+                                        <p:cTn id="65" dur="250"/>
+                                        <p:tgtEl>
+                                          <p:spTgt spid="3">
+                                            <p:txEl>
                                               <p:pRg st="6" end="6"/>
                                             </p:txEl>
                                           </p:spTgt>
@@ -28701,14 +28907,14 @@
                                 </p:cTn>
                               </p:par>
                               <p:par>
-                                <p:cTn id="58" presetID="10" presetClass="entr" presetSubtype="0" fill="hold" nodeType="withEffect">
+                                <p:cTn id="66" presetID="10" presetClass="entr" presetSubtype="0" fill="hold" nodeType="withEffect">
                                   <p:stCondLst>
                                     <p:cond delay="0"/>
                                   </p:stCondLst>
                                   <p:childTnLst>
                                     <p:set>
                                       <p:cBhvr>
-                                        <p:cTn id="59" dur="1" fill="hold">
+                                        <p:cTn id="67" dur="1" fill="hold">
                                           <p:stCondLst>
                                             <p:cond delay="0"/>
                                           </p:stCondLst>
@@ -28726,7 +28932,7 @@
                                     </p:set>
                                     <p:animEffect transition="in" filter="fade">
                                       <p:cBhvr>
-                                        <p:cTn id="60" dur="250"/>
+                                        <p:cTn id="68" dur="250"/>
                                         <p:tgtEl>
                                           <p:spTgt spid="17"/>
                                         </p:tgtEl>
@@ -28767,6 +28973,7 @@
       <p:bldP spid="11" grpId="0"/>
       <p:bldP spid="13" grpId="0"/>
       <p:bldP spid="15" grpId="0"/>
+      <p:bldP spid="8" grpId="0"/>
     </p:bldLst>
   </p:timing>
 </p:sld>

</xml_diff>

<commit_message>
change footer text on all slides
</commit_message>
<xml_diff>
--- a/MakeVersionInfo/MakeVersionInfo.pptx
+++ b/MakeVersionInfo/MakeVersionInfo.pptx
@@ -3347,7 +3347,7 @@
           <a:p>
             <a:fld id="{857CC94D-E614-4874-A919-F25B27309A09}" type="datetimeFigureOut">
               <a:rPr lang="en-CA" smtClean="0"/>
-              <a:t>2024-08-30</a:t>
+              <a:t>2024-09-28</a:t>
             </a:fld>
             <a:endParaRPr lang="en-CA"/>
           </a:p>
@@ -6737,7 +6737,7 @@
           <a:noFill/>
           <a:extLst>
             <a:ext uri="{909E8E84-426E-40dd-AFC4-6F175D3DCCD1}">
-              <a14:hiddenFill xmlns="" xmlns:a14="http://schemas.microsoft.com/office/drawing/2010/main">
+              <a14:hiddenFill xmlns:a14="http://schemas.microsoft.com/office/drawing/2010/main" xmlns="">
                 <a:solidFill>
                   <a:srgbClr val="FFFFFF"/>
                 </a:solidFill>
@@ -6803,7 +6803,7 @@
             </a:ln>
             <a:extLst>
               <a:ext uri="{91240B29-F687-4f45-9708-019B960494DF}">
-                <a14:hiddenLine xmlns="" xmlns:a14="http://schemas.microsoft.com/office/drawing/2010/main" w="9525">
+                <a14:hiddenLine xmlns:a14="http://schemas.microsoft.com/office/drawing/2010/main" xmlns="" w="9525">
                   <a:solidFill>
                     <a:srgbClr val="000000"/>
                   </a:solidFill>
@@ -6893,7 +6893,7 @@
             </a:ln>
             <a:extLst>
               <a:ext uri="{91240B29-F687-4f45-9708-019B960494DF}">
-                <a14:hiddenLine xmlns="" xmlns:a14="http://schemas.microsoft.com/office/drawing/2010/main" w="9525">
+                <a14:hiddenLine xmlns:a14="http://schemas.microsoft.com/office/drawing/2010/main" xmlns="" w="9525">
                   <a:solidFill>
                     <a:srgbClr val="000000"/>
                   </a:solidFill>
@@ -6983,7 +6983,7 @@
             </a:ln>
             <a:extLst>
               <a:ext uri="{91240B29-F687-4f45-9708-019B960494DF}">
-                <a14:hiddenLine xmlns="" xmlns:a14="http://schemas.microsoft.com/office/drawing/2010/main" w="9525">
+                <a14:hiddenLine xmlns:a14="http://schemas.microsoft.com/office/drawing/2010/main" xmlns="" w="9525">
                   <a:solidFill>
                     <a:srgbClr val="000000"/>
                   </a:solidFill>
@@ -7017,7 +7017,7 @@
             </a:ln>
             <a:extLst>
               <a:ext uri="{91240B29-F687-4f45-9708-019B960494DF}">
-                <a14:hiddenLine xmlns="" xmlns:a14="http://schemas.microsoft.com/office/drawing/2010/main" w="9525">
+                <a14:hiddenLine xmlns:a14="http://schemas.microsoft.com/office/drawing/2010/main" xmlns="" w="9525">
                   <a:solidFill>
                     <a:srgbClr val="000000"/>
                   </a:solidFill>
@@ -7107,7 +7107,7 @@
             </a:ln>
             <a:extLst>
               <a:ext uri="{91240B29-F687-4f45-9708-019B960494DF}">
-                <a14:hiddenLine xmlns="" xmlns:a14="http://schemas.microsoft.com/office/drawing/2010/main" w="9525">
+                <a14:hiddenLine xmlns:a14="http://schemas.microsoft.com/office/drawing/2010/main" xmlns="" w="9525">
                   <a:solidFill>
                     <a:srgbClr val="000000"/>
                   </a:solidFill>
@@ -7169,7 +7169,7 @@
             </a:ln>
             <a:extLst>
               <a:ext uri="{91240B29-F687-4f45-9708-019B960494DF}">
-                <a14:hiddenLine xmlns="" xmlns:a14="http://schemas.microsoft.com/office/drawing/2010/main" w="9525">
+                <a14:hiddenLine xmlns:a14="http://schemas.microsoft.com/office/drawing/2010/main" xmlns="" w="9525">
                   <a:solidFill>
                     <a:srgbClr val="000000"/>
                   </a:solidFill>
@@ -7231,7 +7231,7 @@
             </a:ln>
             <a:extLst>
               <a:ext uri="{91240B29-F687-4f45-9708-019B960494DF}">
-                <a14:hiddenLine xmlns="" xmlns:a14="http://schemas.microsoft.com/office/drawing/2010/main" w="9525">
+                <a14:hiddenLine xmlns:a14="http://schemas.microsoft.com/office/drawing/2010/main" xmlns="" w="9525">
                   <a:solidFill>
                     <a:srgbClr val="000000"/>
                   </a:solidFill>
@@ -7321,7 +7321,7 @@
             </a:ln>
             <a:extLst>
               <a:ext uri="{91240B29-F687-4f45-9708-019B960494DF}">
-                <a14:hiddenLine xmlns="" xmlns:a14="http://schemas.microsoft.com/office/drawing/2010/main" w="9525">
+                <a14:hiddenLine xmlns:a14="http://schemas.microsoft.com/office/drawing/2010/main" xmlns="" w="9525">
                   <a:solidFill>
                     <a:srgbClr val="000000"/>
                   </a:solidFill>
@@ -7383,7 +7383,7 @@
             </a:ln>
             <a:extLst>
               <a:ext uri="{91240B29-F687-4f45-9708-019B960494DF}">
-                <a14:hiddenLine xmlns="" xmlns:a14="http://schemas.microsoft.com/office/drawing/2010/main" w="9525">
+                <a14:hiddenLine xmlns:a14="http://schemas.microsoft.com/office/drawing/2010/main" xmlns="" w="9525">
                   <a:solidFill>
                     <a:srgbClr val="000000"/>
                   </a:solidFill>
@@ -7445,7 +7445,7 @@
             </a:ln>
             <a:extLst>
               <a:ext uri="{91240B29-F687-4f45-9708-019B960494DF}">
-                <a14:hiddenLine xmlns="" xmlns:a14="http://schemas.microsoft.com/office/drawing/2010/main" w="9525">
+                <a14:hiddenLine xmlns:a14="http://schemas.microsoft.com/office/drawing/2010/main" xmlns="" w="9525">
                   <a:solidFill>
                     <a:srgbClr val="000000"/>
                   </a:solidFill>
@@ -7535,7 +7535,7 @@
             </a:ln>
             <a:extLst>
               <a:ext uri="{91240B29-F687-4f45-9708-019B960494DF}">
-                <a14:hiddenLine xmlns="" xmlns:a14="http://schemas.microsoft.com/office/drawing/2010/main" w="9525">
+                <a14:hiddenLine xmlns:a14="http://schemas.microsoft.com/office/drawing/2010/main" xmlns="" w="9525">
                   <a:solidFill>
                     <a:srgbClr val="000000"/>
                   </a:solidFill>
@@ -7625,7 +7625,7 @@
             </a:ln>
             <a:extLst>
               <a:ext uri="{91240B29-F687-4f45-9708-019B960494DF}">
-                <a14:hiddenLine xmlns="" xmlns:a14="http://schemas.microsoft.com/office/drawing/2010/main" w="9525">
+                <a14:hiddenLine xmlns:a14="http://schemas.microsoft.com/office/drawing/2010/main" xmlns="" w="9525">
                   <a:solidFill>
                     <a:srgbClr val="000000"/>
                   </a:solidFill>
@@ -7687,7 +7687,7 @@
             </a:ln>
             <a:extLst>
               <a:ext uri="{91240B29-F687-4f45-9708-019B960494DF}">
-                <a14:hiddenLine xmlns="" xmlns:a14="http://schemas.microsoft.com/office/drawing/2010/main" w="9525">
+                <a14:hiddenLine xmlns:a14="http://schemas.microsoft.com/office/drawing/2010/main" xmlns="" w="9525">
                   <a:solidFill>
                     <a:srgbClr val="000000"/>
                   </a:solidFill>
@@ -7797,7 +7797,7 @@
             </a:ln>
             <a:extLst>
               <a:ext uri="{91240B29-F687-4f45-9708-019B960494DF}">
-                <a14:hiddenLine xmlns="" xmlns:a14="http://schemas.microsoft.com/office/drawing/2010/main" w="9525">
+                <a14:hiddenLine xmlns:a14="http://schemas.microsoft.com/office/drawing/2010/main" xmlns="" w="9525">
                   <a:solidFill>
                     <a:srgbClr val="000000"/>
                   </a:solidFill>
@@ -7859,7 +7859,7 @@
             </a:ln>
             <a:extLst>
               <a:ext uri="{91240B29-F687-4f45-9708-019B960494DF}">
-                <a14:hiddenLine xmlns="" xmlns:a14="http://schemas.microsoft.com/office/drawing/2010/main" w="9525">
+                <a14:hiddenLine xmlns:a14="http://schemas.microsoft.com/office/drawing/2010/main" xmlns="" w="9525">
                   <a:solidFill>
                     <a:srgbClr val="000000"/>
                   </a:solidFill>
@@ -7949,7 +7949,7 @@
             </a:ln>
             <a:extLst>
               <a:ext uri="{91240B29-F687-4f45-9708-019B960494DF}">
-                <a14:hiddenLine xmlns="" xmlns:a14="http://schemas.microsoft.com/office/drawing/2010/main" w="9525">
+                <a14:hiddenLine xmlns:a14="http://schemas.microsoft.com/office/drawing/2010/main" xmlns="" w="9525">
                   <a:solidFill>
                     <a:srgbClr val="000000"/>
                   </a:solidFill>
@@ -8039,7 +8039,7 @@
             </a:ln>
             <a:extLst>
               <a:ext uri="{91240B29-F687-4f45-9708-019B960494DF}">
-                <a14:hiddenLine xmlns="" xmlns:a14="http://schemas.microsoft.com/office/drawing/2010/main" w="9525">
+                <a14:hiddenLine xmlns:a14="http://schemas.microsoft.com/office/drawing/2010/main" xmlns="" w="9525">
                   <a:solidFill>
                     <a:srgbClr val="000000"/>
                   </a:solidFill>
@@ -8101,7 +8101,7 @@
             </a:ln>
             <a:extLst>
               <a:ext uri="{91240B29-F687-4f45-9708-019B960494DF}">
-                <a14:hiddenLine xmlns="" xmlns:a14="http://schemas.microsoft.com/office/drawing/2010/main" w="9525">
+                <a14:hiddenLine xmlns:a14="http://schemas.microsoft.com/office/drawing/2010/main" xmlns="" w="9525">
                   <a:solidFill>
                     <a:srgbClr val="000000"/>
                   </a:solidFill>
@@ -8191,7 +8191,7 @@
             </a:ln>
             <a:extLst>
               <a:ext uri="{91240B29-F687-4f45-9708-019B960494DF}">
-                <a14:hiddenLine xmlns="" xmlns:a14="http://schemas.microsoft.com/office/drawing/2010/main" w="9525">
+                <a14:hiddenLine xmlns:a14="http://schemas.microsoft.com/office/drawing/2010/main" xmlns="" w="9525">
                   <a:solidFill>
                     <a:srgbClr val="000000"/>
                   </a:solidFill>
@@ -8281,7 +8281,7 @@
             </a:ln>
             <a:extLst>
               <a:ext uri="{91240B29-F687-4f45-9708-019B960494DF}">
-                <a14:hiddenLine xmlns="" xmlns:a14="http://schemas.microsoft.com/office/drawing/2010/main" w="9525">
+                <a14:hiddenLine xmlns:a14="http://schemas.microsoft.com/office/drawing/2010/main" xmlns="" w="9525">
                   <a:solidFill>
                     <a:srgbClr val="000000"/>
                   </a:solidFill>
@@ -8337,7 +8337,7 @@
             </a:ln>
             <a:extLst>
               <a:ext uri="{91240B29-F687-4f45-9708-019B960494DF}">
-                <a14:hiddenLine xmlns="" xmlns:a14="http://schemas.microsoft.com/office/drawing/2010/main" w="9525">
+                <a14:hiddenLine xmlns:a14="http://schemas.microsoft.com/office/drawing/2010/main" xmlns="" w="9525">
                   <a:solidFill>
                     <a:srgbClr val="000000"/>
                   </a:solidFill>
@@ -8427,7 +8427,7 @@
             </a:ln>
             <a:extLst>
               <a:ext uri="{91240B29-F687-4f45-9708-019B960494DF}">
-                <a14:hiddenLine xmlns="" xmlns:a14="http://schemas.microsoft.com/office/drawing/2010/main" w="9525">
+                <a14:hiddenLine xmlns:a14="http://schemas.microsoft.com/office/drawing/2010/main" xmlns="" w="9525">
                   <a:solidFill>
                     <a:srgbClr val="000000"/>
                   </a:solidFill>
@@ -8483,7 +8483,7 @@
             </a:ln>
             <a:extLst>
               <a:ext uri="{91240B29-F687-4f45-9708-019B960494DF}">
-                <a14:hiddenLine xmlns="" xmlns:a14="http://schemas.microsoft.com/office/drawing/2010/main" w="9525">
+                <a14:hiddenLine xmlns:a14="http://schemas.microsoft.com/office/drawing/2010/main" xmlns="" w="9525">
                   <a:solidFill>
                     <a:srgbClr val="000000"/>
                   </a:solidFill>
@@ -8573,7 +8573,7 @@
             </a:ln>
             <a:extLst>
               <a:ext uri="{91240B29-F687-4f45-9708-019B960494DF}">
-                <a14:hiddenLine xmlns="" xmlns:a14="http://schemas.microsoft.com/office/drawing/2010/main" w="9525">
+                <a14:hiddenLine xmlns:a14="http://schemas.microsoft.com/office/drawing/2010/main" xmlns="" w="9525">
                   <a:solidFill>
                     <a:srgbClr val="000000"/>
                   </a:solidFill>
@@ -8641,7 +8641,7 @@
             </a:ln>
             <a:extLst>
               <a:ext uri="{91240B29-F687-4f45-9708-019B960494DF}">
-                <a14:hiddenLine xmlns="" xmlns:a14="http://schemas.microsoft.com/office/drawing/2010/main" w="9525">
+                <a14:hiddenLine xmlns:a14="http://schemas.microsoft.com/office/drawing/2010/main" xmlns="" w="9525">
                   <a:solidFill>
                     <a:srgbClr val="000000"/>
                   </a:solidFill>
@@ -8731,7 +8731,7 @@
             </a:ln>
             <a:extLst>
               <a:ext uri="{91240B29-F687-4f45-9708-019B960494DF}">
-                <a14:hiddenLine xmlns="" xmlns:a14="http://schemas.microsoft.com/office/drawing/2010/main" w="9525">
+                <a14:hiddenLine xmlns:a14="http://schemas.microsoft.com/office/drawing/2010/main" xmlns="" w="9525">
                   <a:solidFill>
                     <a:srgbClr val="000000"/>
                   </a:solidFill>
@@ -8799,7 +8799,7 @@
             </a:ln>
             <a:extLst>
               <a:ext uri="{91240B29-F687-4f45-9708-019B960494DF}">
-                <a14:hiddenLine xmlns="" xmlns:a14="http://schemas.microsoft.com/office/drawing/2010/main" w="9525">
+                <a14:hiddenLine xmlns:a14="http://schemas.microsoft.com/office/drawing/2010/main" xmlns="" w="9525">
                   <a:solidFill>
                     <a:srgbClr val="000000"/>
                   </a:solidFill>
@@ -8889,7 +8889,7 @@
             </a:ln>
             <a:extLst>
               <a:ext uri="{91240B29-F687-4f45-9708-019B960494DF}">
-                <a14:hiddenLine xmlns="" xmlns:a14="http://schemas.microsoft.com/office/drawing/2010/main" w="9525">
+                <a14:hiddenLine xmlns:a14="http://schemas.microsoft.com/office/drawing/2010/main" xmlns="" w="9525">
                   <a:solidFill>
                     <a:srgbClr val="000000"/>
                   </a:solidFill>
@@ -8923,7 +8923,7 @@
             </a:ln>
             <a:extLst>
               <a:ext uri="{91240B29-F687-4f45-9708-019B960494DF}">
-                <a14:hiddenLine xmlns="" xmlns:a14="http://schemas.microsoft.com/office/drawing/2010/main" w="9525">
+                <a14:hiddenLine xmlns:a14="http://schemas.microsoft.com/office/drawing/2010/main" xmlns="" w="9525">
                   <a:solidFill>
                     <a:srgbClr val="000000"/>
                   </a:solidFill>
@@ -9013,7 +9013,7 @@
             </a:ln>
             <a:extLst>
               <a:ext uri="{91240B29-F687-4f45-9708-019B960494DF}">
-                <a14:hiddenLine xmlns="" xmlns:a14="http://schemas.microsoft.com/office/drawing/2010/main" w="9525">
+                <a14:hiddenLine xmlns:a14="http://schemas.microsoft.com/office/drawing/2010/main" xmlns="" w="9525">
                   <a:solidFill>
                     <a:srgbClr val="000000"/>
                   </a:solidFill>
@@ -9075,7 +9075,7 @@
             </a:ln>
             <a:extLst>
               <a:ext uri="{91240B29-F687-4f45-9708-019B960494DF}">
-                <a14:hiddenLine xmlns="" xmlns:a14="http://schemas.microsoft.com/office/drawing/2010/main" w="9525">
+                <a14:hiddenLine xmlns:a14="http://schemas.microsoft.com/office/drawing/2010/main" xmlns="" w="9525">
                   <a:solidFill>
                     <a:srgbClr val="000000"/>
                   </a:solidFill>
@@ -9137,7 +9137,7 @@
             </a:ln>
             <a:extLst>
               <a:ext uri="{91240B29-F687-4f45-9708-019B960494DF}">
-                <a14:hiddenLine xmlns="" xmlns:a14="http://schemas.microsoft.com/office/drawing/2010/main" w="9525">
+                <a14:hiddenLine xmlns:a14="http://schemas.microsoft.com/office/drawing/2010/main" xmlns="" w="9525">
                   <a:solidFill>
                     <a:srgbClr val="000000"/>
                   </a:solidFill>
@@ -9227,7 +9227,7 @@
             </a:ln>
             <a:extLst>
               <a:ext uri="{91240B29-F687-4f45-9708-019B960494DF}">
-                <a14:hiddenLine xmlns="" xmlns:a14="http://schemas.microsoft.com/office/drawing/2010/main" w="9525">
+                <a14:hiddenLine xmlns:a14="http://schemas.microsoft.com/office/drawing/2010/main" xmlns="" w="9525">
                   <a:solidFill>
                     <a:srgbClr val="000000"/>
                   </a:solidFill>
@@ -9295,7 +9295,7 @@
             </a:ln>
             <a:extLst>
               <a:ext uri="{91240B29-F687-4f45-9708-019B960494DF}">
-                <a14:hiddenLine xmlns="" xmlns:a14="http://schemas.microsoft.com/office/drawing/2010/main" w="9525">
+                <a14:hiddenLine xmlns:a14="http://schemas.microsoft.com/office/drawing/2010/main" xmlns="" w="9525">
                   <a:solidFill>
                     <a:srgbClr val="000000"/>
                   </a:solidFill>
@@ -9357,7 +9357,7 @@
             </a:ln>
             <a:extLst>
               <a:ext uri="{91240B29-F687-4f45-9708-019B960494DF}">
-                <a14:hiddenLine xmlns="" xmlns:a14="http://schemas.microsoft.com/office/drawing/2010/main" w="9525">
+                <a14:hiddenLine xmlns:a14="http://schemas.microsoft.com/office/drawing/2010/main" xmlns="" w="9525">
                   <a:solidFill>
                     <a:srgbClr val="000000"/>
                   </a:solidFill>
@@ -9447,7 +9447,7 @@
             </a:ln>
             <a:extLst>
               <a:ext uri="{91240B29-F687-4f45-9708-019B960494DF}">
-                <a14:hiddenLine xmlns="" xmlns:a14="http://schemas.microsoft.com/office/drawing/2010/main" w="9525">
+                <a14:hiddenLine xmlns:a14="http://schemas.microsoft.com/office/drawing/2010/main" xmlns="" w="9525">
                   <a:solidFill>
                     <a:srgbClr val="000000"/>
                   </a:solidFill>
@@ -9509,7 +9509,7 @@
             </a:ln>
             <a:extLst>
               <a:ext uri="{91240B29-F687-4f45-9708-019B960494DF}">
-                <a14:hiddenLine xmlns="" xmlns:a14="http://schemas.microsoft.com/office/drawing/2010/main" w="9525">
+                <a14:hiddenLine xmlns:a14="http://schemas.microsoft.com/office/drawing/2010/main" xmlns="" w="9525">
                   <a:solidFill>
                     <a:srgbClr val="000000"/>
                   </a:solidFill>
@@ -9599,7 +9599,7 @@
             </a:ln>
             <a:extLst>
               <a:ext uri="{91240B29-F687-4f45-9708-019B960494DF}">
-                <a14:hiddenLine xmlns="" xmlns:a14="http://schemas.microsoft.com/office/drawing/2010/main" w="9525">
+                <a14:hiddenLine xmlns:a14="http://schemas.microsoft.com/office/drawing/2010/main" xmlns="" w="9525">
                   <a:solidFill>
                     <a:srgbClr val="000000"/>
                   </a:solidFill>
@@ -9661,7 +9661,7 @@
             </a:ln>
             <a:extLst>
               <a:ext uri="{91240B29-F687-4f45-9708-019B960494DF}">
-                <a14:hiddenLine xmlns="" xmlns:a14="http://schemas.microsoft.com/office/drawing/2010/main" w="9525">
+                <a14:hiddenLine xmlns:a14="http://schemas.microsoft.com/office/drawing/2010/main" xmlns="" w="9525">
                   <a:solidFill>
                     <a:srgbClr val="000000"/>
                   </a:solidFill>
@@ -9751,7 +9751,7 @@
             </a:ln>
             <a:extLst>
               <a:ext uri="{91240B29-F687-4f45-9708-019B960494DF}">
-                <a14:hiddenLine xmlns="" xmlns:a14="http://schemas.microsoft.com/office/drawing/2010/main" w="9525">
+                <a14:hiddenLine xmlns:a14="http://schemas.microsoft.com/office/drawing/2010/main" xmlns="" w="9525">
                   <a:solidFill>
                     <a:srgbClr val="000000"/>
                   </a:solidFill>
@@ -9785,7 +9785,7 @@
             </a:ln>
             <a:extLst>
               <a:ext uri="{91240B29-F687-4f45-9708-019B960494DF}">
-                <a14:hiddenLine xmlns="" xmlns:a14="http://schemas.microsoft.com/office/drawing/2010/main" w="9525">
+                <a14:hiddenLine xmlns:a14="http://schemas.microsoft.com/office/drawing/2010/main" xmlns="" w="9525">
                   <a:solidFill>
                     <a:srgbClr val="000000"/>
                   </a:solidFill>
@@ -9850,7 +9850,7 @@
             </a:ln>
             <a:extLst>
               <a:ext uri="{91240B29-F687-4f45-9708-019B960494DF}">
-                <a14:hiddenLine xmlns="" xmlns:a14="http://schemas.microsoft.com/office/drawing/2010/main" w="9525">
+                <a14:hiddenLine xmlns:a14="http://schemas.microsoft.com/office/drawing/2010/main" xmlns="" w="9525">
                   <a:solidFill>
                     <a:srgbClr val="000000"/>
                   </a:solidFill>
@@ -9940,7 +9940,7 @@
             </a:ln>
             <a:extLst>
               <a:ext uri="{91240B29-F687-4f45-9708-019B960494DF}">
-                <a14:hiddenLine xmlns="" xmlns:a14="http://schemas.microsoft.com/office/drawing/2010/main" w="9525">
+                <a14:hiddenLine xmlns:a14="http://schemas.microsoft.com/office/drawing/2010/main" xmlns="" w="9525">
                   <a:solidFill>
                     <a:srgbClr val="000000"/>
                   </a:solidFill>
@@ -10002,7 +10002,7 @@
             </a:ln>
             <a:extLst>
               <a:ext uri="{91240B29-F687-4f45-9708-019B960494DF}">
-                <a14:hiddenLine xmlns="" xmlns:a14="http://schemas.microsoft.com/office/drawing/2010/main" w="9525">
+                <a14:hiddenLine xmlns:a14="http://schemas.microsoft.com/office/drawing/2010/main" xmlns="" w="9525">
                   <a:solidFill>
                     <a:srgbClr val="000000"/>
                   </a:solidFill>
@@ -10092,7 +10092,7 @@
             </a:ln>
             <a:extLst>
               <a:ext uri="{91240B29-F687-4f45-9708-019B960494DF}">
-                <a14:hiddenLine xmlns="" xmlns:a14="http://schemas.microsoft.com/office/drawing/2010/main" w="9525">
+                <a14:hiddenLine xmlns:a14="http://schemas.microsoft.com/office/drawing/2010/main" xmlns="" w="9525">
                   <a:solidFill>
                     <a:srgbClr val="000000"/>
                   </a:solidFill>
@@ -10182,7 +10182,7 @@
             </a:ln>
             <a:extLst>
               <a:ext uri="{91240B29-F687-4f45-9708-019B960494DF}">
-                <a14:hiddenLine xmlns="" xmlns:a14="http://schemas.microsoft.com/office/drawing/2010/main" w="9525">
+                <a14:hiddenLine xmlns:a14="http://schemas.microsoft.com/office/drawing/2010/main" xmlns="" w="9525">
                   <a:solidFill>
                     <a:srgbClr val="000000"/>
                   </a:solidFill>
@@ -10247,7 +10247,7 @@
             </a:ln>
             <a:extLst>
               <a:ext uri="{91240B29-F687-4f45-9708-019B960494DF}">
-                <a14:hiddenLine xmlns="" xmlns:a14="http://schemas.microsoft.com/office/drawing/2010/main" w="9525">
+                <a14:hiddenLine xmlns:a14="http://schemas.microsoft.com/office/drawing/2010/main" xmlns="" w="9525">
                   <a:solidFill>
                     <a:srgbClr val="000000"/>
                   </a:solidFill>
@@ -10309,7 +10309,7 @@
             </a:ln>
             <a:extLst>
               <a:ext uri="{91240B29-F687-4f45-9708-019B960494DF}">
-                <a14:hiddenLine xmlns="" xmlns:a14="http://schemas.microsoft.com/office/drawing/2010/main" w="9525">
+                <a14:hiddenLine xmlns:a14="http://schemas.microsoft.com/office/drawing/2010/main" xmlns="" w="9525">
                   <a:solidFill>
                     <a:srgbClr val="000000"/>
                   </a:solidFill>
@@ -10399,7 +10399,7 @@
             </a:ln>
             <a:extLst>
               <a:ext uri="{91240B29-F687-4f45-9708-019B960494DF}">
-                <a14:hiddenLine xmlns="" xmlns:a14="http://schemas.microsoft.com/office/drawing/2010/main" w="9525">
+                <a14:hiddenLine xmlns:a14="http://schemas.microsoft.com/office/drawing/2010/main" xmlns="" w="9525">
                   <a:solidFill>
                     <a:srgbClr val="000000"/>
                   </a:solidFill>
@@ -10489,7 +10489,7 @@
             </a:ln>
             <a:extLst>
               <a:ext uri="{91240B29-F687-4f45-9708-019B960494DF}">
-                <a14:hiddenLine xmlns="" xmlns:a14="http://schemas.microsoft.com/office/drawing/2010/main" w="9525">
+                <a14:hiddenLine xmlns:a14="http://schemas.microsoft.com/office/drawing/2010/main" xmlns="" w="9525">
                   <a:solidFill>
                     <a:srgbClr val="000000"/>
                   </a:solidFill>
@@ -10551,7 +10551,7 @@
             </a:ln>
             <a:extLst>
               <a:ext uri="{91240B29-F687-4f45-9708-019B960494DF}">
-                <a14:hiddenLine xmlns="" xmlns:a14="http://schemas.microsoft.com/office/drawing/2010/main" w="9525">
+                <a14:hiddenLine xmlns:a14="http://schemas.microsoft.com/office/drawing/2010/main" xmlns="" w="9525">
                   <a:solidFill>
                     <a:srgbClr val="000000"/>
                   </a:solidFill>
@@ -10671,7 +10671,7 @@
             </a:ln>
             <a:extLst>
               <a:ext uri="{91240B29-F687-4f45-9708-019B960494DF}">
-                <a14:hiddenLine xmlns="" xmlns:a14="http://schemas.microsoft.com/office/drawing/2010/main" w="9525">
+                <a14:hiddenLine xmlns:a14="http://schemas.microsoft.com/office/drawing/2010/main" xmlns="" w="9525">
                   <a:solidFill>
                     <a:srgbClr val="000000"/>
                   </a:solidFill>
@@ -10739,7 +10739,7 @@
             </a:ln>
             <a:extLst>
               <a:ext uri="{91240B29-F687-4f45-9708-019B960494DF}">
-                <a14:hiddenLine xmlns="" xmlns:a14="http://schemas.microsoft.com/office/drawing/2010/main" w="9525">
+                <a14:hiddenLine xmlns:a14="http://schemas.microsoft.com/office/drawing/2010/main" xmlns="" w="9525">
                   <a:solidFill>
                     <a:srgbClr val="000000"/>
                   </a:solidFill>
@@ -10829,7 +10829,7 @@
             </a:ln>
             <a:extLst>
               <a:ext uri="{91240B29-F687-4f45-9708-019B960494DF}">
-                <a14:hiddenLine xmlns="" xmlns:a14="http://schemas.microsoft.com/office/drawing/2010/main" w="9525">
+                <a14:hiddenLine xmlns:a14="http://schemas.microsoft.com/office/drawing/2010/main" xmlns="" w="9525">
                   <a:solidFill>
                     <a:srgbClr val="000000"/>
                   </a:solidFill>
@@ -10981,7 +10981,7 @@
           <a:p>
             <a:r>
               <a:rPr lang="en-US"/>
-              <a:t>https://lenp.net/presentations/</a:t>
+              <a:t>Len Popp – https://lenp.net/presentations/</a:t>
             </a:r>
             <a:endParaRPr lang="en-US" dirty="0"/>
           </a:p>
@@ -11304,7 +11304,7 @@
           <a:p>
             <a:r>
               <a:rPr lang="en-US"/>
-              <a:t>https://lenp.net/presentations/</a:t>
+              <a:t>Len Popp – https://lenp.net/presentations/</a:t>
             </a:r>
             <a:endParaRPr lang="en-US" dirty="0"/>
           </a:p>
@@ -11577,7 +11577,7 @@
           <a:p>
             <a:r>
               <a:rPr lang="en-US"/>
-              <a:t>https://lenp.net/presentations/</a:t>
+              <a:t>Len Popp – https://lenp.net/presentations/</a:t>
             </a:r>
             <a:endParaRPr lang="en-US" dirty="0"/>
           </a:p>
@@ -11813,7 +11813,7 @@
           <a:p>
             <a:r>
               <a:rPr lang="en-US"/>
-              <a:t>https://lenp.net/presentations/</a:t>
+              <a:t>Len Popp – https://lenp.net/presentations/</a:t>
             </a:r>
             <a:endParaRPr lang="en-US" dirty="0"/>
           </a:p>
@@ -12109,7 +12109,7 @@
           <a:p>
             <a:r>
               <a:rPr lang="en-US"/>
-              <a:t>https://lenp.net/presentations/</a:t>
+              <a:t>Len Popp – https://lenp.net/presentations/</a:t>
             </a:r>
             <a:endParaRPr lang="en-US" dirty="0"/>
           </a:p>
@@ -12611,7 +12611,7 @@
           <a:p>
             <a:r>
               <a:rPr lang="en-US"/>
-              <a:t>https://lenp.net/presentations/</a:t>
+              <a:t>Len Popp – https://lenp.net/presentations/</a:t>
             </a:r>
             <a:endParaRPr lang="en-US" dirty="0"/>
           </a:p>
@@ -13269,7 +13269,7 @@
           <a:p>
             <a:r>
               <a:rPr lang="en-US"/>
-              <a:t>https://lenp.net/presentations/</a:t>
+              <a:t>Len Popp – https://lenp.net/presentations/</a:t>
             </a:r>
             <a:endParaRPr lang="en-US" dirty="0"/>
           </a:p>
@@ -14005,7 +14005,7 @@
           <a:p>
             <a:r>
               <a:rPr lang="en-US"/>
-              <a:t>https://lenp.net/presentations/</a:t>
+              <a:t>Len Popp – https://lenp.net/presentations/</a:t>
             </a:r>
             <a:endParaRPr lang="en-US" dirty="0"/>
           </a:p>
@@ -14191,7 +14191,7 @@
           <a:p>
             <a:r>
               <a:rPr lang="en-US"/>
-              <a:t>https://lenp.net/presentations/</a:t>
+              <a:t>Len Popp – https://lenp.net/presentations/</a:t>
             </a:r>
             <a:endParaRPr lang="en-US" dirty="0"/>
           </a:p>
@@ -14387,7 +14387,7 @@
           <a:p>
             <a:r>
               <a:rPr lang="en-US"/>
-              <a:t>https://lenp.net/presentations/</a:t>
+              <a:t>Len Popp – https://lenp.net/presentations/</a:t>
             </a:r>
             <a:endParaRPr lang="en-US" dirty="0"/>
           </a:p>
@@ -14591,7 +14591,7 @@
           <a:p>
             <a:r>
               <a:rPr lang="en-CA"/>
-              <a:t>https://lenp.net/presentations/</a:t>
+              <a:t>Len Popp – https://lenp.net/presentations/</a:t>
             </a:r>
           </a:p>
         </p:txBody>
@@ -14776,7 +14776,7 @@
           <a:p>
             <a:r>
               <a:rPr lang="en-US"/>
-              <a:t>https://lenp.net/presentations/</a:t>
+              <a:t>Len Popp – https://lenp.net/presentations/</a:t>
             </a:r>
             <a:endParaRPr lang="en-US" dirty="0"/>
           </a:p>
@@ -15070,7 +15070,7 @@
           <a:p>
             <a:r>
               <a:rPr lang="en-US"/>
-              <a:t>https://lenp.net/presentations/</a:t>
+              <a:t>Len Popp – https://lenp.net/presentations/</a:t>
             </a:r>
             <a:endParaRPr lang="en-US" dirty="0"/>
           </a:p>
@@ -15335,7 +15335,7 @@
           <a:p>
             <a:r>
               <a:rPr lang="en-US"/>
-              <a:t>https://lenp.net/presentations/</a:t>
+              <a:t>Len Popp – https://lenp.net/presentations/</a:t>
             </a:r>
             <a:endParaRPr lang="en-US" dirty="0"/>
           </a:p>
@@ -15732,7 +15732,7 @@
           <a:p>
             <a:r>
               <a:rPr lang="en-US"/>
-              <a:t>https://lenp.net/presentations/</a:t>
+              <a:t>Len Popp – https://lenp.net/presentations/</a:t>
             </a:r>
             <a:endParaRPr lang="en-US" dirty="0"/>
           </a:p>
@@ -15890,7 +15890,7 @@
           <a:p>
             <a:r>
               <a:rPr lang="en-US"/>
-              <a:t>https://lenp.net/presentations/</a:t>
+              <a:t>Len Popp – https://lenp.net/presentations/</a:t>
             </a:r>
             <a:endParaRPr lang="en-US" dirty="0"/>
           </a:p>
@@ -16018,7 +16018,7 @@
           <a:p>
             <a:r>
               <a:rPr lang="en-US"/>
-              <a:t>https://lenp.net/presentations/</a:t>
+              <a:t>Len Popp – https://lenp.net/presentations/</a:t>
             </a:r>
             <a:endParaRPr lang="en-US" dirty="0"/>
           </a:p>
@@ -16283,7 +16283,7 @@
           <a:p>
             <a:r>
               <a:rPr lang="en-US"/>
-              <a:t>https://lenp.net/presentations/</a:t>
+              <a:t>Len Popp – https://lenp.net/presentations/</a:t>
             </a:r>
             <a:endParaRPr lang="en-US" dirty="0"/>
           </a:p>
@@ -16647,7 +16647,7 @@
           <a:p>
             <a:r>
               <a:rPr lang="en-US"/>
-              <a:t>https://lenp.net/presentations/</a:t>
+              <a:t>Len Popp – https://lenp.net/presentations/</a:t>
             </a:r>
             <a:endParaRPr lang="en-US" dirty="0"/>
           </a:p>
@@ -16949,7 +16949,7 @@
           <a:noFill/>
           <a:extLst>
             <a:ext uri="{909E8E84-426E-40dd-AFC4-6F175D3DCCD1}">
-              <a14:hiddenFill xmlns="" xmlns:a14="http://schemas.microsoft.com/office/drawing/2010/main">
+              <a14:hiddenFill xmlns:a14="http://schemas.microsoft.com/office/drawing/2010/main" xmlns="">
                 <a:solidFill>
                   <a:srgbClr val="FFFFFF"/>
                 </a:solidFill>
@@ -17029,7 +17029,7 @@
               </a:ln>
               <a:extLst>
                 <a:ext uri="{91240B29-F687-4f45-9708-019B960494DF}">
-                  <a14:hiddenLine xmlns="" xmlns:a14="http://schemas.microsoft.com/office/drawing/2010/main" w="9525">
+                  <a14:hiddenLine xmlns:a14="http://schemas.microsoft.com/office/drawing/2010/main" xmlns="" w="9525">
                     <a:solidFill>
                       <a:srgbClr val="000000"/>
                     </a:solidFill>
@@ -17119,7 +17119,7 @@
               </a:ln>
               <a:extLst>
                 <a:ext uri="{91240B29-F687-4f45-9708-019B960494DF}">
-                  <a14:hiddenLine xmlns="" xmlns:a14="http://schemas.microsoft.com/office/drawing/2010/main" w="9525">
+                  <a14:hiddenLine xmlns:a14="http://schemas.microsoft.com/office/drawing/2010/main" xmlns="" w="9525">
                     <a:solidFill>
                       <a:srgbClr val="000000"/>
                     </a:solidFill>
@@ -17209,7 +17209,7 @@
               </a:ln>
               <a:extLst>
                 <a:ext uri="{91240B29-F687-4f45-9708-019B960494DF}">
-                  <a14:hiddenLine xmlns="" xmlns:a14="http://schemas.microsoft.com/office/drawing/2010/main" w="9525">
+                  <a14:hiddenLine xmlns:a14="http://schemas.microsoft.com/office/drawing/2010/main" xmlns="" w="9525">
                     <a:solidFill>
                       <a:srgbClr val="000000"/>
                     </a:solidFill>
@@ -17271,7 +17271,7 @@
               </a:ln>
               <a:extLst>
                 <a:ext uri="{91240B29-F687-4f45-9708-019B960494DF}">
-                  <a14:hiddenLine xmlns="" xmlns:a14="http://schemas.microsoft.com/office/drawing/2010/main" w="9525">
+                  <a14:hiddenLine xmlns:a14="http://schemas.microsoft.com/office/drawing/2010/main" xmlns="" w="9525">
                     <a:solidFill>
                       <a:srgbClr val="000000"/>
                     </a:solidFill>
@@ -17361,7 +17361,7 @@
               </a:ln>
               <a:extLst>
                 <a:ext uri="{91240B29-F687-4f45-9708-019B960494DF}">
-                  <a14:hiddenLine xmlns="" xmlns:a14="http://schemas.microsoft.com/office/drawing/2010/main" w="9525">
+                  <a14:hiddenLine xmlns:a14="http://schemas.microsoft.com/office/drawing/2010/main" xmlns="" w="9525">
                     <a:solidFill>
                       <a:srgbClr val="000000"/>
                     </a:solidFill>
@@ -17423,7 +17423,7 @@
               </a:ln>
               <a:extLst>
                 <a:ext uri="{91240B29-F687-4f45-9708-019B960494DF}">
-                  <a14:hiddenLine xmlns="" xmlns:a14="http://schemas.microsoft.com/office/drawing/2010/main" w="9525">
+                  <a14:hiddenLine xmlns:a14="http://schemas.microsoft.com/office/drawing/2010/main" xmlns="" w="9525">
                     <a:solidFill>
                       <a:srgbClr val="000000"/>
                     </a:solidFill>
@@ -17485,7 +17485,7 @@
               </a:ln>
               <a:extLst>
                 <a:ext uri="{91240B29-F687-4f45-9708-019B960494DF}">
-                  <a14:hiddenLine xmlns="" xmlns:a14="http://schemas.microsoft.com/office/drawing/2010/main" w="9525">
+                  <a14:hiddenLine xmlns:a14="http://schemas.microsoft.com/office/drawing/2010/main" xmlns="" w="9525">
                     <a:solidFill>
                       <a:srgbClr val="000000"/>
                     </a:solidFill>
@@ -17575,7 +17575,7 @@
               </a:ln>
               <a:extLst>
                 <a:ext uri="{91240B29-F687-4f45-9708-019B960494DF}">
-                  <a14:hiddenLine xmlns="" xmlns:a14="http://schemas.microsoft.com/office/drawing/2010/main" w="9525">
+                  <a14:hiddenLine xmlns:a14="http://schemas.microsoft.com/office/drawing/2010/main" xmlns="" w="9525">
                     <a:solidFill>
                       <a:srgbClr val="000000"/>
                     </a:solidFill>
@@ -17665,7 +17665,7 @@
               </a:ln>
               <a:extLst>
                 <a:ext uri="{91240B29-F687-4f45-9708-019B960494DF}">
-                  <a14:hiddenLine xmlns="" xmlns:a14="http://schemas.microsoft.com/office/drawing/2010/main" w="9525">
+                  <a14:hiddenLine xmlns:a14="http://schemas.microsoft.com/office/drawing/2010/main" xmlns="" w="9525">
                     <a:solidFill>
                       <a:srgbClr val="000000"/>
                     </a:solidFill>
@@ -17727,7 +17727,7 @@
               </a:ln>
               <a:extLst>
                 <a:ext uri="{91240B29-F687-4f45-9708-019B960494DF}">
-                  <a14:hiddenLine xmlns="" xmlns:a14="http://schemas.microsoft.com/office/drawing/2010/main" w="9525">
+                  <a14:hiddenLine xmlns:a14="http://schemas.microsoft.com/office/drawing/2010/main" xmlns="" w="9525">
                     <a:solidFill>
                       <a:srgbClr val="000000"/>
                     </a:solidFill>
@@ -17837,7 +17837,7 @@
               </a:ln>
               <a:extLst>
                 <a:ext uri="{91240B29-F687-4f45-9708-019B960494DF}">
-                  <a14:hiddenLine xmlns="" xmlns:a14="http://schemas.microsoft.com/office/drawing/2010/main" w="9525">
+                  <a14:hiddenLine xmlns:a14="http://schemas.microsoft.com/office/drawing/2010/main" xmlns="" w="9525">
                     <a:solidFill>
                       <a:srgbClr val="000000"/>
                     </a:solidFill>
@@ -17921,7 +17921,7 @@
               </a:ln>
               <a:extLst>
                 <a:ext uri="{91240B29-F687-4f45-9708-019B960494DF}">
-                  <a14:hiddenLine xmlns="" xmlns:a14="http://schemas.microsoft.com/office/drawing/2010/main" w="9525">
+                  <a14:hiddenLine xmlns:a14="http://schemas.microsoft.com/office/drawing/2010/main" xmlns="" w="9525">
                     <a:solidFill>
                       <a:srgbClr val="000000"/>
                     </a:solidFill>
@@ -17983,7 +17983,7 @@
               </a:ln>
               <a:extLst>
                 <a:ext uri="{91240B29-F687-4f45-9708-019B960494DF}">
-                  <a14:hiddenLine xmlns="" xmlns:a14="http://schemas.microsoft.com/office/drawing/2010/main" w="9525">
+                  <a14:hiddenLine xmlns:a14="http://schemas.microsoft.com/office/drawing/2010/main" xmlns="" w="9525">
                     <a:solidFill>
                       <a:srgbClr val="000000"/>
                     </a:solidFill>
@@ -18045,7 +18045,7 @@
               </a:ln>
               <a:extLst>
                 <a:ext uri="{91240B29-F687-4f45-9708-019B960494DF}">
-                  <a14:hiddenLine xmlns="" xmlns:a14="http://schemas.microsoft.com/office/drawing/2010/main" w="9525">
+                  <a14:hiddenLine xmlns:a14="http://schemas.microsoft.com/office/drawing/2010/main" xmlns="" w="9525">
                     <a:solidFill>
                       <a:srgbClr val="000000"/>
                     </a:solidFill>
@@ -18135,7 +18135,7 @@
               </a:ln>
               <a:extLst>
                 <a:ext uri="{91240B29-F687-4f45-9708-019B960494DF}">
-                  <a14:hiddenLine xmlns="" xmlns:a14="http://schemas.microsoft.com/office/drawing/2010/main" w="9525">
+                  <a14:hiddenLine xmlns:a14="http://schemas.microsoft.com/office/drawing/2010/main" xmlns="" w="9525">
                     <a:solidFill>
                       <a:srgbClr val="000000"/>
                     </a:solidFill>
@@ -18169,7 +18169,7 @@
               </a:ln>
               <a:extLst>
                 <a:ext uri="{91240B29-F687-4f45-9708-019B960494DF}">
-                  <a14:hiddenLine xmlns="" xmlns:a14="http://schemas.microsoft.com/office/drawing/2010/main" w="9525">
+                  <a14:hiddenLine xmlns:a14="http://schemas.microsoft.com/office/drawing/2010/main" xmlns="" w="9525">
                     <a:solidFill>
                       <a:srgbClr val="000000"/>
                     </a:solidFill>
@@ -18234,7 +18234,7 @@
               </a:ln>
               <a:extLst>
                 <a:ext uri="{91240B29-F687-4f45-9708-019B960494DF}">
-                  <a14:hiddenLine xmlns="" xmlns:a14="http://schemas.microsoft.com/office/drawing/2010/main" w="9525">
+                  <a14:hiddenLine xmlns:a14="http://schemas.microsoft.com/office/drawing/2010/main" xmlns="" w="9525">
                     <a:solidFill>
                       <a:srgbClr val="000000"/>
                     </a:solidFill>
@@ -18324,7 +18324,7 @@
               </a:ln>
               <a:extLst>
                 <a:ext uri="{91240B29-F687-4f45-9708-019B960494DF}">
-                  <a14:hiddenLine xmlns="" xmlns:a14="http://schemas.microsoft.com/office/drawing/2010/main" w="9525">
+                  <a14:hiddenLine xmlns:a14="http://schemas.microsoft.com/office/drawing/2010/main" xmlns="" w="9525">
                     <a:solidFill>
                       <a:srgbClr val="000000"/>
                     </a:solidFill>
@@ -18386,7 +18386,7 @@
               </a:ln>
               <a:extLst>
                 <a:ext uri="{91240B29-F687-4f45-9708-019B960494DF}">
-                  <a14:hiddenLine xmlns="" xmlns:a14="http://schemas.microsoft.com/office/drawing/2010/main" w="9525">
+                  <a14:hiddenLine xmlns:a14="http://schemas.microsoft.com/office/drawing/2010/main" xmlns="" w="9525">
                     <a:solidFill>
                       <a:srgbClr val="000000"/>
                     </a:solidFill>
@@ -18476,7 +18476,7 @@
               </a:ln>
               <a:extLst>
                 <a:ext uri="{91240B29-F687-4f45-9708-019B960494DF}">
-                  <a14:hiddenLine xmlns="" xmlns:a14="http://schemas.microsoft.com/office/drawing/2010/main" w="9525">
+                  <a14:hiddenLine xmlns:a14="http://schemas.microsoft.com/office/drawing/2010/main" xmlns="" w="9525">
                     <a:solidFill>
                       <a:srgbClr val="000000"/>
                     </a:solidFill>
@@ -18541,7 +18541,7 @@
               </a:ln>
               <a:extLst>
                 <a:ext uri="{91240B29-F687-4f45-9708-019B960494DF}">
-                  <a14:hiddenLine xmlns="" xmlns:a14="http://schemas.microsoft.com/office/drawing/2010/main" w="9525">
+                  <a14:hiddenLine xmlns:a14="http://schemas.microsoft.com/office/drawing/2010/main" xmlns="" w="9525">
                     <a:solidFill>
                       <a:srgbClr val="000000"/>
                     </a:solidFill>
@@ -18603,7 +18603,7 @@
               </a:ln>
               <a:extLst>
                 <a:ext uri="{91240B29-F687-4f45-9708-019B960494DF}">
-                  <a14:hiddenLine xmlns="" xmlns:a14="http://schemas.microsoft.com/office/drawing/2010/main" w="9525">
+                  <a14:hiddenLine xmlns:a14="http://schemas.microsoft.com/office/drawing/2010/main" xmlns="" w="9525">
                     <a:solidFill>
                       <a:srgbClr val="000000"/>
                     </a:solidFill>
@@ -18693,7 +18693,7 @@
               </a:ln>
               <a:extLst>
                 <a:ext uri="{91240B29-F687-4f45-9708-019B960494DF}">
-                  <a14:hiddenLine xmlns="" xmlns:a14="http://schemas.microsoft.com/office/drawing/2010/main" w="9525">
+                  <a14:hiddenLine xmlns:a14="http://schemas.microsoft.com/office/drawing/2010/main" xmlns="" w="9525">
                     <a:solidFill>
                       <a:srgbClr val="000000"/>
                     </a:solidFill>
@@ -18783,7 +18783,7 @@
               </a:ln>
               <a:extLst>
                 <a:ext uri="{91240B29-F687-4f45-9708-019B960494DF}">
-                  <a14:hiddenLine xmlns="" xmlns:a14="http://schemas.microsoft.com/office/drawing/2010/main" w="9525">
+                  <a14:hiddenLine xmlns:a14="http://schemas.microsoft.com/office/drawing/2010/main" xmlns="" w="9525">
                     <a:solidFill>
                       <a:srgbClr val="000000"/>
                     </a:solidFill>
@@ -18848,7 +18848,7 @@
               </a:ln>
               <a:extLst>
                 <a:ext uri="{91240B29-F687-4f45-9708-019B960494DF}">
-                  <a14:hiddenLine xmlns="" xmlns:a14="http://schemas.microsoft.com/office/drawing/2010/main" w="9525">
+                  <a14:hiddenLine xmlns:a14="http://schemas.microsoft.com/office/drawing/2010/main" xmlns="" w="9525">
                     <a:solidFill>
                       <a:srgbClr val="000000"/>
                     </a:solidFill>
@@ -18968,7 +18968,7 @@
               </a:ln>
               <a:extLst>
                 <a:ext uri="{91240B29-F687-4f45-9708-019B960494DF}">
-                  <a14:hiddenLine xmlns="" xmlns:a14="http://schemas.microsoft.com/office/drawing/2010/main" w="9525">
+                  <a14:hiddenLine xmlns:a14="http://schemas.microsoft.com/office/drawing/2010/main" xmlns="" w="9525">
                     <a:solidFill>
                       <a:srgbClr val="000000"/>
                     </a:solidFill>
@@ -19066,7 +19066,7 @@
               </a:ln>
               <a:extLst>
                 <a:ext uri="{91240B29-F687-4f45-9708-019B960494DF}">
-                  <a14:hiddenLine xmlns="" xmlns:a14="http://schemas.microsoft.com/office/drawing/2010/main" w="9525">
+                  <a14:hiddenLine xmlns:a14="http://schemas.microsoft.com/office/drawing/2010/main" xmlns="" w="9525">
                     <a:solidFill>
                       <a:srgbClr val="000000"/>
                     </a:solidFill>
@@ -19181,7 +19181,7 @@
               </a:ln>
               <a:extLst>
                 <a:ext uri="{91240B29-F687-4f45-9708-019B960494DF}">
-                  <a14:hiddenLine xmlns="" xmlns:a14="http://schemas.microsoft.com/office/drawing/2010/main" w="9525">
+                  <a14:hiddenLine xmlns:a14="http://schemas.microsoft.com/office/drawing/2010/main" xmlns="" w="9525">
                     <a:solidFill>
                       <a:srgbClr val="000000"/>
                     </a:solidFill>
@@ -19271,7 +19271,7 @@
               </a:ln>
               <a:extLst>
                 <a:ext uri="{91240B29-F687-4f45-9708-019B960494DF}">
-                  <a14:hiddenLine xmlns="" xmlns:a14="http://schemas.microsoft.com/office/drawing/2010/main" w="9525">
+                  <a14:hiddenLine xmlns:a14="http://schemas.microsoft.com/office/drawing/2010/main" xmlns="" w="9525">
                     <a:solidFill>
                       <a:srgbClr val="000000"/>
                     </a:solidFill>
@@ -19336,7 +19336,7 @@
               </a:ln>
               <a:extLst>
                 <a:ext uri="{91240B29-F687-4f45-9708-019B960494DF}">
-                  <a14:hiddenLine xmlns="" xmlns:a14="http://schemas.microsoft.com/office/drawing/2010/main" w="9525">
+                  <a14:hiddenLine xmlns:a14="http://schemas.microsoft.com/office/drawing/2010/main" xmlns="" w="9525">
                     <a:solidFill>
                       <a:srgbClr val="000000"/>
                     </a:solidFill>
@@ -19426,7 +19426,7 @@
               </a:ln>
               <a:extLst>
                 <a:ext uri="{91240B29-F687-4f45-9708-019B960494DF}">
-                  <a14:hiddenLine xmlns="" xmlns:a14="http://schemas.microsoft.com/office/drawing/2010/main" w="9525">
+                  <a14:hiddenLine xmlns:a14="http://schemas.microsoft.com/office/drawing/2010/main" xmlns="" w="9525">
                     <a:solidFill>
                       <a:srgbClr val="000000"/>
                     </a:solidFill>
@@ -19494,7 +19494,7 @@
               </a:ln>
               <a:extLst>
                 <a:ext uri="{91240B29-F687-4f45-9708-019B960494DF}">
-                  <a14:hiddenLine xmlns="" xmlns:a14="http://schemas.microsoft.com/office/drawing/2010/main" w="9525">
+                  <a14:hiddenLine xmlns:a14="http://schemas.microsoft.com/office/drawing/2010/main" xmlns="" w="9525">
                     <a:solidFill>
                       <a:srgbClr val="000000"/>
                     </a:solidFill>
@@ -19584,7 +19584,7 @@
               </a:ln>
               <a:extLst>
                 <a:ext uri="{91240B29-F687-4f45-9708-019B960494DF}">
-                  <a14:hiddenLine xmlns="" xmlns:a14="http://schemas.microsoft.com/office/drawing/2010/main" w="9525">
+                  <a14:hiddenLine xmlns:a14="http://schemas.microsoft.com/office/drawing/2010/main" xmlns="" w="9525">
                     <a:solidFill>
                       <a:srgbClr val="000000"/>
                     </a:solidFill>
@@ -19652,7 +19652,7 @@
               </a:ln>
               <a:extLst>
                 <a:ext uri="{91240B29-F687-4f45-9708-019B960494DF}">
-                  <a14:hiddenLine xmlns="" xmlns:a14="http://schemas.microsoft.com/office/drawing/2010/main" w="9525">
+                  <a14:hiddenLine xmlns:a14="http://schemas.microsoft.com/office/drawing/2010/main" xmlns="" w="9525">
                     <a:solidFill>
                       <a:srgbClr val="000000"/>
                     </a:solidFill>
@@ -19742,7 +19742,7 @@
               </a:ln>
               <a:extLst>
                 <a:ext uri="{91240B29-F687-4f45-9708-019B960494DF}">
-                  <a14:hiddenLine xmlns="" xmlns:a14="http://schemas.microsoft.com/office/drawing/2010/main" w="9525">
+                  <a14:hiddenLine xmlns:a14="http://schemas.microsoft.com/office/drawing/2010/main" xmlns="" w="9525">
                     <a:solidFill>
                       <a:srgbClr val="000000"/>
                     </a:solidFill>
@@ -19776,7 +19776,7 @@
               </a:ln>
               <a:extLst>
                 <a:ext uri="{91240B29-F687-4f45-9708-019B960494DF}">
-                  <a14:hiddenLine xmlns="" xmlns:a14="http://schemas.microsoft.com/office/drawing/2010/main" w="9525">
+                  <a14:hiddenLine xmlns:a14="http://schemas.microsoft.com/office/drawing/2010/main" xmlns="" w="9525">
                     <a:solidFill>
                       <a:srgbClr val="000000"/>
                     </a:solidFill>
@@ -19913,7 +19913,7 @@
           <a:p>
             <a:r>
               <a:rPr lang="en-US"/>
-              <a:t>https://lenp.net/presentations/</a:t>
+              <a:t>Len Popp – https://lenp.net/presentations/</a:t>
             </a:r>
             <a:endParaRPr lang="en-US" dirty="0"/>
           </a:p>
@@ -20995,7 +20995,7 @@
           <a:p>
             <a:r>
               <a:rPr lang="en-US"/>
-              <a:t>https://lenp.net/presentations/</a:t>
+              <a:t>Len Popp – https://lenp.net/presentations/</a:t>
             </a:r>
             <a:endParaRPr lang="en-US" dirty="0"/>
           </a:p>
@@ -21415,7 +21415,7 @@
           <a:p>
             <a:r>
               <a:rPr lang="en-CA"/>
-              <a:t>https://lenp.net/presentations/</a:t>
+              <a:t>Len Popp – https://lenp.net/presentations/</a:t>
             </a:r>
           </a:p>
         </p:txBody>
@@ -21641,7 +21641,7 @@
           <a:p>
             <a:r>
               <a:rPr lang="en-CA"/>
-              <a:t>https://lenp.net/presentations/</a:t>
+              <a:t>Len Popp – https://lenp.net/presentations/</a:t>
             </a:r>
           </a:p>
         </p:txBody>
@@ -21834,7 +21834,7 @@
           <a:p>
             <a:r>
               <a:rPr lang="en-CA"/>
-              <a:t>https://lenp.net/presentations/</a:t>
+              <a:t>Len Popp – https://lenp.net/presentations/</a:t>
             </a:r>
           </a:p>
         </p:txBody>
@@ -22089,7 +22089,7 @@
           <a:p>
             <a:r>
               <a:rPr lang="en-CA"/>
-              <a:t>https://lenp.net/presentations/</a:t>
+              <a:t>Len Popp – https://lenp.net/presentations/</a:t>
             </a:r>
           </a:p>
         </p:txBody>
@@ -22859,7 +22859,7 @@
           <a:p>
             <a:r>
               <a:rPr lang="en-CA"/>
-              <a:t>https://lenp.net/presentations/</a:t>
+              <a:t>Len Popp – https://lenp.net/presentations/</a:t>
             </a:r>
           </a:p>
         </p:txBody>
@@ -23581,7 +23581,7 @@
           <a:p>
             <a:r>
               <a:rPr lang="en-CA"/>
-              <a:t>https://lenp.net/presentations/</a:t>
+              <a:t>Len Popp – https://lenp.net/presentations/</a:t>
             </a:r>
           </a:p>
         </p:txBody>
@@ -23841,7 +23841,7 @@
           <a:p>
             <a:r>
               <a:rPr lang="en-CA"/>
-              <a:t>https://lenp.net/presentations/</a:t>
+              <a:t>Len Popp – https://lenp.net/presentations/</a:t>
             </a:r>
           </a:p>
         </p:txBody>
@@ -24080,7 +24080,7 @@
           <a:p>
             <a:r>
               <a:rPr lang="en-CA"/>
-              <a:t>https://lenp.net/presentations/</a:t>
+              <a:t>Len Popp – https://lenp.net/presentations/</a:t>
             </a:r>
           </a:p>
         </p:txBody>
@@ -25079,9 +25079,10 @@
           <a:lstStyle/>
           <a:p>
             <a:r>
-              <a:rPr lang="en-CA" dirty="0"/>
-              <a:t>https://lenp.net/presentations/</a:t>
-            </a:r>
+              <a:rPr lang="en-CA"/>
+              <a:t>Len Popp – https://lenp.net/presentations/</a:t>
+            </a:r>
+            <a:endParaRPr lang="en-CA" dirty="0"/>
           </a:p>
         </p:txBody>
       </p:sp>
@@ -25395,7 +25396,7 @@
           <a:p>
             <a:r>
               <a:rPr lang="en-US"/>
-              <a:t>https://lenp.net/presentations/</a:t>
+              <a:t>Len Popp – https://lenp.net/presentations/</a:t>
             </a:r>
             <a:endParaRPr lang="en-US" dirty="0"/>
           </a:p>
@@ -25803,7 +25804,7 @@
           <a:p>
             <a:r>
               <a:rPr lang="en-US"/>
-              <a:t>https://lenp.net/presentations/</a:t>
+              <a:t>Len Popp – https://lenp.net/presentations/</a:t>
             </a:r>
             <a:endParaRPr lang="en-US" dirty="0"/>
           </a:p>
@@ -26349,7 +26350,7 @@
           <a:p>
             <a:r>
               <a:rPr lang="en-CA"/>
-              <a:t>https://lenp.net/presentations/</a:t>
+              <a:t>Len Popp – https://lenp.net/presentations/</a:t>
             </a:r>
           </a:p>
         </p:txBody>
@@ -27355,7 +27356,7 @@
           <a:p>
             <a:r>
               <a:rPr lang="en-CA"/>
-              <a:t>https://lenp.net/presentations/</a:t>
+              <a:t>Len Popp – https://lenp.net/presentations/</a:t>
             </a:r>
           </a:p>
         </p:txBody>
@@ -27842,7 +27843,7 @@
           <a:p>
             <a:r>
               <a:rPr lang="en-CA"/>
-              <a:t>https://lenp.net/presentations/</a:t>
+              <a:t>Len Popp – https://lenp.net/presentations/</a:t>
             </a:r>
           </a:p>
         </p:txBody>
@@ -29161,7 +29162,7 @@
           <a:p>
             <a:r>
               <a:rPr lang="en-CA"/>
-              <a:t>https://lenp.net/presentations/</a:t>
+              <a:t>Len Popp – https://lenp.net/presentations/</a:t>
             </a:r>
           </a:p>
         </p:txBody>
@@ -29391,7 +29392,7 @@
           <a:p>
             <a:r>
               <a:rPr lang="en-CA"/>
-              <a:t>https://lenp.net/presentations/</a:t>
+              <a:t>Len Popp – https://lenp.net/presentations/</a:t>
             </a:r>
           </a:p>
         </p:txBody>
@@ -29884,7 +29885,7 @@
           <a:p>
             <a:r>
               <a:rPr lang="en-CA"/>
-              <a:t>https://lenp.net/presentations/</a:t>
+              <a:t>Len Popp – https://lenp.net/presentations/</a:t>
             </a:r>
           </a:p>
         </p:txBody>
@@ -30699,7 +30700,7 @@
           <a:p>
             <a:r>
               <a:rPr lang="en-CA"/>
-              <a:t>https://lenp.net/presentations/</a:t>
+              <a:t>Len Popp – https://lenp.net/presentations/</a:t>
             </a:r>
           </a:p>
         </p:txBody>
@@ -30897,7 +30898,7 @@
           <a:p>
             <a:r>
               <a:rPr lang="en-US"/>
-              <a:t>https://lenp.net/presentations/</a:t>
+              <a:t>Len Popp – https://lenp.net/presentations/</a:t>
             </a:r>
             <a:endParaRPr lang="en-US" dirty="0"/>
           </a:p>
@@ -31129,7 +31130,7 @@
           <a:p>
             <a:r>
               <a:rPr lang="en-US"/>
-              <a:t>https://lenp.net/presentations/</a:t>
+              <a:t>Len Popp – https://lenp.net/presentations/</a:t>
             </a:r>
             <a:endParaRPr lang="en-US" dirty="0"/>
           </a:p>
@@ -31332,7 +31333,7 @@
           <a:p>
             <a:r>
               <a:rPr lang="en-CA"/>
-              <a:t>https://lenp.net/presentations/</a:t>
+              <a:t>Len Popp – https://lenp.net/presentations/</a:t>
             </a:r>
           </a:p>
         </p:txBody>
@@ -31520,13 +31521,18 @@
           <a:lstStyle/>
           <a:p>
             <a:r>
-              <a:rPr lang="en-CA" dirty="0">
+              <a:rPr lang="en-CA">
                 <a:solidFill>
                   <a:schemeClr val="bg2"/>
                 </a:solidFill>
               </a:rPr>
-              <a:t>https://lenp.net/presentations/</a:t>
-            </a:r>
+              <a:t>Len Popp – https://lenp.net/presentations/</a:t>
+            </a:r>
+            <a:endParaRPr lang="en-CA" dirty="0">
+              <a:solidFill>
+                <a:schemeClr val="bg2"/>
+              </a:solidFill>
+            </a:endParaRPr>
           </a:p>
         </p:txBody>
       </p:sp>
@@ -32370,7 +32376,7 @@
           <a:p>
             <a:r>
               <a:rPr lang="en-CA"/>
-              <a:t>https://lenp.net/presentations/</a:t>
+              <a:t>Len Popp – https://lenp.net/presentations/</a:t>
             </a:r>
           </a:p>
         </p:txBody>
@@ -32659,7 +32665,7 @@
           <a:p>
             <a:r>
               <a:rPr lang="en-CA"/>
-              <a:t>https://lenp.net/presentations/</a:t>
+              <a:t>Len Popp – https://lenp.net/presentations/</a:t>
             </a:r>
           </a:p>
         </p:txBody>
@@ -33111,7 +33117,7 @@
           <a:p>
             <a:r>
               <a:rPr lang="en-CA"/>
-              <a:t>https://lenp.net/presentations/</a:t>
+              <a:t>Len Popp – https://lenp.net/presentations/</a:t>
             </a:r>
           </a:p>
         </p:txBody>
@@ -33303,7 +33309,7 @@
           <a:p>
             <a:r>
               <a:rPr lang="en-CA"/>
-              <a:t>https://lenp.net/presentations/</a:t>
+              <a:t>Len Popp – https://lenp.net/presentations/</a:t>
             </a:r>
           </a:p>
         </p:txBody>

</xml_diff>

<commit_message>
MakeVersionInfo: Null-terminate the slide deck (thanks J. McNellis)
</commit_message>
<xml_diff>
--- a/MakeVersionInfo/MakeVersionInfo.pptx
+++ b/MakeVersionInfo/MakeVersionInfo.pptx
@@ -3347,7 +3347,7 @@
           <a:p>
             <a:fld id="{857CC94D-E614-4874-A919-F25B27309A09}" type="datetimeFigureOut">
               <a:rPr lang="en-CA" smtClean="0"/>
-              <a:t>2024-09-28</a:t>
+              <a:t>2025-01-05</a:t>
             </a:fld>
             <a:endParaRPr lang="en-CA"/>
           </a:p>
@@ -5812,7 +5812,7 @@
           <a:bodyPr/>
           <a:lstStyle/>
           <a:p>
-            <a:endParaRPr lang="en-CA"/>
+            <a:endParaRPr lang="en-CA" dirty="0"/>
           </a:p>
         </p:txBody>
       </p:sp>
@@ -6737,7 +6737,7 @@
           <a:noFill/>
           <a:extLst>
             <a:ext uri="{909E8E84-426E-40dd-AFC4-6F175D3DCCD1}">
-              <a14:hiddenFill xmlns:a14="http://schemas.microsoft.com/office/drawing/2010/main" xmlns="">
+              <a14:hiddenFill xmlns="" xmlns:a14="http://schemas.microsoft.com/office/drawing/2010/main">
                 <a:solidFill>
                   <a:srgbClr val="FFFFFF"/>
                 </a:solidFill>
@@ -6803,7 +6803,7 @@
             </a:ln>
             <a:extLst>
               <a:ext uri="{91240B29-F687-4f45-9708-019B960494DF}">
-                <a14:hiddenLine xmlns:a14="http://schemas.microsoft.com/office/drawing/2010/main" xmlns="" w="9525">
+                <a14:hiddenLine xmlns="" xmlns:a14="http://schemas.microsoft.com/office/drawing/2010/main" w="9525">
                   <a:solidFill>
                     <a:srgbClr val="000000"/>
                   </a:solidFill>
@@ -6893,7 +6893,7 @@
             </a:ln>
             <a:extLst>
               <a:ext uri="{91240B29-F687-4f45-9708-019B960494DF}">
-                <a14:hiddenLine xmlns:a14="http://schemas.microsoft.com/office/drawing/2010/main" xmlns="" w="9525">
+                <a14:hiddenLine xmlns="" xmlns:a14="http://schemas.microsoft.com/office/drawing/2010/main" w="9525">
                   <a:solidFill>
                     <a:srgbClr val="000000"/>
                   </a:solidFill>
@@ -6983,7 +6983,7 @@
             </a:ln>
             <a:extLst>
               <a:ext uri="{91240B29-F687-4f45-9708-019B960494DF}">
-                <a14:hiddenLine xmlns:a14="http://schemas.microsoft.com/office/drawing/2010/main" xmlns="" w="9525">
+                <a14:hiddenLine xmlns="" xmlns:a14="http://schemas.microsoft.com/office/drawing/2010/main" w="9525">
                   <a:solidFill>
                     <a:srgbClr val="000000"/>
                   </a:solidFill>
@@ -7017,7 +7017,7 @@
             </a:ln>
             <a:extLst>
               <a:ext uri="{91240B29-F687-4f45-9708-019B960494DF}">
-                <a14:hiddenLine xmlns:a14="http://schemas.microsoft.com/office/drawing/2010/main" xmlns="" w="9525">
+                <a14:hiddenLine xmlns="" xmlns:a14="http://schemas.microsoft.com/office/drawing/2010/main" w="9525">
                   <a:solidFill>
                     <a:srgbClr val="000000"/>
                   </a:solidFill>
@@ -7107,7 +7107,7 @@
             </a:ln>
             <a:extLst>
               <a:ext uri="{91240B29-F687-4f45-9708-019B960494DF}">
-                <a14:hiddenLine xmlns:a14="http://schemas.microsoft.com/office/drawing/2010/main" xmlns="" w="9525">
+                <a14:hiddenLine xmlns="" xmlns:a14="http://schemas.microsoft.com/office/drawing/2010/main" w="9525">
                   <a:solidFill>
                     <a:srgbClr val="000000"/>
                   </a:solidFill>
@@ -7169,7 +7169,7 @@
             </a:ln>
             <a:extLst>
               <a:ext uri="{91240B29-F687-4f45-9708-019B960494DF}">
-                <a14:hiddenLine xmlns:a14="http://schemas.microsoft.com/office/drawing/2010/main" xmlns="" w="9525">
+                <a14:hiddenLine xmlns="" xmlns:a14="http://schemas.microsoft.com/office/drawing/2010/main" w="9525">
                   <a:solidFill>
                     <a:srgbClr val="000000"/>
                   </a:solidFill>
@@ -7231,7 +7231,7 @@
             </a:ln>
             <a:extLst>
               <a:ext uri="{91240B29-F687-4f45-9708-019B960494DF}">
-                <a14:hiddenLine xmlns:a14="http://schemas.microsoft.com/office/drawing/2010/main" xmlns="" w="9525">
+                <a14:hiddenLine xmlns="" xmlns:a14="http://schemas.microsoft.com/office/drawing/2010/main" w="9525">
                   <a:solidFill>
                     <a:srgbClr val="000000"/>
                   </a:solidFill>
@@ -7321,7 +7321,7 @@
             </a:ln>
             <a:extLst>
               <a:ext uri="{91240B29-F687-4f45-9708-019B960494DF}">
-                <a14:hiddenLine xmlns:a14="http://schemas.microsoft.com/office/drawing/2010/main" xmlns="" w="9525">
+                <a14:hiddenLine xmlns="" xmlns:a14="http://schemas.microsoft.com/office/drawing/2010/main" w="9525">
                   <a:solidFill>
                     <a:srgbClr val="000000"/>
                   </a:solidFill>
@@ -7383,7 +7383,7 @@
             </a:ln>
             <a:extLst>
               <a:ext uri="{91240B29-F687-4f45-9708-019B960494DF}">
-                <a14:hiddenLine xmlns:a14="http://schemas.microsoft.com/office/drawing/2010/main" xmlns="" w="9525">
+                <a14:hiddenLine xmlns="" xmlns:a14="http://schemas.microsoft.com/office/drawing/2010/main" w="9525">
                   <a:solidFill>
                     <a:srgbClr val="000000"/>
                   </a:solidFill>
@@ -7445,7 +7445,7 @@
             </a:ln>
             <a:extLst>
               <a:ext uri="{91240B29-F687-4f45-9708-019B960494DF}">
-                <a14:hiddenLine xmlns:a14="http://schemas.microsoft.com/office/drawing/2010/main" xmlns="" w="9525">
+                <a14:hiddenLine xmlns="" xmlns:a14="http://schemas.microsoft.com/office/drawing/2010/main" w="9525">
                   <a:solidFill>
                     <a:srgbClr val="000000"/>
                   </a:solidFill>
@@ -7535,7 +7535,7 @@
             </a:ln>
             <a:extLst>
               <a:ext uri="{91240B29-F687-4f45-9708-019B960494DF}">
-                <a14:hiddenLine xmlns:a14="http://schemas.microsoft.com/office/drawing/2010/main" xmlns="" w="9525">
+                <a14:hiddenLine xmlns="" xmlns:a14="http://schemas.microsoft.com/office/drawing/2010/main" w="9525">
                   <a:solidFill>
                     <a:srgbClr val="000000"/>
                   </a:solidFill>
@@ -7625,7 +7625,7 @@
             </a:ln>
             <a:extLst>
               <a:ext uri="{91240B29-F687-4f45-9708-019B960494DF}">
-                <a14:hiddenLine xmlns:a14="http://schemas.microsoft.com/office/drawing/2010/main" xmlns="" w="9525">
+                <a14:hiddenLine xmlns="" xmlns:a14="http://schemas.microsoft.com/office/drawing/2010/main" w="9525">
                   <a:solidFill>
                     <a:srgbClr val="000000"/>
                   </a:solidFill>
@@ -7687,7 +7687,7 @@
             </a:ln>
             <a:extLst>
               <a:ext uri="{91240B29-F687-4f45-9708-019B960494DF}">
-                <a14:hiddenLine xmlns:a14="http://schemas.microsoft.com/office/drawing/2010/main" xmlns="" w="9525">
+                <a14:hiddenLine xmlns="" xmlns:a14="http://schemas.microsoft.com/office/drawing/2010/main" w="9525">
                   <a:solidFill>
                     <a:srgbClr val="000000"/>
                   </a:solidFill>
@@ -7797,7 +7797,7 @@
             </a:ln>
             <a:extLst>
               <a:ext uri="{91240B29-F687-4f45-9708-019B960494DF}">
-                <a14:hiddenLine xmlns:a14="http://schemas.microsoft.com/office/drawing/2010/main" xmlns="" w="9525">
+                <a14:hiddenLine xmlns="" xmlns:a14="http://schemas.microsoft.com/office/drawing/2010/main" w="9525">
                   <a:solidFill>
                     <a:srgbClr val="000000"/>
                   </a:solidFill>
@@ -7859,7 +7859,7 @@
             </a:ln>
             <a:extLst>
               <a:ext uri="{91240B29-F687-4f45-9708-019B960494DF}">
-                <a14:hiddenLine xmlns:a14="http://schemas.microsoft.com/office/drawing/2010/main" xmlns="" w="9525">
+                <a14:hiddenLine xmlns="" xmlns:a14="http://schemas.microsoft.com/office/drawing/2010/main" w="9525">
                   <a:solidFill>
                     <a:srgbClr val="000000"/>
                   </a:solidFill>
@@ -7949,7 +7949,7 @@
             </a:ln>
             <a:extLst>
               <a:ext uri="{91240B29-F687-4f45-9708-019B960494DF}">
-                <a14:hiddenLine xmlns:a14="http://schemas.microsoft.com/office/drawing/2010/main" xmlns="" w="9525">
+                <a14:hiddenLine xmlns="" xmlns:a14="http://schemas.microsoft.com/office/drawing/2010/main" w="9525">
                   <a:solidFill>
                     <a:srgbClr val="000000"/>
                   </a:solidFill>
@@ -8039,7 +8039,7 @@
             </a:ln>
             <a:extLst>
               <a:ext uri="{91240B29-F687-4f45-9708-019B960494DF}">
-                <a14:hiddenLine xmlns:a14="http://schemas.microsoft.com/office/drawing/2010/main" xmlns="" w="9525">
+                <a14:hiddenLine xmlns="" xmlns:a14="http://schemas.microsoft.com/office/drawing/2010/main" w="9525">
                   <a:solidFill>
                     <a:srgbClr val="000000"/>
                   </a:solidFill>
@@ -8101,7 +8101,7 @@
             </a:ln>
             <a:extLst>
               <a:ext uri="{91240B29-F687-4f45-9708-019B960494DF}">
-                <a14:hiddenLine xmlns:a14="http://schemas.microsoft.com/office/drawing/2010/main" xmlns="" w="9525">
+                <a14:hiddenLine xmlns="" xmlns:a14="http://schemas.microsoft.com/office/drawing/2010/main" w="9525">
                   <a:solidFill>
                     <a:srgbClr val="000000"/>
                   </a:solidFill>
@@ -8191,7 +8191,7 @@
             </a:ln>
             <a:extLst>
               <a:ext uri="{91240B29-F687-4f45-9708-019B960494DF}">
-                <a14:hiddenLine xmlns:a14="http://schemas.microsoft.com/office/drawing/2010/main" xmlns="" w="9525">
+                <a14:hiddenLine xmlns="" xmlns:a14="http://schemas.microsoft.com/office/drawing/2010/main" w="9525">
                   <a:solidFill>
                     <a:srgbClr val="000000"/>
                   </a:solidFill>
@@ -8281,7 +8281,7 @@
             </a:ln>
             <a:extLst>
               <a:ext uri="{91240B29-F687-4f45-9708-019B960494DF}">
-                <a14:hiddenLine xmlns:a14="http://schemas.microsoft.com/office/drawing/2010/main" xmlns="" w="9525">
+                <a14:hiddenLine xmlns="" xmlns:a14="http://schemas.microsoft.com/office/drawing/2010/main" w="9525">
                   <a:solidFill>
                     <a:srgbClr val="000000"/>
                   </a:solidFill>
@@ -8337,7 +8337,7 @@
             </a:ln>
             <a:extLst>
               <a:ext uri="{91240B29-F687-4f45-9708-019B960494DF}">
-                <a14:hiddenLine xmlns:a14="http://schemas.microsoft.com/office/drawing/2010/main" xmlns="" w="9525">
+                <a14:hiddenLine xmlns="" xmlns:a14="http://schemas.microsoft.com/office/drawing/2010/main" w="9525">
                   <a:solidFill>
                     <a:srgbClr val="000000"/>
                   </a:solidFill>
@@ -8427,7 +8427,7 @@
             </a:ln>
             <a:extLst>
               <a:ext uri="{91240B29-F687-4f45-9708-019B960494DF}">
-                <a14:hiddenLine xmlns:a14="http://schemas.microsoft.com/office/drawing/2010/main" xmlns="" w="9525">
+                <a14:hiddenLine xmlns="" xmlns:a14="http://schemas.microsoft.com/office/drawing/2010/main" w="9525">
                   <a:solidFill>
                     <a:srgbClr val="000000"/>
                   </a:solidFill>
@@ -8483,7 +8483,7 @@
             </a:ln>
             <a:extLst>
               <a:ext uri="{91240B29-F687-4f45-9708-019B960494DF}">
-                <a14:hiddenLine xmlns:a14="http://schemas.microsoft.com/office/drawing/2010/main" xmlns="" w="9525">
+                <a14:hiddenLine xmlns="" xmlns:a14="http://schemas.microsoft.com/office/drawing/2010/main" w="9525">
                   <a:solidFill>
                     <a:srgbClr val="000000"/>
                   </a:solidFill>
@@ -8573,7 +8573,7 @@
             </a:ln>
             <a:extLst>
               <a:ext uri="{91240B29-F687-4f45-9708-019B960494DF}">
-                <a14:hiddenLine xmlns:a14="http://schemas.microsoft.com/office/drawing/2010/main" xmlns="" w="9525">
+                <a14:hiddenLine xmlns="" xmlns:a14="http://schemas.microsoft.com/office/drawing/2010/main" w="9525">
                   <a:solidFill>
                     <a:srgbClr val="000000"/>
                   </a:solidFill>
@@ -8641,7 +8641,7 @@
             </a:ln>
             <a:extLst>
               <a:ext uri="{91240B29-F687-4f45-9708-019B960494DF}">
-                <a14:hiddenLine xmlns:a14="http://schemas.microsoft.com/office/drawing/2010/main" xmlns="" w="9525">
+                <a14:hiddenLine xmlns="" xmlns:a14="http://schemas.microsoft.com/office/drawing/2010/main" w="9525">
                   <a:solidFill>
                     <a:srgbClr val="000000"/>
                   </a:solidFill>
@@ -8731,7 +8731,7 @@
             </a:ln>
             <a:extLst>
               <a:ext uri="{91240B29-F687-4f45-9708-019B960494DF}">
-                <a14:hiddenLine xmlns:a14="http://schemas.microsoft.com/office/drawing/2010/main" xmlns="" w="9525">
+                <a14:hiddenLine xmlns="" xmlns:a14="http://schemas.microsoft.com/office/drawing/2010/main" w="9525">
                   <a:solidFill>
                     <a:srgbClr val="000000"/>
                   </a:solidFill>
@@ -8799,7 +8799,7 @@
             </a:ln>
             <a:extLst>
               <a:ext uri="{91240B29-F687-4f45-9708-019B960494DF}">
-                <a14:hiddenLine xmlns:a14="http://schemas.microsoft.com/office/drawing/2010/main" xmlns="" w="9525">
+                <a14:hiddenLine xmlns="" xmlns:a14="http://schemas.microsoft.com/office/drawing/2010/main" w="9525">
                   <a:solidFill>
                     <a:srgbClr val="000000"/>
                   </a:solidFill>
@@ -8889,7 +8889,7 @@
             </a:ln>
             <a:extLst>
               <a:ext uri="{91240B29-F687-4f45-9708-019B960494DF}">
-                <a14:hiddenLine xmlns:a14="http://schemas.microsoft.com/office/drawing/2010/main" xmlns="" w="9525">
+                <a14:hiddenLine xmlns="" xmlns:a14="http://schemas.microsoft.com/office/drawing/2010/main" w="9525">
                   <a:solidFill>
                     <a:srgbClr val="000000"/>
                   </a:solidFill>
@@ -8923,7 +8923,7 @@
             </a:ln>
             <a:extLst>
               <a:ext uri="{91240B29-F687-4f45-9708-019B960494DF}">
-                <a14:hiddenLine xmlns:a14="http://schemas.microsoft.com/office/drawing/2010/main" xmlns="" w="9525">
+                <a14:hiddenLine xmlns="" xmlns:a14="http://schemas.microsoft.com/office/drawing/2010/main" w="9525">
                   <a:solidFill>
                     <a:srgbClr val="000000"/>
                   </a:solidFill>
@@ -9013,7 +9013,7 @@
             </a:ln>
             <a:extLst>
               <a:ext uri="{91240B29-F687-4f45-9708-019B960494DF}">
-                <a14:hiddenLine xmlns:a14="http://schemas.microsoft.com/office/drawing/2010/main" xmlns="" w="9525">
+                <a14:hiddenLine xmlns="" xmlns:a14="http://schemas.microsoft.com/office/drawing/2010/main" w="9525">
                   <a:solidFill>
                     <a:srgbClr val="000000"/>
                   </a:solidFill>
@@ -9075,7 +9075,7 @@
             </a:ln>
             <a:extLst>
               <a:ext uri="{91240B29-F687-4f45-9708-019B960494DF}">
-                <a14:hiddenLine xmlns:a14="http://schemas.microsoft.com/office/drawing/2010/main" xmlns="" w="9525">
+                <a14:hiddenLine xmlns="" xmlns:a14="http://schemas.microsoft.com/office/drawing/2010/main" w="9525">
                   <a:solidFill>
                     <a:srgbClr val="000000"/>
                   </a:solidFill>
@@ -9137,7 +9137,7 @@
             </a:ln>
             <a:extLst>
               <a:ext uri="{91240B29-F687-4f45-9708-019B960494DF}">
-                <a14:hiddenLine xmlns:a14="http://schemas.microsoft.com/office/drawing/2010/main" xmlns="" w="9525">
+                <a14:hiddenLine xmlns="" xmlns:a14="http://schemas.microsoft.com/office/drawing/2010/main" w="9525">
                   <a:solidFill>
                     <a:srgbClr val="000000"/>
                   </a:solidFill>
@@ -9227,7 +9227,7 @@
             </a:ln>
             <a:extLst>
               <a:ext uri="{91240B29-F687-4f45-9708-019B960494DF}">
-                <a14:hiddenLine xmlns:a14="http://schemas.microsoft.com/office/drawing/2010/main" xmlns="" w="9525">
+                <a14:hiddenLine xmlns="" xmlns:a14="http://schemas.microsoft.com/office/drawing/2010/main" w="9525">
                   <a:solidFill>
                     <a:srgbClr val="000000"/>
                   </a:solidFill>
@@ -9295,7 +9295,7 @@
             </a:ln>
             <a:extLst>
               <a:ext uri="{91240B29-F687-4f45-9708-019B960494DF}">
-                <a14:hiddenLine xmlns:a14="http://schemas.microsoft.com/office/drawing/2010/main" xmlns="" w="9525">
+                <a14:hiddenLine xmlns="" xmlns:a14="http://schemas.microsoft.com/office/drawing/2010/main" w="9525">
                   <a:solidFill>
                     <a:srgbClr val="000000"/>
                   </a:solidFill>
@@ -9357,7 +9357,7 @@
             </a:ln>
             <a:extLst>
               <a:ext uri="{91240B29-F687-4f45-9708-019B960494DF}">
-                <a14:hiddenLine xmlns:a14="http://schemas.microsoft.com/office/drawing/2010/main" xmlns="" w="9525">
+                <a14:hiddenLine xmlns="" xmlns:a14="http://schemas.microsoft.com/office/drawing/2010/main" w="9525">
                   <a:solidFill>
                     <a:srgbClr val="000000"/>
                   </a:solidFill>
@@ -9447,7 +9447,7 @@
             </a:ln>
             <a:extLst>
               <a:ext uri="{91240B29-F687-4f45-9708-019B960494DF}">
-                <a14:hiddenLine xmlns:a14="http://schemas.microsoft.com/office/drawing/2010/main" xmlns="" w="9525">
+                <a14:hiddenLine xmlns="" xmlns:a14="http://schemas.microsoft.com/office/drawing/2010/main" w="9525">
                   <a:solidFill>
                     <a:srgbClr val="000000"/>
                   </a:solidFill>
@@ -9509,7 +9509,7 @@
             </a:ln>
             <a:extLst>
               <a:ext uri="{91240B29-F687-4f45-9708-019B960494DF}">
-                <a14:hiddenLine xmlns:a14="http://schemas.microsoft.com/office/drawing/2010/main" xmlns="" w="9525">
+                <a14:hiddenLine xmlns="" xmlns:a14="http://schemas.microsoft.com/office/drawing/2010/main" w="9525">
                   <a:solidFill>
                     <a:srgbClr val="000000"/>
                   </a:solidFill>
@@ -9599,7 +9599,7 @@
             </a:ln>
             <a:extLst>
               <a:ext uri="{91240B29-F687-4f45-9708-019B960494DF}">
-                <a14:hiddenLine xmlns:a14="http://schemas.microsoft.com/office/drawing/2010/main" xmlns="" w="9525">
+                <a14:hiddenLine xmlns="" xmlns:a14="http://schemas.microsoft.com/office/drawing/2010/main" w="9525">
                   <a:solidFill>
                     <a:srgbClr val="000000"/>
                   </a:solidFill>
@@ -9661,7 +9661,7 @@
             </a:ln>
             <a:extLst>
               <a:ext uri="{91240B29-F687-4f45-9708-019B960494DF}">
-                <a14:hiddenLine xmlns:a14="http://schemas.microsoft.com/office/drawing/2010/main" xmlns="" w="9525">
+                <a14:hiddenLine xmlns="" xmlns:a14="http://schemas.microsoft.com/office/drawing/2010/main" w="9525">
                   <a:solidFill>
                     <a:srgbClr val="000000"/>
                   </a:solidFill>
@@ -9751,7 +9751,7 @@
             </a:ln>
             <a:extLst>
               <a:ext uri="{91240B29-F687-4f45-9708-019B960494DF}">
-                <a14:hiddenLine xmlns:a14="http://schemas.microsoft.com/office/drawing/2010/main" xmlns="" w="9525">
+                <a14:hiddenLine xmlns="" xmlns:a14="http://schemas.microsoft.com/office/drawing/2010/main" w="9525">
                   <a:solidFill>
                     <a:srgbClr val="000000"/>
                   </a:solidFill>
@@ -9785,7 +9785,7 @@
             </a:ln>
             <a:extLst>
               <a:ext uri="{91240B29-F687-4f45-9708-019B960494DF}">
-                <a14:hiddenLine xmlns:a14="http://schemas.microsoft.com/office/drawing/2010/main" xmlns="" w="9525">
+                <a14:hiddenLine xmlns="" xmlns:a14="http://schemas.microsoft.com/office/drawing/2010/main" w="9525">
                   <a:solidFill>
                     <a:srgbClr val="000000"/>
                   </a:solidFill>
@@ -9850,7 +9850,7 @@
             </a:ln>
             <a:extLst>
               <a:ext uri="{91240B29-F687-4f45-9708-019B960494DF}">
-                <a14:hiddenLine xmlns:a14="http://schemas.microsoft.com/office/drawing/2010/main" xmlns="" w="9525">
+                <a14:hiddenLine xmlns="" xmlns:a14="http://schemas.microsoft.com/office/drawing/2010/main" w="9525">
                   <a:solidFill>
                     <a:srgbClr val="000000"/>
                   </a:solidFill>
@@ -9940,7 +9940,7 @@
             </a:ln>
             <a:extLst>
               <a:ext uri="{91240B29-F687-4f45-9708-019B960494DF}">
-                <a14:hiddenLine xmlns:a14="http://schemas.microsoft.com/office/drawing/2010/main" xmlns="" w="9525">
+                <a14:hiddenLine xmlns="" xmlns:a14="http://schemas.microsoft.com/office/drawing/2010/main" w="9525">
                   <a:solidFill>
                     <a:srgbClr val="000000"/>
                   </a:solidFill>
@@ -10002,7 +10002,7 @@
             </a:ln>
             <a:extLst>
               <a:ext uri="{91240B29-F687-4f45-9708-019B960494DF}">
-                <a14:hiddenLine xmlns:a14="http://schemas.microsoft.com/office/drawing/2010/main" xmlns="" w="9525">
+                <a14:hiddenLine xmlns="" xmlns:a14="http://schemas.microsoft.com/office/drawing/2010/main" w="9525">
                   <a:solidFill>
                     <a:srgbClr val="000000"/>
                   </a:solidFill>
@@ -10092,7 +10092,7 @@
             </a:ln>
             <a:extLst>
               <a:ext uri="{91240B29-F687-4f45-9708-019B960494DF}">
-                <a14:hiddenLine xmlns:a14="http://schemas.microsoft.com/office/drawing/2010/main" xmlns="" w="9525">
+                <a14:hiddenLine xmlns="" xmlns:a14="http://schemas.microsoft.com/office/drawing/2010/main" w="9525">
                   <a:solidFill>
                     <a:srgbClr val="000000"/>
                   </a:solidFill>
@@ -10182,7 +10182,7 @@
             </a:ln>
             <a:extLst>
               <a:ext uri="{91240B29-F687-4f45-9708-019B960494DF}">
-                <a14:hiddenLine xmlns:a14="http://schemas.microsoft.com/office/drawing/2010/main" xmlns="" w="9525">
+                <a14:hiddenLine xmlns="" xmlns:a14="http://schemas.microsoft.com/office/drawing/2010/main" w="9525">
                   <a:solidFill>
                     <a:srgbClr val="000000"/>
                   </a:solidFill>
@@ -10247,7 +10247,7 @@
             </a:ln>
             <a:extLst>
               <a:ext uri="{91240B29-F687-4f45-9708-019B960494DF}">
-                <a14:hiddenLine xmlns:a14="http://schemas.microsoft.com/office/drawing/2010/main" xmlns="" w="9525">
+                <a14:hiddenLine xmlns="" xmlns:a14="http://schemas.microsoft.com/office/drawing/2010/main" w="9525">
                   <a:solidFill>
                     <a:srgbClr val="000000"/>
                   </a:solidFill>
@@ -10309,7 +10309,7 @@
             </a:ln>
             <a:extLst>
               <a:ext uri="{91240B29-F687-4f45-9708-019B960494DF}">
-                <a14:hiddenLine xmlns:a14="http://schemas.microsoft.com/office/drawing/2010/main" xmlns="" w="9525">
+                <a14:hiddenLine xmlns="" xmlns:a14="http://schemas.microsoft.com/office/drawing/2010/main" w="9525">
                   <a:solidFill>
                     <a:srgbClr val="000000"/>
                   </a:solidFill>
@@ -10399,7 +10399,7 @@
             </a:ln>
             <a:extLst>
               <a:ext uri="{91240B29-F687-4f45-9708-019B960494DF}">
-                <a14:hiddenLine xmlns:a14="http://schemas.microsoft.com/office/drawing/2010/main" xmlns="" w="9525">
+                <a14:hiddenLine xmlns="" xmlns:a14="http://schemas.microsoft.com/office/drawing/2010/main" w="9525">
                   <a:solidFill>
                     <a:srgbClr val="000000"/>
                   </a:solidFill>
@@ -10489,7 +10489,7 @@
             </a:ln>
             <a:extLst>
               <a:ext uri="{91240B29-F687-4f45-9708-019B960494DF}">
-                <a14:hiddenLine xmlns:a14="http://schemas.microsoft.com/office/drawing/2010/main" xmlns="" w="9525">
+                <a14:hiddenLine xmlns="" xmlns:a14="http://schemas.microsoft.com/office/drawing/2010/main" w="9525">
                   <a:solidFill>
                     <a:srgbClr val="000000"/>
                   </a:solidFill>
@@ -10551,7 +10551,7 @@
             </a:ln>
             <a:extLst>
               <a:ext uri="{91240B29-F687-4f45-9708-019B960494DF}">
-                <a14:hiddenLine xmlns:a14="http://schemas.microsoft.com/office/drawing/2010/main" xmlns="" w="9525">
+                <a14:hiddenLine xmlns="" xmlns:a14="http://schemas.microsoft.com/office/drawing/2010/main" w="9525">
                   <a:solidFill>
                     <a:srgbClr val="000000"/>
                   </a:solidFill>
@@ -10671,7 +10671,7 @@
             </a:ln>
             <a:extLst>
               <a:ext uri="{91240B29-F687-4f45-9708-019B960494DF}">
-                <a14:hiddenLine xmlns:a14="http://schemas.microsoft.com/office/drawing/2010/main" xmlns="" w="9525">
+                <a14:hiddenLine xmlns="" xmlns:a14="http://schemas.microsoft.com/office/drawing/2010/main" w="9525">
                   <a:solidFill>
                     <a:srgbClr val="000000"/>
                   </a:solidFill>
@@ -10739,7 +10739,7 @@
             </a:ln>
             <a:extLst>
               <a:ext uri="{91240B29-F687-4f45-9708-019B960494DF}">
-                <a14:hiddenLine xmlns:a14="http://schemas.microsoft.com/office/drawing/2010/main" xmlns="" w="9525">
+                <a14:hiddenLine xmlns="" xmlns:a14="http://schemas.microsoft.com/office/drawing/2010/main" w="9525">
                   <a:solidFill>
                     <a:srgbClr val="000000"/>
                   </a:solidFill>
@@ -10829,7 +10829,7 @@
             </a:ln>
             <a:extLst>
               <a:ext uri="{91240B29-F687-4f45-9708-019B960494DF}">
-                <a14:hiddenLine xmlns:a14="http://schemas.microsoft.com/office/drawing/2010/main" xmlns="" w="9525">
+                <a14:hiddenLine xmlns="" xmlns:a14="http://schemas.microsoft.com/office/drawing/2010/main" w="9525">
                   <a:solidFill>
                     <a:srgbClr val="000000"/>
                   </a:solidFill>
@@ -16949,7 +16949,7 @@
           <a:noFill/>
           <a:extLst>
             <a:ext uri="{909E8E84-426E-40dd-AFC4-6F175D3DCCD1}">
-              <a14:hiddenFill xmlns:a14="http://schemas.microsoft.com/office/drawing/2010/main" xmlns="">
+              <a14:hiddenFill xmlns="" xmlns:a14="http://schemas.microsoft.com/office/drawing/2010/main">
                 <a:solidFill>
                   <a:srgbClr val="FFFFFF"/>
                 </a:solidFill>
@@ -17029,7 +17029,7 @@
               </a:ln>
               <a:extLst>
                 <a:ext uri="{91240B29-F687-4f45-9708-019B960494DF}">
-                  <a14:hiddenLine xmlns:a14="http://schemas.microsoft.com/office/drawing/2010/main" xmlns="" w="9525">
+                  <a14:hiddenLine xmlns="" xmlns:a14="http://schemas.microsoft.com/office/drawing/2010/main" w="9525">
                     <a:solidFill>
                       <a:srgbClr val="000000"/>
                     </a:solidFill>
@@ -17119,7 +17119,7 @@
               </a:ln>
               <a:extLst>
                 <a:ext uri="{91240B29-F687-4f45-9708-019B960494DF}">
-                  <a14:hiddenLine xmlns:a14="http://schemas.microsoft.com/office/drawing/2010/main" xmlns="" w="9525">
+                  <a14:hiddenLine xmlns="" xmlns:a14="http://schemas.microsoft.com/office/drawing/2010/main" w="9525">
                     <a:solidFill>
                       <a:srgbClr val="000000"/>
                     </a:solidFill>
@@ -17209,7 +17209,7 @@
               </a:ln>
               <a:extLst>
                 <a:ext uri="{91240B29-F687-4f45-9708-019B960494DF}">
-                  <a14:hiddenLine xmlns:a14="http://schemas.microsoft.com/office/drawing/2010/main" xmlns="" w="9525">
+                  <a14:hiddenLine xmlns="" xmlns:a14="http://schemas.microsoft.com/office/drawing/2010/main" w="9525">
                     <a:solidFill>
                       <a:srgbClr val="000000"/>
                     </a:solidFill>
@@ -17271,7 +17271,7 @@
               </a:ln>
               <a:extLst>
                 <a:ext uri="{91240B29-F687-4f45-9708-019B960494DF}">
-                  <a14:hiddenLine xmlns:a14="http://schemas.microsoft.com/office/drawing/2010/main" xmlns="" w="9525">
+                  <a14:hiddenLine xmlns="" xmlns:a14="http://schemas.microsoft.com/office/drawing/2010/main" w="9525">
                     <a:solidFill>
                       <a:srgbClr val="000000"/>
                     </a:solidFill>
@@ -17361,7 +17361,7 @@
               </a:ln>
               <a:extLst>
                 <a:ext uri="{91240B29-F687-4f45-9708-019B960494DF}">
-                  <a14:hiddenLine xmlns:a14="http://schemas.microsoft.com/office/drawing/2010/main" xmlns="" w="9525">
+                  <a14:hiddenLine xmlns="" xmlns:a14="http://schemas.microsoft.com/office/drawing/2010/main" w="9525">
                     <a:solidFill>
                       <a:srgbClr val="000000"/>
                     </a:solidFill>
@@ -17423,7 +17423,7 @@
               </a:ln>
               <a:extLst>
                 <a:ext uri="{91240B29-F687-4f45-9708-019B960494DF}">
-                  <a14:hiddenLine xmlns:a14="http://schemas.microsoft.com/office/drawing/2010/main" xmlns="" w="9525">
+                  <a14:hiddenLine xmlns="" xmlns:a14="http://schemas.microsoft.com/office/drawing/2010/main" w="9525">
                     <a:solidFill>
                       <a:srgbClr val="000000"/>
                     </a:solidFill>
@@ -17485,7 +17485,7 @@
               </a:ln>
               <a:extLst>
                 <a:ext uri="{91240B29-F687-4f45-9708-019B960494DF}">
-                  <a14:hiddenLine xmlns:a14="http://schemas.microsoft.com/office/drawing/2010/main" xmlns="" w="9525">
+                  <a14:hiddenLine xmlns="" xmlns:a14="http://schemas.microsoft.com/office/drawing/2010/main" w="9525">
                     <a:solidFill>
                       <a:srgbClr val="000000"/>
                     </a:solidFill>
@@ -17575,7 +17575,7 @@
               </a:ln>
               <a:extLst>
                 <a:ext uri="{91240B29-F687-4f45-9708-019B960494DF}">
-                  <a14:hiddenLine xmlns:a14="http://schemas.microsoft.com/office/drawing/2010/main" xmlns="" w="9525">
+                  <a14:hiddenLine xmlns="" xmlns:a14="http://schemas.microsoft.com/office/drawing/2010/main" w="9525">
                     <a:solidFill>
                       <a:srgbClr val="000000"/>
                     </a:solidFill>
@@ -17665,7 +17665,7 @@
               </a:ln>
               <a:extLst>
                 <a:ext uri="{91240B29-F687-4f45-9708-019B960494DF}">
-                  <a14:hiddenLine xmlns:a14="http://schemas.microsoft.com/office/drawing/2010/main" xmlns="" w="9525">
+                  <a14:hiddenLine xmlns="" xmlns:a14="http://schemas.microsoft.com/office/drawing/2010/main" w="9525">
                     <a:solidFill>
                       <a:srgbClr val="000000"/>
                     </a:solidFill>
@@ -17727,7 +17727,7 @@
               </a:ln>
               <a:extLst>
                 <a:ext uri="{91240B29-F687-4f45-9708-019B960494DF}">
-                  <a14:hiddenLine xmlns:a14="http://schemas.microsoft.com/office/drawing/2010/main" xmlns="" w="9525">
+                  <a14:hiddenLine xmlns="" xmlns:a14="http://schemas.microsoft.com/office/drawing/2010/main" w="9525">
                     <a:solidFill>
                       <a:srgbClr val="000000"/>
                     </a:solidFill>
@@ -17837,7 +17837,7 @@
               </a:ln>
               <a:extLst>
                 <a:ext uri="{91240B29-F687-4f45-9708-019B960494DF}">
-                  <a14:hiddenLine xmlns:a14="http://schemas.microsoft.com/office/drawing/2010/main" xmlns="" w="9525">
+                  <a14:hiddenLine xmlns="" xmlns:a14="http://schemas.microsoft.com/office/drawing/2010/main" w="9525">
                     <a:solidFill>
                       <a:srgbClr val="000000"/>
                     </a:solidFill>
@@ -17921,7 +17921,7 @@
               </a:ln>
               <a:extLst>
                 <a:ext uri="{91240B29-F687-4f45-9708-019B960494DF}">
-                  <a14:hiddenLine xmlns:a14="http://schemas.microsoft.com/office/drawing/2010/main" xmlns="" w="9525">
+                  <a14:hiddenLine xmlns="" xmlns:a14="http://schemas.microsoft.com/office/drawing/2010/main" w="9525">
                     <a:solidFill>
                       <a:srgbClr val="000000"/>
                     </a:solidFill>
@@ -17983,7 +17983,7 @@
               </a:ln>
               <a:extLst>
                 <a:ext uri="{91240B29-F687-4f45-9708-019B960494DF}">
-                  <a14:hiddenLine xmlns:a14="http://schemas.microsoft.com/office/drawing/2010/main" xmlns="" w="9525">
+                  <a14:hiddenLine xmlns="" xmlns:a14="http://schemas.microsoft.com/office/drawing/2010/main" w="9525">
                     <a:solidFill>
                       <a:srgbClr val="000000"/>
                     </a:solidFill>
@@ -18045,7 +18045,7 @@
               </a:ln>
               <a:extLst>
                 <a:ext uri="{91240B29-F687-4f45-9708-019B960494DF}">
-                  <a14:hiddenLine xmlns:a14="http://schemas.microsoft.com/office/drawing/2010/main" xmlns="" w="9525">
+                  <a14:hiddenLine xmlns="" xmlns:a14="http://schemas.microsoft.com/office/drawing/2010/main" w="9525">
                     <a:solidFill>
                       <a:srgbClr val="000000"/>
                     </a:solidFill>
@@ -18135,7 +18135,7 @@
               </a:ln>
               <a:extLst>
                 <a:ext uri="{91240B29-F687-4f45-9708-019B960494DF}">
-                  <a14:hiddenLine xmlns:a14="http://schemas.microsoft.com/office/drawing/2010/main" xmlns="" w="9525">
+                  <a14:hiddenLine xmlns="" xmlns:a14="http://schemas.microsoft.com/office/drawing/2010/main" w="9525">
                     <a:solidFill>
                       <a:srgbClr val="000000"/>
                     </a:solidFill>
@@ -18169,7 +18169,7 @@
               </a:ln>
               <a:extLst>
                 <a:ext uri="{91240B29-F687-4f45-9708-019B960494DF}">
-                  <a14:hiddenLine xmlns:a14="http://schemas.microsoft.com/office/drawing/2010/main" xmlns="" w="9525">
+                  <a14:hiddenLine xmlns="" xmlns:a14="http://schemas.microsoft.com/office/drawing/2010/main" w="9525">
                     <a:solidFill>
                       <a:srgbClr val="000000"/>
                     </a:solidFill>
@@ -18234,7 +18234,7 @@
               </a:ln>
               <a:extLst>
                 <a:ext uri="{91240B29-F687-4f45-9708-019B960494DF}">
-                  <a14:hiddenLine xmlns:a14="http://schemas.microsoft.com/office/drawing/2010/main" xmlns="" w="9525">
+                  <a14:hiddenLine xmlns="" xmlns:a14="http://schemas.microsoft.com/office/drawing/2010/main" w="9525">
                     <a:solidFill>
                       <a:srgbClr val="000000"/>
                     </a:solidFill>
@@ -18324,7 +18324,7 @@
               </a:ln>
               <a:extLst>
                 <a:ext uri="{91240B29-F687-4f45-9708-019B960494DF}">
-                  <a14:hiddenLine xmlns:a14="http://schemas.microsoft.com/office/drawing/2010/main" xmlns="" w="9525">
+                  <a14:hiddenLine xmlns="" xmlns:a14="http://schemas.microsoft.com/office/drawing/2010/main" w="9525">
                     <a:solidFill>
                       <a:srgbClr val="000000"/>
                     </a:solidFill>
@@ -18386,7 +18386,7 @@
               </a:ln>
               <a:extLst>
                 <a:ext uri="{91240B29-F687-4f45-9708-019B960494DF}">
-                  <a14:hiddenLine xmlns:a14="http://schemas.microsoft.com/office/drawing/2010/main" xmlns="" w="9525">
+                  <a14:hiddenLine xmlns="" xmlns:a14="http://schemas.microsoft.com/office/drawing/2010/main" w="9525">
                     <a:solidFill>
                       <a:srgbClr val="000000"/>
                     </a:solidFill>
@@ -18476,7 +18476,7 @@
               </a:ln>
               <a:extLst>
                 <a:ext uri="{91240B29-F687-4f45-9708-019B960494DF}">
-                  <a14:hiddenLine xmlns:a14="http://schemas.microsoft.com/office/drawing/2010/main" xmlns="" w="9525">
+                  <a14:hiddenLine xmlns="" xmlns:a14="http://schemas.microsoft.com/office/drawing/2010/main" w="9525">
                     <a:solidFill>
                       <a:srgbClr val="000000"/>
                     </a:solidFill>
@@ -18541,7 +18541,7 @@
               </a:ln>
               <a:extLst>
                 <a:ext uri="{91240B29-F687-4f45-9708-019B960494DF}">
-                  <a14:hiddenLine xmlns:a14="http://schemas.microsoft.com/office/drawing/2010/main" xmlns="" w="9525">
+                  <a14:hiddenLine xmlns="" xmlns:a14="http://schemas.microsoft.com/office/drawing/2010/main" w="9525">
                     <a:solidFill>
                       <a:srgbClr val="000000"/>
                     </a:solidFill>
@@ -18603,7 +18603,7 @@
               </a:ln>
               <a:extLst>
                 <a:ext uri="{91240B29-F687-4f45-9708-019B960494DF}">
-                  <a14:hiddenLine xmlns:a14="http://schemas.microsoft.com/office/drawing/2010/main" xmlns="" w="9525">
+                  <a14:hiddenLine xmlns="" xmlns:a14="http://schemas.microsoft.com/office/drawing/2010/main" w="9525">
                     <a:solidFill>
                       <a:srgbClr val="000000"/>
                     </a:solidFill>
@@ -18693,7 +18693,7 @@
               </a:ln>
               <a:extLst>
                 <a:ext uri="{91240B29-F687-4f45-9708-019B960494DF}">
-                  <a14:hiddenLine xmlns:a14="http://schemas.microsoft.com/office/drawing/2010/main" xmlns="" w="9525">
+                  <a14:hiddenLine xmlns="" xmlns:a14="http://schemas.microsoft.com/office/drawing/2010/main" w="9525">
                     <a:solidFill>
                       <a:srgbClr val="000000"/>
                     </a:solidFill>
@@ -18783,7 +18783,7 @@
               </a:ln>
               <a:extLst>
                 <a:ext uri="{91240B29-F687-4f45-9708-019B960494DF}">
-                  <a14:hiddenLine xmlns:a14="http://schemas.microsoft.com/office/drawing/2010/main" xmlns="" w="9525">
+                  <a14:hiddenLine xmlns="" xmlns:a14="http://schemas.microsoft.com/office/drawing/2010/main" w="9525">
                     <a:solidFill>
                       <a:srgbClr val="000000"/>
                     </a:solidFill>
@@ -18848,7 +18848,7 @@
               </a:ln>
               <a:extLst>
                 <a:ext uri="{91240B29-F687-4f45-9708-019B960494DF}">
-                  <a14:hiddenLine xmlns:a14="http://schemas.microsoft.com/office/drawing/2010/main" xmlns="" w="9525">
+                  <a14:hiddenLine xmlns="" xmlns:a14="http://schemas.microsoft.com/office/drawing/2010/main" w="9525">
                     <a:solidFill>
                       <a:srgbClr val="000000"/>
                     </a:solidFill>
@@ -18968,7 +18968,7 @@
               </a:ln>
               <a:extLst>
                 <a:ext uri="{91240B29-F687-4f45-9708-019B960494DF}">
-                  <a14:hiddenLine xmlns:a14="http://schemas.microsoft.com/office/drawing/2010/main" xmlns="" w="9525">
+                  <a14:hiddenLine xmlns="" xmlns:a14="http://schemas.microsoft.com/office/drawing/2010/main" w="9525">
                     <a:solidFill>
                       <a:srgbClr val="000000"/>
                     </a:solidFill>
@@ -19066,7 +19066,7 @@
               </a:ln>
               <a:extLst>
                 <a:ext uri="{91240B29-F687-4f45-9708-019B960494DF}">
-                  <a14:hiddenLine xmlns:a14="http://schemas.microsoft.com/office/drawing/2010/main" xmlns="" w="9525">
+                  <a14:hiddenLine xmlns="" xmlns:a14="http://schemas.microsoft.com/office/drawing/2010/main" w="9525">
                     <a:solidFill>
                       <a:srgbClr val="000000"/>
                     </a:solidFill>
@@ -19181,7 +19181,7 @@
               </a:ln>
               <a:extLst>
                 <a:ext uri="{91240B29-F687-4f45-9708-019B960494DF}">
-                  <a14:hiddenLine xmlns:a14="http://schemas.microsoft.com/office/drawing/2010/main" xmlns="" w="9525">
+                  <a14:hiddenLine xmlns="" xmlns:a14="http://schemas.microsoft.com/office/drawing/2010/main" w="9525">
                     <a:solidFill>
                       <a:srgbClr val="000000"/>
                     </a:solidFill>
@@ -19271,7 +19271,7 @@
               </a:ln>
               <a:extLst>
                 <a:ext uri="{91240B29-F687-4f45-9708-019B960494DF}">
-                  <a14:hiddenLine xmlns:a14="http://schemas.microsoft.com/office/drawing/2010/main" xmlns="" w="9525">
+                  <a14:hiddenLine xmlns="" xmlns:a14="http://schemas.microsoft.com/office/drawing/2010/main" w="9525">
                     <a:solidFill>
                       <a:srgbClr val="000000"/>
                     </a:solidFill>
@@ -19336,7 +19336,7 @@
               </a:ln>
               <a:extLst>
                 <a:ext uri="{91240B29-F687-4f45-9708-019B960494DF}">
-                  <a14:hiddenLine xmlns:a14="http://schemas.microsoft.com/office/drawing/2010/main" xmlns="" w="9525">
+                  <a14:hiddenLine xmlns="" xmlns:a14="http://schemas.microsoft.com/office/drawing/2010/main" w="9525">
                     <a:solidFill>
                       <a:srgbClr val="000000"/>
                     </a:solidFill>
@@ -19426,7 +19426,7 @@
               </a:ln>
               <a:extLst>
                 <a:ext uri="{91240B29-F687-4f45-9708-019B960494DF}">
-                  <a14:hiddenLine xmlns:a14="http://schemas.microsoft.com/office/drawing/2010/main" xmlns="" w="9525">
+                  <a14:hiddenLine xmlns="" xmlns:a14="http://schemas.microsoft.com/office/drawing/2010/main" w="9525">
                     <a:solidFill>
                       <a:srgbClr val="000000"/>
                     </a:solidFill>
@@ -19494,7 +19494,7 @@
               </a:ln>
               <a:extLst>
                 <a:ext uri="{91240B29-F687-4f45-9708-019B960494DF}">
-                  <a14:hiddenLine xmlns:a14="http://schemas.microsoft.com/office/drawing/2010/main" xmlns="" w="9525">
+                  <a14:hiddenLine xmlns="" xmlns:a14="http://schemas.microsoft.com/office/drawing/2010/main" w="9525">
                     <a:solidFill>
                       <a:srgbClr val="000000"/>
                     </a:solidFill>
@@ -19584,7 +19584,7 @@
               </a:ln>
               <a:extLst>
                 <a:ext uri="{91240B29-F687-4f45-9708-019B960494DF}">
-                  <a14:hiddenLine xmlns:a14="http://schemas.microsoft.com/office/drawing/2010/main" xmlns="" w="9525">
+                  <a14:hiddenLine xmlns="" xmlns:a14="http://schemas.microsoft.com/office/drawing/2010/main" w="9525">
                     <a:solidFill>
                       <a:srgbClr val="000000"/>
                     </a:solidFill>
@@ -19652,7 +19652,7 @@
               </a:ln>
               <a:extLst>
                 <a:ext uri="{91240B29-F687-4f45-9708-019B960494DF}">
-                  <a14:hiddenLine xmlns:a14="http://schemas.microsoft.com/office/drawing/2010/main" xmlns="" w="9525">
+                  <a14:hiddenLine xmlns="" xmlns:a14="http://schemas.microsoft.com/office/drawing/2010/main" w="9525">
                     <a:solidFill>
                       <a:srgbClr val="000000"/>
                     </a:solidFill>
@@ -19742,7 +19742,7 @@
               </a:ln>
               <a:extLst>
                 <a:ext uri="{91240B29-F687-4f45-9708-019B960494DF}">
-                  <a14:hiddenLine xmlns:a14="http://schemas.microsoft.com/office/drawing/2010/main" xmlns="" w="9525">
+                  <a14:hiddenLine xmlns="" xmlns:a14="http://schemas.microsoft.com/office/drawing/2010/main" w="9525">
                     <a:solidFill>
                       <a:srgbClr val="000000"/>
                     </a:solidFill>
@@ -19776,7 +19776,7 @@
               </a:ln>
               <a:extLst>
                 <a:ext uri="{91240B29-F687-4f45-9708-019B960494DF}">
-                  <a14:hiddenLine xmlns:a14="http://schemas.microsoft.com/office/drawing/2010/main" xmlns="" w="9525">
+                  <a14:hiddenLine xmlns="" xmlns:a14="http://schemas.microsoft.com/office/drawing/2010/main" w="9525">
                     <a:solidFill>
                       <a:srgbClr val="000000"/>
                     </a:solidFill>
@@ -30832,7 +30832,7 @@
           <a:p>
             <a:r>
               <a:rPr lang="en-CA" dirty="0"/>
-              <a:t>FIN</a:t>
+              <a:t>\0</a:t>
             </a:r>
           </a:p>
         </p:txBody>

</xml_diff>

<commit_message>
MakeVersionInfo: Add more github links
</commit_message>
<xml_diff>
--- a/MakeVersionInfo/MakeVersionInfo.pptx
+++ b/MakeVersionInfo/MakeVersionInfo.pptx
@@ -3347,7 +3347,7 @@
           <a:p>
             <a:fld id="{857CC94D-E614-4874-A919-F25B27309A09}" type="datetimeFigureOut">
               <a:rPr lang="en-CA" smtClean="0"/>
-              <a:t>2025-01-05</a:t>
+              <a:t>2025-05-15</a:t>
             </a:fld>
             <a:endParaRPr lang="en-CA"/>
           </a:p>
@@ -6737,7 +6737,7 @@
           <a:noFill/>
           <a:extLst>
             <a:ext uri="{909E8E84-426E-40dd-AFC4-6F175D3DCCD1}">
-              <a14:hiddenFill xmlns="" xmlns:a14="http://schemas.microsoft.com/office/drawing/2010/main">
+              <a14:hiddenFill xmlns:a14="http://schemas.microsoft.com/office/drawing/2010/main" xmlns="">
                 <a:solidFill>
                   <a:srgbClr val="FFFFFF"/>
                 </a:solidFill>
@@ -6803,7 +6803,7 @@
             </a:ln>
             <a:extLst>
               <a:ext uri="{91240B29-F687-4f45-9708-019B960494DF}">
-                <a14:hiddenLine xmlns="" xmlns:a14="http://schemas.microsoft.com/office/drawing/2010/main" w="9525">
+                <a14:hiddenLine xmlns:a14="http://schemas.microsoft.com/office/drawing/2010/main" xmlns="" w="9525">
                   <a:solidFill>
                     <a:srgbClr val="000000"/>
                   </a:solidFill>
@@ -6893,7 +6893,7 @@
             </a:ln>
             <a:extLst>
               <a:ext uri="{91240B29-F687-4f45-9708-019B960494DF}">
-                <a14:hiddenLine xmlns="" xmlns:a14="http://schemas.microsoft.com/office/drawing/2010/main" w="9525">
+                <a14:hiddenLine xmlns:a14="http://schemas.microsoft.com/office/drawing/2010/main" xmlns="" w="9525">
                   <a:solidFill>
                     <a:srgbClr val="000000"/>
                   </a:solidFill>
@@ -6983,7 +6983,7 @@
             </a:ln>
             <a:extLst>
               <a:ext uri="{91240B29-F687-4f45-9708-019B960494DF}">
-                <a14:hiddenLine xmlns="" xmlns:a14="http://schemas.microsoft.com/office/drawing/2010/main" w="9525">
+                <a14:hiddenLine xmlns:a14="http://schemas.microsoft.com/office/drawing/2010/main" xmlns="" w="9525">
                   <a:solidFill>
                     <a:srgbClr val="000000"/>
                   </a:solidFill>
@@ -7017,7 +7017,7 @@
             </a:ln>
             <a:extLst>
               <a:ext uri="{91240B29-F687-4f45-9708-019B960494DF}">
-                <a14:hiddenLine xmlns="" xmlns:a14="http://schemas.microsoft.com/office/drawing/2010/main" w="9525">
+                <a14:hiddenLine xmlns:a14="http://schemas.microsoft.com/office/drawing/2010/main" xmlns="" w="9525">
                   <a:solidFill>
                     <a:srgbClr val="000000"/>
                   </a:solidFill>
@@ -7107,7 +7107,7 @@
             </a:ln>
             <a:extLst>
               <a:ext uri="{91240B29-F687-4f45-9708-019B960494DF}">
-                <a14:hiddenLine xmlns="" xmlns:a14="http://schemas.microsoft.com/office/drawing/2010/main" w="9525">
+                <a14:hiddenLine xmlns:a14="http://schemas.microsoft.com/office/drawing/2010/main" xmlns="" w="9525">
                   <a:solidFill>
                     <a:srgbClr val="000000"/>
                   </a:solidFill>
@@ -7169,7 +7169,7 @@
             </a:ln>
             <a:extLst>
               <a:ext uri="{91240B29-F687-4f45-9708-019B960494DF}">
-                <a14:hiddenLine xmlns="" xmlns:a14="http://schemas.microsoft.com/office/drawing/2010/main" w="9525">
+                <a14:hiddenLine xmlns:a14="http://schemas.microsoft.com/office/drawing/2010/main" xmlns="" w="9525">
                   <a:solidFill>
                     <a:srgbClr val="000000"/>
                   </a:solidFill>
@@ -7231,7 +7231,7 @@
             </a:ln>
             <a:extLst>
               <a:ext uri="{91240B29-F687-4f45-9708-019B960494DF}">
-                <a14:hiddenLine xmlns="" xmlns:a14="http://schemas.microsoft.com/office/drawing/2010/main" w="9525">
+                <a14:hiddenLine xmlns:a14="http://schemas.microsoft.com/office/drawing/2010/main" xmlns="" w="9525">
                   <a:solidFill>
                     <a:srgbClr val="000000"/>
                   </a:solidFill>
@@ -7321,7 +7321,7 @@
             </a:ln>
             <a:extLst>
               <a:ext uri="{91240B29-F687-4f45-9708-019B960494DF}">
-                <a14:hiddenLine xmlns="" xmlns:a14="http://schemas.microsoft.com/office/drawing/2010/main" w="9525">
+                <a14:hiddenLine xmlns:a14="http://schemas.microsoft.com/office/drawing/2010/main" xmlns="" w="9525">
                   <a:solidFill>
                     <a:srgbClr val="000000"/>
                   </a:solidFill>
@@ -7383,7 +7383,7 @@
             </a:ln>
             <a:extLst>
               <a:ext uri="{91240B29-F687-4f45-9708-019B960494DF}">
-                <a14:hiddenLine xmlns="" xmlns:a14="http://schemas.microsoft.com/office/drawing/2010/main" w="9525">
+                <a14:hiddenLine xmlns:a14="http://schemas.microsoft.com/office/drawing/2010/main" xmlns="" w="9525">
                   <a:solidFill>
                     <a:srgbClr val="000000"/>
                   </a:solidFill>
@@ -7445,7 +7445,7 @@
             </a:ln>
             <a:extLst>
               <a:ext uri="{91240B29-F687-4f45-9708-019B960494DF}">
-                <a14:hiddenLine xmlns="" xmlns:a14="http://schemas.microsoft.com/office/drawing/2010/main" w="9525">
+                <a14:hiddenLine xmlns:a14="http://schemas.microsoft.com/office/drawing/2010/main" xmlns="" w="9525">
                   <a:solidFill>
                     <a:srgbClr val="000000"/>
                   </a:solidFill>
@@ -7535,7 +7535,7 @@
             </a:ln>
             <a:extLst>
               <a:ext uri="{91240B29-F687-4f45-9708-019B960494DF}">
-                <a14:hiddenLine xmlns="" xmlns:a14="http://schemas.microsoft.com/office/drawing/2010/main" w="9525">
+                <a14:hiddenLine xmlns:a14="http://schemas.microsoft.com/office/drawing/2010/main" xmlns="" w="9525">
                   <a:solidFill>
                     <a:srgbClr val="000000"/>
                   </a:solidFill>
@@ -7625,7 +7625,7 @@
             </a:ln>
             <a:extLst>
               <a:ext uri="{91240B29-F687-4f45-9708-019B960494DF}">
-                <a14:hiddenLine xmlns="" xmlns:a14="http://schemas.microsoft.com/office/drawing/2010/main" w="9525">
+                <a14:hiddenLine xmlns:a14="http://schemas.microsoft.com/office/drawing/2010/main" xmlns="" w="9525">
                   <a:solidFill>
                     <a:srgbClr val="000000"/>
                   </a:solidFill>
@@ -7687,7 +7687,7 @@
             </a:ln>
             <a:extLst>
               <a:ext uri="{91240B29-F687-4f45-9708-019B960494DF}">
-                <a14:hiddenLine xmlns="" xmlns:a14="http://schemas.microsoft.com/office/drawing/2010/main" w="9525">
+                <a14:hiddenLine xmlns:a14="http://schemas.microsoft.com/office/drawing/2010/main" xmlns="" w="9525">
                   <a:solidFill>
                     <a:srgbClr val="000000"/>
                   </a:solidFill>
@@ -7797,7 +7797,7 @@
             </a:ln>
             <a:extLst>
               <a:ext uri="{91240B29-F687-4f45-9708-019B960494DF}">
-                <a14:hiddenLine xmlns="" xmlns:a14="http://schemas.microsoft.com/office/drawing/2010/main" w="9525">
+                <a14:hiddenLine xmlns:a14="http://schemas.microsoft.com/office/drawing/2010/main" xmlns="" w="9525">
                   <a:solidFill>
                     <a:srgbClr val="000000"/>
                   </a:solidFill>
@@ -7859,7 +7859,7 @@
             </a:ln>
             <a:extLst>
               <a:ext uri="{91240B29-F687-4f45-9708-019B960494DF}">
-                <a14:hiddenLine xmlns="" xmlns:a14="http://schemas.microsoft.com/office/drawing/2010/main" w="9525">
+                <a14:hiddenLine xmlns:a14="http://schemas.microsoft.com/office/drawing/2010/main" xmlns="" w="9525">
                   <a:solidFill>
                     <a:srgbClr val="000000"/>
                   </a:solidFill>
@@ -7949,7 +7949,7 @@
             </a:ln>
             <a:extLst>
               <a:ext uri="{91240B29-F687-4f45-9708-019B960494DF}">
-                <a14:hiddenLine xmlns="" xmlns:a14="http://schemas.microsoft.com/office/drawing/2010/main" w="9525">
+                <a14:hiddenLine xmlns:a14="http://schemas.microsoft.com/office/drawing/2010/main" xmlns="" w="9525">
                   <a:solidFill>
                     <a:srgbClr val="000000"/>
                   </a:solidFill>
@@ -8039,7 +8039,7 @@
             </a:ln>
             <a:extLst>
               <a:ext uri="{91240B29-F687-4f45-9708-019B960494DF}">
-                <a14:hiddenLine xmlns="" xmlns:a14="http://schemas.microsoft.com/office/drawing/2010/main" w="9525">
+                <a14:hiddenLine xmlns:a14="http://schemas.microsoft.com/office/drawing/2010/main" xmlns="" w="9525">
                   <a:solidFill>
                     <a:srgbClr val="000000"/>
                   </a:solidFill>
@@ -8101,7 +8101,7 @@
             </a:ln>
             <a:extLst>
               <a:ext uri="{91240B29-F687-4f45-9708-019B960494DF}">
-                <a14:hiddenLine xmlns="" xmlns:a14="http://schemas.microsoft.com/office/drawing/2010/main" w="9525">
+                <a14:hiddenLine xmlns:a14="http://schemas.microsoft.com/office/drawing/2010/main" xmlns="" w="9525">
                   <a:solidFill>
                     <a:srgbClr val="000000"/>
                   </a:solidFill>
@@ -8191,7 +8191,7 @@
             </a:ln>
             <a:extLst>
               <a:ext uri="{91240B29-F687-4f45-9708-019B960494DF}">
-                <a14:hiddenLine xmlns="" xmlns:a14="http://schemas.microsoft.com/office/drawing/2010/main" w="9525">
+                <a14:hiddenLine xmlns:a14="http://schemas.microsoft.com/office/drawing/2010/main" xmlns="" w="9525">
                   <a:solidFill>
                     <a:srgbClr val="000000"/>
                   </a:solidFill>
@@ -8281,7 +8281,7 @@
             </a:ln>
             <a:extLst>
               <a:ext uri="{91240B29-F687-4f45-9708-019B960494DF}">
-                <a14:hiddenLine xmlns="" xmlns:a14="http://schemas.microsoft.com/office/drawing/2010/main" w="9525">
+                <a14:hiddenLine xmlns:a14="http://schemas.microsoft.com/office/drawing/2010/main" xmlns="" w="9525">
                   <a:solidFill>
                     <a:srgbClr val="000000"/>
                   </a:solidFill>
@@ -8337,7 +8337,7 @@
             </a:ln>
             <a:extLst>
               <a:ext uri="{91240B29-F687-4f45-9708-019B960494DF}">
-                <a14:hiddenLine xmlns="" xmlns:a14="http://schemas.microsoft.com/office/drawing/2010/main" w="9525">
+                <a14:hiddenLine xmlns:a14="http://schemas.microsoft.com/office/drawing/2010/main" xmlns="" w="9525">
                   <a:solidFill>
                     <a:srgbClr val="000000"/>
                   </a:solidFill>
@@ -8427,7 +8427,7 @@
             </a:ln>
             <a:extLst>
               <a:ext uri="{91240B29-F687-4f45-9708-019B960494DF}">
-                <a14:hiddenLine xmlns="" xmlns:a14="http://schemas.microsoft.com/office/drawing/2010/main" w="9525">
+                <a14:hiddenLine xmlns:a14="http://schemas.microsoft.com/office/drawing/2010/main" xmlns="" w="9525">
                   <a:solidFill>
                     <a:srgbClr val="000000"/>
                   </a:solidFill>
@@ -8483,7 +8483,7 @@
             </a:ln>
             <a:extLst>
               <a:ext uri="{91240B29-F687-4f45-9708-019B960494DF}">
-                <a14:hiddenLine xmlns="" xmlns:a14="http://schemas.microsoft.com/office/drawing/2010/main" w="9525">
+                <a14:hiddenLine xmlns:a14="http://schemas.microsoft.com/office/drawing/2010/main" xmlns="" w="9525">
                   <a:solidFill>
                     <a:srgbClr val="000000"/>
                   </a:solidFill>
@@ -8573,7 +8573,7 @@
             </a:ln>
             <a:extLst>
               <a:ext uri="{91240B29-F687-4f45-9708-019B960494DF}">
-                <a14:hiddenLine xmlns="" xmlns:a14="http://schemas.microsoft.com/office/drawing/2010/main" w="9525">
+                <a14:hiddenLine xmlns:a14="http://schemas.microsoft.com/office/drawing/2010/main" xmlns="" w="9525">
                   <a:solidFill>
                     <a:srgbClr val="000000"/>
                   </a:solidFill>
@@ -8641,7 +8641,7 @@
             </a:ln>
             <a:extLst>
               <a:ext uri="{91240B29-F687-4f45-9708-019B960494DF}">
-                <a14:hiddenLine xmlns="" xmlns:a14="http://schemas.microsoft.com/office/drawing/2010/main" w="9525">
+                <a14:hiddenLine xmlns:a14="http://schemas.microsoft.com/office/drawing/2010/main" xmlns="" w="9525">
                   <a:solidFill>
                     <a:srgbClr val="000000"/>
                   </a:solidFill>
@@ -8731,7 +8731,7 @@
             </a:ln>
             <a:extLst>
               <a:ext uri="{91240B29-F687-4f45-9708-019B960494DF}">
-                <a14:hiddenLine xmlns="" xmlns:a14="http://schemas.microsoft.com/office/drawing/2010/main" w="9525">
+                <a14:hiddenLine xmlns:a14="http://schemas.microsoft.com/office/drawing/2010/main" xmlns="" w="9525">
                   <a:solidFill>
                     <a:srgbClr val="000000"/>
                   </a:solidFill>
@@ -8799,7 +8799,7 @@
             </a:ln>
             <a:extLst>
               <a:ext uri="{91240B29-F687-4f45-9708-019B960494DF}">
-                <a14:hiddenLine xmlns="" xmlns:a14="http://schemas.microsoft.com/office/drawing/2010/main" w="9525">
+                <a14:hiddenLine xmlns:a14="http://schemas.microsoft.com/office/drawing/2010/main" xmlns="" w="9525">
                   <a:solidFill>
                     <a:srgbClr val="000000"/>
                   </a:solidFill>
@@ -8889,7 +8889,7 @@
             </a:ln>
             <a:extLst>
               <a:ext uri="{91240B29-F687-4f45-9708-019B960494DF}">
-                <a14:hiddenLine xmlns="" xmlns:a14="http://schemas.microsoft.com/office/drawing/2010/main" w="9525">
+                <a14:hiddenLine xmlns:a14="http://schemas.microsoft.com/office/drawing/2010/main" xmlns="" w="9525">
                   <a:solidFill>
                     <a:srgbClr val="000000"/>
                   </a:solidFill>
@@ -8923,7 +8923,7 @@
             </a:ln>
             <a:extLst>
               <a:ext uri="{91240B29-F687-4f45-9708-019B960494DF}">
-                <a14:hiddenLine xmlns="" xmlns:a14="http://schemas.microsoft.com/office/drawing/2010/main" w="9525">
+                <a14:hiddenLine xmlns:a14="http://schemas.microsoft.com/office/drawing/2010/main" xmlns="" w="9525">
                   <a:solidFill>
                     <a:srgbClr val="000000"/>
                   </a:solidFill>
@@ -9013,7 +9013,7 @@
             </a:ln>
             <a:extLst>
               <a:ext uri="{91240B29-F687-4f45-9708-019B960494DF}">
-                <a14:hiddenLine xmlns="" xmlns:a14="http://schemas.microsoft.com/office/drawing/2010/main" w="9525">
+                <a14:hiddenLine xmlns:a14="http://schemas.microsoft.com/office/drawing/2010/main" xmlns="" w="9525">
                   <a:solidFill>
                     <a:srgbClr val="000000"/>
                   </a:solidFill>
@@ -9075,7 +9075,7 @@
             </a:ln>
             <a:extLst>
               <a:ext uri="{91240B29-F687-4f45-9708-019B960494DF}">
-                <a14:hiddenLine xmlns="" xmlns:a14="http://schemas.microsoft.com/office/drawing/2010/main" w="9525">
+                <a14:hiddenLine xmlns:a14="http://schemas.microsoft.com/office/drawing/2010/main" xmlns="" w="9525">
                   <a:solidFill>
                     <a:srgbClr val="000000"/>
                   </a:solidFill>
@@ -9137,7 +9137,7 @@
             </a:ln>
             <a:extLst>
               <a:ext uri="{91240B29-F687-4f45-9708-019B960494DF}">
-                <a14:hiddenLine xmlns="" xmlns:a14="http://schemas.microsoft.com/office/drawing/2010/main" w="9525">
+                <a14:hiddenLine xmlns:a14="http://schemas.microsoft.com/office/drawing/2010/main" xmlns="" w="9525">
                   <a:solidFill>
                     <a:srgbClr val="000000"/>
                   </a:solidFill>
@@ -9227,7 +9227,7 @@
             </a:ln>
             <a:extLst>
               <a:ext uri="{91240B29-F687-4f45-9708-019B960494DF}">
-                <a14:hiddenLine xmlns="" xmlns:a14="http://schemas.microsoft.com/office/drawing/2010/main" w="9525">
+                <a14:hiddenLine xmlns:a14="http://schemas.microsoft.com/office/drawing/2010/main" xmlns="" w="9525">
                   <a:solidFill>
                     <a:srgbClr val="000000"/>
                   </a:solidFill>
@@ -9295,7 +9295,7 @@
             </a:ln>
             <a:extLst>
               <a:ext uri="{91240B29-F687-4f45-9708-019B960494DF}">
-                <a14:hiddenLine xmlns="" xmlns:a14="http://schemas.microsoft.com/office/drawing/2010/main" w="9525">
+                <a14:hiddenLine xmlns:a14="http://schemas.microsoft.com/office/drawing/2010/main" xmlns="" w="9525">
                   <a:solidFill>
                     <a:srgbClr val="000000"/>
                   </a:solidFill>
@@ -9357,7 +9357,7 @@
             </a:ln>
             <a:extLst>
               <a:ext uri="{91240B29-F687-4f45-9708-019B960494DF}">
-                <a14:hiddenLine xmlns="" xmlns:a14="http://schemas.microsoft.com/office/drawing/2010/main" w="9525">
+                <a14:hiddenLine xmlns:a14="http://schemas.microsoft.com/office/drawing/2010/main" xmlns="" w="9525">
                   <a:solidFill>
                     <a:srgbClr val="000000"/>
                   </a:solidFill>
@@ -9447,7 +9447,7 @@
             </a:ln>
             <a:extLst>
               <a:ext uri="{91240B29-F687-4f45-9708-019B960494DF}">
-                <a14:hiddenLine xmlns="" xmlns:a14="http://schemas.microsoft.com/office/drawing/2010/main" w="9525">
+                <a14:hiddenLine xmlns:a14="http://schemas.microsoft.com/office/drawing/2010/main" xmlns="" w="9525">
                   <a:solidFill>
                     <a:srgbClr val="000000"/>
                   </a:solidFill>
@@ -9509,7 +9509,7 @@
             </a:ln>
             <a:extLst>
               <a:ext uri="{91240B29-F687-4f45-9708-019B960494DF}">
-                <a14:hiddenLine xmlns="" xmlns:a14="http://schemas.microsoft.com/office/drawing/2010/main" w="9525">
+                <a14:hiddenLine xmlns:a14="http://schemas.microsoft.com/office/drawing/2010/main" xmlns="" w="9525">
                   <a:solidFill>
                     <a:srgbClr val="000000"/>
                   </a:solidFill>
@@ -9599,7 +9599,7 @@
             </a:ln>
             <a:extLst>
               <a:ext uri="{91240B29-F687-4f45-9708-019B960494DF}">
-                <a14:hiddenLine xmlns="" xmlns:a14="http://schemas.microsoft.com/office/drawing/2010/main" w="9525">
+                <a14:hiddenLine xmlns:a14="http://schemas.microsoft.com/office/drawing/2010/main" xmlns="" w="9525">
                   <a:solidFill>
                     <a:srgbClr val="000000"/>
                   </a:solidFill>
@@ -9661,7 +9661,7 @@
             </a:ln>
             <a:extLst>
               <a:ext uri="{91240B29-F687-4f45-9708-019B960494DF}">
-                <a14:hiddenLine xmlns="" xmlns:a14="http://schemas.microsoft.com/office/drawing/2010/main" w="9525">
+                <a14:hiddenLine xmlns:a14="http://schemas.microsoft.com/office/drawing/2010/main" xmlns="" w="9525">
                   <a:solidFill>
                     <a:srgbClr val="000000"/>
                   </a:solidFill>
@@ -9751,7 +9751,7 @@
             </a:ln>
             <a:extLst>
               <a:ext uri="{91240B29-F687-4f45-9708-019B960494DF}">
-                <a14:hiddenLine xmlns="" xmlns:a14="http://schemas.microsoft.com/office/drawing/2010/main" w="9525">
+                <a14:hiddenLine xmlns:a14="http://schemas.microsoft.com/office/drawing/2010/main" xmlns="" w="9525">
                   <a:solidFill>
                     <a:srgbClr val="000000"/>
                   </a:solidFill>
@@ -9785,7 +9785,7 @@
             </a:ln>
             <a:extLst>
               <a:ext uri="{91240B29-F687-4f45-9708-019B960494DF}">
-                <a14:hiddenLine xmlns="" xmlns:a14="http://schemas.microsoft.com/office/drawing/2010/main" w="9525">
+                <a14:hiddenLine xmlns:a14="http://schemas.microsoft.com/office/drawing/2010/main" xmlns="" w="9525">
                   <a:solidFill>
                     <a:srgbClr val="000000"/>
                   </a:solidFill>
@@ -9850,7 +9850,7 @@
             </a:ln>
             <a:extLst>
               <a:ext uri="{91240B29-F687-4f45-9708-019B960494DF}">
-                <a14:hiddenLine xmlns="" xmlns:a14="http://schemas.microsoft.com/office/drawing/2010/main" w="9525">
+                <a14:hiddenLine xmlns:a14="http://schemas.microsoft.com/office/drawing/2010/main" xmlns="" w="9525">
                   <a:solidFill>
                     <a:srgbClr val="000000"/>
                   </a:solidFill>
@@ -9940,7 +9940,7 @@
             </a:ln>
             <a:extLst>
               <a:ext uri="{91240B29-F687-4f45-9708-019B960494DF}">
-                <a14:hiddenLine xmlns="" xmlns:a14="http://schemas.microsoft.com/office/drawing/2010/main" w="9525">
+                <a14:hiddenLine xmlns:a14="http://schemas.microsoft.com/office/drawing/2010/main" xmlns="" w="9525">
                   <a:solidFill>
                     <a:srgbClr val="000000"/>
                   </a:solidFill>
@@ -10002,7 +10002,7 @@
             </a:ln>
             <a:extLst>
               <a:ext uri="{91240B29-F687-4f45-9708-019B960494DF}">
-                <a14:hiddenLine xmlns="" xmlns:a14="http://schemas.microsoft.com/office/drawing/2010/main" w="9525">
+                <a14:hiddenLine xmlns:a14="http://schemas.microsoft.com/office/drawing/2010/main" xmlns="" w="9525">
                   <a:solidFill>
                     <a:srgbClr val="000000"/>
                   </a:solidFill>
@@ -10092,7 +10092,7 @@
             </a:ln>
             <a:extLst>
               <a:ext uri="{91240B29-F687-4f45-9708-019B960494DF}">
-                <a14:hiddenLine xmlns="" xmlns:a14="http://schemas.microsoft.com/office/drawing/2010/main" w="9525">
+                <a14:hiddenLine xmlns:a14="http://schemas.microsoft.com/office/drawing/2010/main" xmlns="" w="9525">
                   <a:solidFill>
                     <a:srgbClr val="000000"/>
                   </a:solidFill>
@@ -10182,7 +10182,7 @@
             </a:ln>
             <a:extLst>
               <a:ext uri="{91240B29-F687-4f45-9708-019B960494DF}">
-                <a14:hiddenLine xmlns="" xmlns:a14="http://schemas.microsoft.com/office/drawing/2010/main" w="9525">
+                <a14:hiddenLine xmlns:a14="http://schemas.microsoft.com/office/drawing/2010/main" xmlns="" w="9525">
                   <a:solidFill>
                     <a:srgbClr val="000000"/>
                   </a:solidFill>
@@ -10247,7 +10247,7 @@
             </a:ln>
             <a:extLst>
               <a:ext uri="{91240B29-F687-4f45-9708-019B960494DF}">
-                <a14:hiddenLine xmlns="" xmlns:a14="http://schemas.microsoft.com/office/drawing/2010/main" w="9525">
+                <a14:hiddenLine xmlns:a14="http://schemas.microsoft.com/office/drawing/2010/main" xmlns="" w="9525">
                   <a:solidFill>
                     <a:srgbClr val="000000"/>
                   </a:solidFill>
@@ -10309,7 +10309,7 @@
             </a:ln>
             <a:extLst>
               <a:ext uri="{91240B29-F687-4f45-9708-019B960494DF}">
-                <a14:hiddenLine xmlns="" xmlns:a14="http://schemas.microsoft.com/office/drawing/2010/main" w="9525">
+                <a14:hiddenLine xmlns:a14="http://schemas.microsoft.com/office/drawing/2010/main" xmlns="" w="9525">
                   <a:solidFill>
                     <a:srgbClr val="000000"/>
                   </a:solidFill>
@@ -10399,7 +10399,7 @@
             </a:ln>
             <a:extLst>
               <a:ext uri="{91240B29-F687-4f45-9708-019B960494DF}">
-                <a14:hiddenLine xmlns="" xmlns:a14="http://schemas.microsoft.com/office/drawing/2010/main" w="9525">
+                <a14:hiddenLine xmlns:a14="http://schemas.microsoft.com/office/drawing/2010/main" xmlns="" w="9525">
                   <a:solidFill>
                     <a:srgbClr val="000000"/>
                   </a:solidFill>
@@ -10489,7 +10489,7 @@
             </a:ln>
             <a:extLst>
               <a:ext uri="{91240B29-F687-4f45-9708-019B960494DF}">
-                <a14:hiddenLine xmlns="" xmlns:a14="http://schemas.microsoft.com/office/drawing/2010/main" w="9525">
+                <a14:hiddenLine xmlns:a14="http://schemas.microsoft.com/office/drawing/2010/main" xmlns="" w="9525">
                   <a:solidFill>
                     <a:srgbClr val="000000"/>
                   </a:solidFill>
@@ -10551,7 +10551,7 @@
             </a:ln>
             <a:extLst>
               <a:ext uri="{91240B29-F687-4f45-9708-019B960494DF}">
-                <a14:hiddenLine xmlns="" xmlns:a14="http://schemas.microsoft.com/office/drawing/2010/main" w="9525">
+                <a14:hiddenLine xmlns:a14="http://schemas.microsoft.com/office/drawing/2010/main" xmlns="" w="9525">
                   <a:solidFill>
                     <a:srgbClr val="000000"/>
                   </a:solidFill>
@@ -10671,7 +10671,7 @@
             </a:ln>
             <a:extLst>
               <a:ext uri="{91240B29-F687-4f45-9708-019B960494DF}">
-                <a14:hiddenLine xmlns="" xmlns:a14="http://schemas.microsoft.com/office/drawing/2010/main" w="9525">
+                <a14:hiddenLine xmlns:a14="http://schemas.microsoft.com/office/drawing/2010/main" xmlns="" w="9525">
                   <a:solidFill>
                     <a:srgbClr val="000000"/>
                   </a:solidFill>
@@ -10739,7 +10739,7 @@
             </a:ln>
             <a:extLst>
               <a:ext uri="{91240B29-F687-4f45-9708-019B960494DF}">
-                <a14:hiddenLine xmlns="" xmlns:a14="http://schemas.microsoft.com/office/drawing/2010/main" w="9525">
+                <a14:hiddenLine xmlns:a14="http://schemas.microsoft.com/office/drawing/2010/main" xmlns="" w="9525">
                   <a:solidFill>
                     <a:srgbClr val="000000"/>
                   </a:solidFill>
@@ -10829,7 +10829,7 @@
             </a:ln>
             <a:extLst>
               <a:ext uri="{91240B29-F687-4f45-9708-019B960494DF}">
-                <a14:hiddenLine xmlns="" xmlns:a14="http://schemas.microsoft.com/office/drawing/2010/main" w="9525">
+                <a14:hiddenLine xmlns:a14="http://schemas.microsoft.com/office/drawing/2010/main" xmlns="" w="9525">
                   <a:solidFill>
                     <a:srgbClr val="000000"/>
                   </a:solidFill>
@@ -11016,8 +11016,8 @@
           </a:lstStyle>
           <a:p>
             <a:r>
-              <a:rPr lang="en-US"/>
-              <a:t>2024-08-17</a:t>
+              <a:rPr lang="en-CA"/>
+              <a:t>2025-05-15</a:t>
             </a:r>
             <a:endParaRPr lang="en-US" dirty="0"/>
           </a:p>
@@ -11326,8 +11326,8 @@
           <a:lstStyle/>
           <a:p>
             <a:r>
-              <a:rPr lang="en-US"/>
-              <a:t>2024-08-17</a:t>
+              <a:rPr lang="en-CA"/>
+              <a:t>2025-05-15</a:t>
             </a:r>
             <a:endParaRPr lang="en-US" dirty="0"/>
           </a:p>
@@ -11599,8 +11599,8 @@
           <a:lstStyle/>
           <a:p>
             <a:r>
-              <a:rPr lang="en-US"/>
-              <a:t>2024-08-17</a:t>
+              <a:rPr lang="en-CA"/>
+              <a:t>2025-05-15</a:t>
             </a:r>
             <a:endParaRPr lang="en-US" dirty="0"/>
           </a:p>
@@ -11843,8 +11843,8 @@
           </a:lstStyle>
           <a:p>
             <a:r>
-              <a:rPr lang="en-US"/>
-              <a:t>2024-08-17</a:t>
+              <a:rPr lang="en-CA"/>
+              <a:t>2025-05-15</a:t>
             </a:r>
             <a:endParaRPr lang="en-US" dirty="0"/>
           </a:p>
@@ -12131,8 +12131,8 @@
           <a:lstStyle/>
           <a:p>
             <a:r>
-              <a:rPr lang="en-US"/>
-              <a:t>2024-08-17</a:t>
+              <a:rPr lang="en-CA"/>
+              <a:t>2025-05-15</a:t>
             </a:r>
             <a:endParaRPr lang="en-US" dirty="0"/>
           </a:p>
@@ -12633,8 +12633,8 @@
           <a:lstStyle/>
           <a:p>
             <a:r>
-              <a:rPr lang="en-US"/>
-              <a:t>2024-08-17</a:t>
+              <a:rPr lang="en-CA"/>
+              <a:t>2025-05-15</a:t>
             </a:r>
             <a:endParaRPr lang="en-US" dirty="0"/>
           </a:p>
@@ -13291,8 +13291,8 @@
           <a:lstStyle/>
           <a:p>
             <a:r>
-              <a:rPr lang="en-US"/>
-              <a:t>2024-08-17</a:t>
+              <a:rPr lang="en-CA"/>
+              <a:t>2025-05-15</a:t>
             </a:r>
             <a:endParaRPr lang="en-US" dirty="0"/>
           </a:p>
@@ -14027,8 +14027,8 @@
           <a:lstStyle/>
           <a:p>
             <a:r>
-              <a:rPr lang="en-US"/>
-              <a:t>2024-08-17</a:t>
+              <a:rPr lang="en-CA"/>
+              <a:t>2025-05-15</a:t>
             </a:r>
             <a:endParaRPr lang="en-US" dirty="0"/>
           </a:p>
@@ -14213,8 +14213,8 @@
           <a:lstStyle/>
           <a:p>
             <a:r>
-              <a:rPr lang="en-US"/>
-              <a:t>2024-08-17</a:t>
+              <a:rPr lang="en-CA"/>
+              <a:t>2025-05-15</a:t>
             </a:r>
             <a:endParaRPr lang="en-US" dirty="0"/>
           </a:p>
@@ -14409,8 +14409,8 @@
           <a:lstStyle/>
           <a:p>
             <a:r>
-              <a:rPr lang="en-US"/>
-              <a:t>2024-08-17</a:t>
+              <a:rPr lang="en-CA"/>
+              <a:t>2025-05-15</a:t>
             </a:r>
             <a:endParaRPr lang="en-US" dirty="0"/>
           </a:p>
@@ -14618,10 +14618,9 @@
           <a:lstStyle/>
           <a:p>
             <a:r>
-              <a:rPr lang="en-US"/>
-              <a:t>2024-08-17</a:t>
-            </a:r>
-            <a:endParaRPr lang="en-CA"/>
+              <a:rPr lang="en-CA"/>
+              <a:t>2025-05-15</a:t>
+            </a:r>
           </a:p>
         </p:txBody>
       </p:sp>
@@ -14798,8 +14797,8 @@
           <a:lstStyle/>
           <a:p>
             <a:r>
-              <a:rPr lang="en-US"/>
-              <a:t>2024-08-17</a:t>
+              <a:rPr lang="en-CA"/>
+              <a:t>2025-05-15</a:t>
             </a:r>
             <a:endParaRPr lang="en-US" dirty="0"/>
           </a:p>
@@ -15100,8 +15099,8 @@
           </a:lstStyle>
           <a:p>
             <a:r>
-              <a:rPr lang="en-US"/>
-              <a:t>2024-08-17</a:t>
+              <a:rPr lang="en-CA"/>
+              <a:t>2025-05-15</a:t>
             </a:r>
             <a:endParaRPr lang="en-US" dirty="0"/>
           </a:p>
@@ -15357,8 +15356,8 @@
           <a:lstStyle/>
           <a:p>
             <a:r>
-              <a:rPr lang="en-US"/>
-              <a:t>2024-08-17</a:t>
+              <a:rPr lang="en-CA"/>
+              <a:t>2025-05-15</a:t>
             </a:r>
             <a:endParaRPr lang="en-US" dirty="0"/>
           </a:p>
@@ -15754,8 +15753,8 @@
           <a:lstStyle/>
           <a:p>
             <a:r>
-              <a:rPr lang="en-US"/>
-              <a:t>2024-08-17</a:t>
+              <a:rPr lang="en-CA"/>
+              <a:t>2025-05-15</a:t>
             </a:r>
             <a:endParaRPr lang="en-US" dirty="0"/>
           </a:p>
@@ -15920,8 +15919,8 @@
           </a:lstStyle>
           <a:p>
             <a:r>
-              <a:rPr lang="en-US"/>
-              <a:t>2024-08-17</a:t>
+              <a:rPr lang="en-CA"/>
+              <a:t>2025-05-15</a:t>
             </a:r>
             <a:endParaRPr lang="en-US" dirty="0"/>
           </a:p>
@@ -16040,8 +16039,8 @@
           <a:lstStyle/>
           <a:p>
             <a:r>
-              <a:rPr lang="en-US"/>
-              <a:t>2024-08-17</a:t>
+              <a:rPr lang="en-CA"/>
+              <a:t>2025-05-15</a:t>
             </a:r>
             <a:endParaRPr lang="en-US" dirty="0"/>
           </a:p>
@@ -16305,8 +16304,8 @@
           <a:lstStyle/>
           <a:p>
             <a:r>
-              <a:rPr lang="en-US"/>
-              <a:t>2024-08-17</a:t>
+              <a:rPr lang="en-CA"/>
+              <a:t>2025-05-15</a:t>
             </a:r>
             <a:endParaRPr lang="en-US" dirty="0"/>
           </a:p>
@@ -16669,8 +16668,8 @@
           <a:lstStyle/>
           <a:p>
             <a:r>
-              <a:rPr lang="en-US"/>
-              <a:t>2024-08-17</a:t>
+              <a:rPr lang="en-CA"/>
+              <a:t>2025-05-15</a:t>
             </a:r>
             <a:endParaRPr lang="en-US" dirty="0"/>
           </a:p>
@@ -16949,7 +16948,7 @@
           <a:noFill/>
           <a:extLst>
             <a:ext uri="{909E8E84-426E-40dd-AFC4-6F175D3DCCD1}">
-              <a14:hiddenFill xmlns="" xmlns:a14="http://schemas.microsoft.com/office/drawing/2010/main">
+              <a14:hiddenFill xmlns:a14="http://schemas.microsoft.com/office/drawing/2010/main" xmlns="">
                 <a:solidFill>
                   <a:srgbClr val="FFFFFF"/>
                 </a:solidFill>
@@ -17029,7 +17028,7 @@
               </a:ln>
               <a:extLst>
                 <a:ext uri="{91240B29-F687-4f45-9708-019B960494DF}">
-                  <a14:hiddenLine xmlns="" xmlns:a14="http://schemas.microsoft.com/office/drawing/2010/main" w="9525">
+                  <a14:hiddenLine xmlns:a14="http://schemas.microsoft.com/office/drawing/2010/main" xmlns="" w="9525">
                     <a:solidFill>
                       <a:srgbClr val="000000"/>
                     </a:solidFill>
@@ -17119,7 +17118,7 @@
               </a:ln>
               <a:extLst>
                 <a:ext uri="{91240B29-F687-4f45-9708-019B960494DF}">
-                  <a14:hiddenLine xmlns="" xmlns:a14="http://schemas.microsoft.com/office/drawing/2010/main" w="9525">
+                  <a14:hiddenLine xmlns:a14="http://schemas.microsoft.com/office/drawing/2010/main" xmlns="" w="9525">
                     <a:solidFill>
                       <a:srgbClr val="000000"/>
                     </a:solidFill>
@@ -17209,7 +17208,7 @@
               </a:ln>
               <a:extLst>
                 <a:ext uri="{91240B29-F687-4f45-9708-019B960494DF}">
-                  <a14:hiddenLine xmlns="" xmlns:a14="http://schemas.microsoft.com/office/drawing/2010/main" w="9525">
+                  <a14:hiddenLine xmlns:a14="http://schemas.microsoft.com/office/drawing/2010/main" xmlns="" w="9525">
                     <a:solidFill>
                       <a:srgbClr val="000000"/>
                     </a:solidFill>
@@ -17271,7 +17270,7 @@
               </a:ln>
               <a:extLst>
                 <a:ext uri="{91240B29-F687-4f45-9708-019B960494DF}">
-                  <a14:hiddenLine xmlns="" xmlns:a14="http://schemas.microsoft.com/office/drawing/2010/main" w="9525">
+                  <a14:hiddenLine xmlns:a14="http://schemas.microsoft.com/office/drawing/2010/main" xmlns="" w="9525">
                     <a:solidFill>
                       <a:srgbClr val="000000"/>
                     </a:solidFill>
@@ -17361,7 +17360,7 @@
               </a:ln>
               <a:extLst>
                 <a:ext uri="{91240B29-F687-4f45-9708-019B960494DF}">
-                  <a14:hiddenLine xmlns="" xmlns:a14="http://schemas.microsoft.com/office/drawing/2010/main" w="9525">
+                  <a14:hiddenLine xmlns:a14="http://schemas.microsoft.com/office/drawing/2010/main" xmlns="" w="9525">
                     <a:solidFill>
                       <a:srgbClr val="000000"/>
                     </a:solidFill>
@@ -17423,7 +17422,7 @@
               </a:ln>
               <a:extLst>
                 <a:ext uri="{91240B29-F687-4f45-9708-019B960494DF}">
-                  <a14:hiddenLine xmlns="" xmlns:a14="http://schemas.microsoft.com/office/drawing/2010/main" w="9525">
+                  <a14:hiddenLine xmlns:a14="http://schemas.microsoft.com/office/drawing/2010/main" xmlns="" w="9525">
                     <a:solidFill>
                       <a:srgbClr val="000000"/>
                     </a:solidFill>
@@ -17485,7 +17484,7 @@
               </a:ln>
               <a:extLst>
                 <a:ext uri="{91240B29-F687-4f45-9708-019B960494DF}">
-                  <a14:hiddenLine xmlns="" xmlns:a14="http://schemas.microsoft.com/office/drawing/2010/main" w="9525">
+                  <a14:hiddenLine xmlns:a14="http://schemas.microsoft.com/office/drawing/2010/main" xmlns="" w="9525">
                     <a:solidFill>
                       <a:srgbClr val="000000"/>
                     </a:solidFill>
@@ -17575,7 +17574,7 @@
               </a:ln>
               <a:extLst>
                 <a:ext uri="{91240B29-F687-4f45-9708-019B960494DF}">
-                  <a14:hiddenLine xmlns="" xmlns:a14="http://schemas.microsoft.com/office/drawing/2010/main" w="9525">
+                  <a14:hiddenLine xmlns:a14="http://schemas.microsoft.com/office/drawing/2010/main" xmlns="" w="9525">
                     <a:solidFill>
                       <a:srgbClr val="000000"/>
                     </a:solidFill>
@@ -17665,7 +17664,7 @@
               </a:ln>
               <a:extLst>
                 <a:ext uri="{91240B29-F687-4f45-9708-019B960494DF}">
-                  <a14:hiddenLine xmlns="" xmlns:a14="http://schemas.microsoft.com/office/drawing/2010/main" w="9525">
+                  <a14:hiddenLine xmlns:a14="http://schemas.microsoft.com/office/drawing/2010/main" xmlns="" w="9525">
                     <a:solidFill>
                       <a:srgbClr val="000000"/>
                     </a:solidFill>
@@ -17727,7 +17726,7 @@
               </a:ln>
               <a:extLst>
                 <a:ext uri="{91240B29-F687-4f45-9708-019B960494DF}">
-                  <a14:hiddenLine xmlns="" xmlns:a14="http://schemas.microsoft.com/office/drawing/2010/main" w="9525">
+                  <a14:hiddenLine xmlns:a14="http://schemas.microsoft.com/office/drawing/2010/main" xmlns="" w="9525">
                     <a:solidFill>
                       <a:srgbClr val="000000"/>
                     </a:solidFill>
@@ -17837,7 +17836,7 @@
               </a:ln>
               <a:extLst>
                 <a:ext uri="{91240B29-F687-4f45-9708-019B960494DF}">
-                  <a14:hiddenLine xmlns="" xmlns:a14="http://schemas.microsoft.com/office/drawing/2010/main" w="9525">
+                  <a14:hiddenLine xmlns:a14="http://schemas.microsoft.com/office/drawing/2010/main" xmlns="" w="9525">
                     <a:solidFill>
                       <a:srgbClr val="000000"/>
                     </a:solidFill>
@@ -17921,7 +17920,7 @@
               </a:ln>
               <a:extLst>
                 <a:ext uri="{91240B29-F687-4f45-9708-019B960494DF}">
-                  <a14:hiddenLine xmlns="" xmlns:a14="http://schemas.microsoft.com/office/drawing/2010/main" w="9525">
+                  <a14:hiddenLine xmlns:a14="http://schemas.microsoft.com/office/drawing/2010/main" xmlns="" w="9525">
                     <a:solidFill>
                       <a:srgbClr val="000000"/>
                     </a:solidFill>
@@ -17983,7 +17982,7 @@
               </a:ln>
               <a:extLst>
                 <a:ext uri="{91240B29-F687-4f45-9708-019B960494DF}">
-                  <a14:hiddenLine xmlns="" xmlns:a14="http://schemas.microsoft.com/office/drawing/2010/main" w="9525">
+                  <a14:hiddenLine xmlns:a14="http://schemas.microsoft.com/office/drawing/2010/main" xmlns="" w="9525">
                     <a:solidFill>
                       <a:srgbClr val="000000"/>
                     </a:solidFill>
@@ -18045,7 +18044,7 @@
               </a:ln>
               <a:extLst>
                 <a:ext uri="{91240B29-F687-4f45-9708-019B960494DF}">
-                  <a14:hiddenLine xmlns="" xmlns:a14="http://schemas.microsoft.com/office/drawing/2010/main" w="9525">
+                  <a14:hiddenLine xmlns:a14="http://schemas.microsoft.com/office/drawing/2010/main" xmlns="" w="9525">
                     <a:solidFill>
                       <a:srgbClr val="000000"/>
                     </a:solidFill>
@@ -18135,7 +18134,7 @@
               </a:ln>
               <a:extLst>
                 <a:ext uri="{91240B29-F687-4f45-9708-019B960494DF}">
-                  <a14:hiddenLine xmlns="" xmlns:a14="http://schemas.microsoft.com/office/drawing/2010/main" w="9525">
+                  <a14:hiddenLine xmlns:a14="http://schemas.microsoft.com/office/drawing/2010/main" xmlns="" w="9525">
                     <a:solidFill>
                       <a:srgbClr val="000000"/>
                     </a:solidFill>
@@ -18169,7 +18168,7 @@
               </a:ln>
               <a:extLst>
                 <a:ext uri="{91240B29-F687-4f45-9708-019B960494DF}">
-                  <a14:hiddenLine xmlns="" xmlns:a14="http://schemas.microsoft.com/office/drawing/2010/main" w="9525">
+                  <a14:hiddenLine xmlns:a14="http://schemas.microsoft.com/office/drawing/2010/main" xmlns="" w="9525">
                     <a:solidFill>
                       <a:srgbClr val="000000"/>
                     </a:solidFill>
@@ -18234,7 +18233,7 @@
               </a:ln>
               <a:extLst>
                 <a:ext uri="{91240B29-F687-4f45-9708-019B960494DF}">
-                  <a14:hiddenLine xmlns="" xmlns:a14="http://schemas.microsoft.com/office/drawing/2010/main" w="9525">
+                  <a14:hiddenLine xmlns:a14="http://schemas.microsoft.com/office/drawing/2010/main" xmlns="" w="9525">
                     <a:solidFill>
                       <a:srgbClr val="000000"/>
                     </a:solidFill>
@@ -18324,7 +18323,7 @@
               </a:ln>
               <a:extLst>
                 <a:ext uri="{91240B29-F687-4f45-9708-019B960494DF}">
-                  <a14:hiddenLine xmlns="" xmlns:a14="http://schemas.microsoft.com/office/drawing/2010/main" w="9525">
+                  <a14:hiddenLine xmlns:a14="http://schemas.microsoft.com/office/drawing/2010/main" xmlns="" w="9525">
                     <a:solidFill>
                       <a:srgbClr val="000000"/>
                     </a:solidFill>
@@ -18386,7 +18385,7 @@
               </a:ln>
               <a:extLst>
                 <a:ext uri="{91240B29-F687-4f45-9708-019B960494DF}">
-                  <a14:hiddenLine xmlns="" xmlns:a14="http://schemas.microsoft.com/office/drawing/2010/main" w="9525">
+                  <a14:hiddenLine xmlns:a14="http://schemas.microsoft.com/office/drawing/2010/main" xmlns="" w="9525">
                     <a:solidFill>
                       <a:srgbClr val="000000"/>
                     </a:solidFill>
@@ -18476,7 +18475,7 @@
               </a:ln>
               <a:extLst>
                 <a:ext uri="{91240B29-F687-4f45-9708-019B960494DF}">
-                  <a14:hiddenLine xmlns="" xmlns:a14="http://schemas.microsoft.com/office/drawing/2010/main" w="9525">
+                  <a14:hiddenLine xmlns:a14="http://schemas.microsoft.com/office/drawing/2010/main" xmlns="" w="9525">
                     <a:solidFill>
                       <a:srgbClr val="000000"/>
                     </a:solidFill>
@@ -18541,7 +18540,7 @@
               </a:ln>
               <a:extLst>
                 <a:ext uri="{91240B29-F687-4f45-9708-019B960494DF}">
-                  <a14:hiddenLine xmlns="" xmlns:a14="http://schemas.microsoft.com/office/drawing/2010/main" w="9525">
+                  <a14:hiddenLine xmlns:a14="http://schemas.microsoft.com/office/drawing/2010/main" xmlns="" w="9525">
                     <a:solidFill>
                       <a:srgbClr val="000000"/>
                     </a:solidFill>
@@ -18603,7 +18602,7 @@
               </a:ln>
               <a:extLst>
                 <a:ext uri="{91240B29-F687-4f45-9708-019B960494DF}">
-                  <a14:hiddenLine xmlns="" xmlns:a14="http://schemas.microsoft.com/office/drawing/2010/main" w="9525">
+                  <a14:hiddenLine xmlns:a14="http://schemas.microsoft.com/office/drawing/2010/main" xmlns="" w="9525">
                     <a:solidFill>
                       <a:srgbClr val="000000"/>
                     </a:solidFill>
@@ -18693,7 +18692,7 @@
               </a:ln>
               <a:extLst>
                 <a:ext uri="{91240B29-F687-4f45-9708-019B960494DF}">
-                  <a14:hiddenLine xmlns="" xmlns:a14="http://schemas.microsoft.com/office/drawing/2010/main" w="9525">
+                  <a14:hiddenLine xmlns:a14="http://schemas.microsoft.com/office/drawing/2010/main" xmlns="" w="9525">
                     <a:solidFill>
                       <a:srgbClr val="000000"/>
                     </a:solidFill>
@@ -18783,7 +18782,7 @@
               </a:ln>
               <a:extLst>
                 <a:ext uri="{91240B29-F687-4f45-9708-019B960494DF}">
-                  <a14:hiddenLine xmlns="" xmlns:a14="http://schemas.microsoft.com/office/drawing/2010/main" w="9525">
+                  <a14:hiddenLine xmlns:a14="http://schemas.microsoft.com/office/drawing/2010/main" xmlns="" w="9525">
                     <a:solidFill>
                       <a:srgbClr val="000000"/>
                     </a:solidFill>
@@ -18848,7 +18847,7 @@
               </a:ln>
               <a:extLst>
                 <a:ext uri="{91240B29-F687-4f45-9708-019B960494DF}">
-                  <a14:hiddenLine xmlns="" xmlns:a14="http://schemas.microsoft.com/office/drawing/2010/main" w="9525">
+                  <a14:hiddenLine xmlns:a14="http://schemas.microsoft.com/office/drawing/2010/main" xmlns="" w="9525">
                     <a:solidFill>
                       <a:srgbClr val="000000"/>
                     </a:solidFill>
@@ -18968,7 +18967,7 @@
               </a:ln>
               <a:extLst>
                 <a:ext uri="{91240B29-F687-4f45-9708-019B960494DF}">
-                  <a14:hiddenLine xmlns="" xmlns:a14="http://schemas.microsoft.com/office/drawing/2010/main" w="9525">
+                  <a14:hiddenLine xmlns:a14="http://schemas.microsoft.com/office/drawing/2010/main" xmlns="" w="9525">
                     <a:solidFill>
                       <a:srgbClr val="000000"/>
                     </a:solidFill>
@@ -19066,7 +19065,7 @@
               </a:ln>
               <a:extLst>
                 <a:ext uri="{91240B29-F687-4f45-9708-019B960494DF}">
-                  <a14:hiddenLine xmlns="" xmlns:a14="http://schemas.microsoft.com/office/drawing/2010/main" w="9525">
+                  <a14:hiddenLine xmlns:a14="http://schemas.microsoft.com/office/drawing/2010/main" xmlns="" w="9525">
                     <a:solidFill>
                       <a:srgbClr val="000000"/>
                     </a:solidFill>
@@ -19181,7 +19180,7 @@
               </a:ln>
               <a:extLst>
                 <a:ext uri="{91240B29-F687-4f45-9708-019B960494DF}">
-                  <a14:hiddenLine xmlns="" xmlns:a14="http://schemas.microsoft.com/office/drawing/2010/main" w="9525">
+                  <a14:hiddenLine xmlns:a14="http://schemas.microsoft.com/office/drawing/2010/main" xmlns="" w="9525">
                     <a:solidFill>
                       <a:srgbClr val="000000"/>
                     </a:solidFill>
@@ -19271,7 +19270,7 @@
               </a:ln>
               <a:extLst>
                 <a:ext uri="{91240B29-F687-4f45-9708-019B960494DF}">
-                  <a14:hiddenLine xmlns="" xmlns:a14="http://schemas.microsoft.com/office/drawing/2010/main" w="9525">
+                  <a14:hiddenLine xmlns:a14="http://schemas.microsoft.com/office/drawing/2010/main" xmlns="" w="9525">
                     <a:solidFill>
                       <a:srgbClr val="000000"/>
                     </a:solidFill>
@@ -19336,7 +19335,7 @@
               </a:ln>
               <a:extLst>
                 <a:ext uri="{91240B29-F687-4f45-9708-019B960494DF}">
-                  <a14:hiddenLine xmlns="" xmlns:a14="http://schemas.microsoft.com/office/drawing/2010/main" w="9525">
+                  <a14:hiddenLine xmlns:a14="http://schemas.microsoft.com/office/drawing/2010/main" xmlns="" w="9525">
                     <a:solidFill>
                       <a:srgbClr val="000000"/>
                     </a:solidFill>
@@ -19426,7 +19425,7 @@
               </a:ln>
               <a:extLst>
                 <a:ext uri="{91240B29-F687-4f45-9708-019B960494DF}">
-                  <a14:hiddenLine xmlns="" xmlns:a14="http://schemas.microsoft.com/office/drawing/2010/main" w="9525">
+                  <a14:hiddenLine xmlns:a14="http://schemas.microsoft.com/office/drawing/2010/main" xmlns="" w="9525">
                     <a:solidFill>
                       <a:srgbClr val="000000"/>
                     </a:solidFill>
@@ -19494,7 +19493,7 @@
               </a:ln>
               <a:extLst>
                 <a:ext uri="{91240B29-F687-4f45-9708-019B960494DF}">
-                  <a14:hiddenLine xmlns="" xmlns:a14="http://schemas.microsoft.com/office/drawing/2010/main" w="9525">
+                  <a14:hiddenLine xmlns:a14="http://schemas.microsoft.com/office/drawing/2010/main" xmlns="" w="9525">
                     <a:solidFill>
                       <a:srgbClr val="000000"/>
                     </a:solidFill>
@@ -19584,7 +19583,7 @@
               </a:ln>
               <a:extLst>
                 <a:ext uri="{91240B29-F687-4f45-9708-019B960494DF}">
-                  <a14:hiddenLine xmlns="" xmlns:a14="http://schemas.microsoft.com/office/drawing/2010/main" w="9525">
+                  <a14:hiddenLine xmlns:a14="http://schemas.microsoft.com/office/drawing/2010/main" xmlns="" w="9525">
                     <a:solidFill>
                       <a:srgbClr val="000000"/>
                     </a:solidFill>
@@ -19652,7 +19651,7 @@
               </a:ln>
               <a:extLst>
                 <a:ext uri="{91240B29-F687-4f45-9708-019B960494DF}">
-                  <a14:hiddenLine xmlns="" xmlns:a14="http://schemas.microsoft.com/office/drawing/2010/main" w="9525">
+                  <a14:hiddenLine xmlns:a14="http://schemas.microsoft.com/office/drawing/2010/main" xmlns="" w="9525">
                     <a:solidFill>
                       <a:srgbClr val="000000"/>
                     </a:solidFill>
@@ -19742,7 +19741,7 @@
               </a:ln>
               <a:extLst>
                 <a:ext uri="{91240B29-F687-4f45-9708-019B960494DF}">
-                  <a14:hiddenLine xmlns="" xmlns:a14="http://schemas.microsoft.com/office/drawing/2010/main" w="9525">
+                  <a14:hiddenLine xmlns:a14="http://schemas.microsoft.com/office/drawing/2010/main" xmlns="" w="9525">
                     <a:solidFill>
                       <a:srgbClr val="000000"/>
                     </a:solidFill>
@@ -19776,7 +19775,7 @@
               </a:ln>
               <a:extLst>
                 <a:ext uri="{91240B29-F687-4f45-9708-019B960494DF}">
-                  <a14:hiddenLine xmlns="" xmlns:a14="http://schemas.microsoft.com/office/drawing/2010/main" w="9525">
+                  <a14:hiddenLine xmlns:a14="http://schemas.microsoft.com/office/drawing/2010/main" xmlns="" w="9525">
                     <a:solidFill>
                       <a:srgbClr val="000000"/>
                     </a:solidFill>
@@ -19951,8 +19950,8 @@
           </a:lstStyle>
           <a:p>
             <a:r>
-              <a:rPr lang="en-US"/>
-              <a:t>2024-08-17</a:t>
+              <a:rPr lang="en-CA"/>
+              <a:t>2025-05-15</a:t>
             </a:r>
             <a:endParaRPr lang="en-US" dirty="0"/>
           </a:p>
@@ -21028,8 +21027,8 @@
           <a:lstStyle/>
           <a:p>
             <a:r>
-              <a:rPr lang="en-US"/>
-              <a:t>2024-08-17</a:t>
+              <a:rPr lang="en-CA"/>
+              <a:t>2025-05-15</a:t>
             </a:r>
             <a:endParaRPr lang="en-US" dirty="0"/>
           </a:p>
@@ -21447,10 +21446,9 @@
           <a:lstStyle/>
           <a:p>
             <a:r>
-              <a:rPr lang="en-US"/>
-              <a:t>2024-08-17</a:t>
-            </a:r>
-            <a:endParaRPr lang="en-CA"/>
+              <a:rPr lang="en-CA"/>
+              <a:t>2025-05-15</a:t>
+            </a:r>
           </a:p>
         </p:txBody>
       </p:sp>
@@ -21673,10 +21671,9 @@
           <a:lstStyle/>
           <a:p>
             <a:r>
-              <a:rPr lang="en-US"/>
-              <a:t>2024-08-17</a:t>
-            </a:r>
-            <a:endParaRPr lang="en-CA"/>
+              <a:rPr lang="en-CA"/>
+              <a:t>2025-05-15</a:t>
+            </a:r>
           </a:p>
         </p:txBody>
       </p:sp>
@@ -21866,10 +21863,9 @@
           <a:lstStyle/>
           <a:p>
             <a:r>
-              <a:rPr lang="en-US"/>
-              <a:t>2024-08-17</a:t>
-            </a:r>
-            <a:endParaRPr lang="en-CA"/>
+              <a:rPr lang="en-CA"/>
+              <a:t>2025-05-15</a:t>
+            </a:r>
           </a:p>
         </p:txBody>
       </p:sp>
@@ -22121,10 +22117,9 @@
           <a:lstStyle/>
           <a:p>
             <a:r>
-              <a:rPr lang="en-US"/>
-              <a:t>2024-08-17</a:t>
-            </a:r>
-            <a:endParaRPr lang="en-CA"/>
+              <a:rPr lang="en-CA"/>
+              <a:t>2025-05-15</a:t>
+            </a:r>
           </a:p>
         </p:txBody>
       </p:sp>
@@ -22891,10 +22886,9 @@
           <a:lstStyle/>
           <a:p>
             <a:r>
-              <a:rPr lang="en-US"/>
-              <a:t>2024-08-17</a:t>
-            </a:r>
-            <a:endParaRPr lang="en-CA"/>
+              <a:rPr lang="en-CA"/>
+              <a:t>2025-05-15</a:t>
+            </a:r>
           </a:p>
         </p:txBody>
       </p:sp>
@@ -23613,10 +23607,9 @@
           <a:lstStyle/>
           <a:p>
             <a:r>
-              <a:rPr lang="en-US"/>
-              <a:t>2024-08-17</a:t>
-            </a:r>
-            <a:endParaRPr lang="en-CA"/>
+              <a:rPr lang="en-CA"/>
+              <a:t>2025-05-15</a:t>
+            </a:r>
           </a:p>
         </p:txBody>
       </p:sp>
@@ -23873,10 +23866,9 @@
           <a:lstStyle/>
           <a:p>
             <a:r>
-              <a:rPr lang="en-US"/>
-              <a:t>2024-08-17</a:t>
-            </a:r>
-            <a:endParaRPr lang="en-CA"/>
+              <a:rPr lang="en-CA"/>
+              <a:t>2025-05-15</a:t>
+            </a:r>
           </a:p>
         </p:txBody>
       </p:sp>
@@ -24107,10 +24099,9 @@
           <a:lstStyle/>
           <a:p>
             <a:r>
-              <a:rPr lang="en-US"/>
-              <a:t>2024-08-17</a:t>
-            </a:r>
-            <a:endParaRPr lang="en-CA"/>
+              <a:rPr lang="en-CA"/>
+              <a:t>2025-05-15</a:t>
+            </a:r>
           </a:p>
         </p:txBody>
       </p:sp>
@@ -25113,10 +25104,9 @@
           <a:lstStyle/>
           <a:p>
             <a:r>
-              <a:rPr lang="en-US"/>
-              <a:t>2024-08-17</a:t>
-            </a:r>
-            <a:endParaRPr lang="en-CA"/>
+              <a:rPr lang="en-CA"/>
+              <a:t>2025-05-15</a:t>
+            </a:r>
           </a:p>
         </p:txBody>
       </p:sp>
@@ -25424,8 +25414,8 @@
           <a:lstStyle/>
           <a:p>
             <a:r>
-              <a:rPr lang="en-US"/>
-              <a:t>2024-08-17</a:t>
+              <a:rPr lang="en-CA"/>
+              <a:t>2025-05-15</a:t>
             </a:r>
             <a:endParaRPr lang="en-US" dirty="0"/>
           </a:p>
@@ -25837,8 +25827,8 @@
           <a:lstStyle/>
           <a:p>
             <a:r>
-              <a:rPr lang="en-US"/>
-              <a:t>2024-08-17</a:t>
+              <a:rPr lang="en-CA"/>
+              <a:t>2025-05-15</a:t>
             </a:r>
             <a:endParaRPr lang="en-US" dirty="0"/>
           </a:p>
@@ -26377,10 +26367,9 @@
           <a:lstStyle/>
           <a:p>
             <a:r>
-              <a:rPr lang="en-US"/>
-              <a:t>2024-08-17</a:t>
-            </a:r>
-            <a:endParaRPr lang="en-CA"/>
+              <a:rPr lang="en-CA"/>
+              <a:t>2025-05-15</a:t>
+            </a:r>
           </a:p>
         </p:txBody>
       </p:sp>
@@ -27388,10 +27377,9 @@
           <a:lstStyle/>
           <a:p>
             <a:r>
-              <a:rPr lang="en-US"/>
-              <a:t>2024-08-17</a:t>
-            </a:r>
-            <a:endParaRPr lang="en-CA"/>
+              <a:rPr lang="en-CA"/>
+              <a:t>2025-05-15</a:t>
+            </a:r>
           </a:p>
         </p:txBody>
       </p:sp>
@@ -27870,10 +27858,9 @@
           <a:lstStyle/>
           <a:p>
             <a:r>
-              <a:rPr lang="en-US"/>
-              <a:t>2024-08-17</a:t>
-            </a:r>
-            <a:endParaRPr lang="en-CA"/>
+              <a:rPr lang="en-CA"/>
+              <a:t>2025-05-15</a:t>
+            </a:r>
           </a:p>
         </p:txBody>
       </p:sp>
@@ -29194,10 +29181,9 @@
           <a:lstStyle/>
           <a:p>
             <a:r>
-              <a:rPr lang="en-US"/>
-              <a:t>2024-08-17</a:t>
-            </a:r>
-            <a:endParaRPr lang="en-CA"/>
+              <a:rPr lang="en-CA"/>
+              <a:t>2025-05-15</a:t>
+            </a:r>
           </a:p>
         </p:txBody>
       </p:sp>
@@ -29419,10 +29405,9 @@
           <a:lstStyle/>
           <a:p>
             <a:r>
-              <a:rPr lang="en-US"/>
-              <a:t>2024-08-17</a:t>
-            </a:r>
-            <a:endParaRPr lang="en-CA"/>
+              <a:rPr lang="en-CA"/>
+              <a:t>2025-05-15</a:t>
+            </a:r>
           </a:p>
         </p:txBody>
       </p:sp>
@@ -29912,10 +29897,9 @@
           <a:lstStyle/>
           <a:p>
             <a:r>
-              <a:rPr lang="en-US"/>
-              <a:t>2024-08-17</a:t>
-            </a:r>
-            <a:endParaRPr lang="en-CA"/>
+              <a:rPr lang="en-CA"/>
+              <a:t>2025-05-15</a:t>
+            </a:r>
           </a:p>
         </p:txBody>
       </p:sp>
@@ -30636,6 +30620,10 @@
           <a:p>
             <a:pPr lvl="0"/>
             <a:r>
+              <a:rPr lang="en-CA" dirty="0"/>
+              <a:t>Visual Studio implementation: </a:t>
+            </a:r>
+            <a:r>
               <a:rPr lang="en-US" dirty="0">
                 <a:hlinkClick r:id="rId3"/>
               </a:rPr>
@@ -30660,11 +30648,25 @@
             <a:pPr lvl="0"/>
             <a:r>
               <a:rPr lang="en-CA" dirty="0"/>
-              <a:t>Or just </a:t>
+              <a:t>Makefile implementation: </a:t>
             </a:r>
             <a:r>
               <a:rPr lang="en-CA" dirty="0">
                 <a:hlinkClick r:id="rId5"/>
+              </a:rPr>
+              <a:t>https://github.com/Len42/dat-ting/tree/main/lib/MakeVersionInfo</a:t>
+            </a:r>
+            <a:endParaRPr lang="en-CA" dirty="0"/>
+          </a:p>
+          <a:p>
+            <a:pPr lvl="0"/>
+            <a:r>
+              <a:rPr lang="en-CA" dirty="0"/>
+              <a:t>Or just </a:t>
+            </a:r>
+            <a:r>
+              <a:rPr lang="en-CA" dirty="0">
+                <a:hlinkClick r:id="rId6"/>
               </a:rPr>
               <a:t>lenp.net</a:t>
             </a:r>
@@ -30732,10 +30734,9 @@
           <a:lstStyle/>
           <a:p>
             <a:r>
-              <a:rPr lang="en-US"/>
-              <a:t>2024-08-17</a:t>
-            </a:r>
-            <a:endParaRPr lang="en-CA"/>
+              <a:rPr lang="en-CA"/>
+              <a:t>2025-05-15</a:t>
+            </a:r>
           </a:p>
         </p:txBody>
       </p:sp>
@@ -30931,8 +30932,8 @@
           <a:lstStyle/>
           <a:p>
             <a:r>
-              <a:rPr lang="en-US"/>
-              <a:t>2024-08-17</a:t>
+              <a:rPr lang="en-CA"/>
+              <a:t>2025-05-15</a:t>
             </a:r>
             <a:endParaRPr lang="en-US" dirty="0"/>
           </a:p>
@@ -31163,8 +31164,8 @@
           <a:lstStyle/>
           <a:p>
             <a:r>
-              <a:rPr lang="en-US"/>
-              <a:t>2024-08-17</a:t>
+              <a:rPr lang="en-CA"/>
+              <a:t>2025-05-15</a:t>
             </a:r>
             <a:endParaRPr lang="en-US" dirty="0"/>
           </a:p>
@@ -31365,10 +31366,9 @@
           <a:lstStyle/>
           <a:p>
             <a:r>
-              <a:rPr lang="en-US"/>
-              <a:t>2024-08-17</a:t>
-            </a:r>
-            <a:endParaRPr lang="en-CA"/>
+              <a:rPr lang="en-CA"/>
+              <a:t>2025-05-15</a:t>
+            </a:r>
           </a:p>
         </p:txBody>
       </p:sp>
@@ -31563,18 +31563,13 @@
           <a:lstStyle/>
           <a:p>
             <a:r>
-              <a:rPr lang="en-US">
+              <a:rPr lang="en-CA">
                 <a:solidFill>
                   <a:schemeClr val="bg2"/>
                 </a:solidFill>
               </a:rPr>
-              <a:t>2024-08-17</a:t>
-            </a:r>
-            <a:endParaRPr lang="en-CA">
-              <a:solidFill>
-                <a:schemeClr val="bg2"/>
-              </a:solidFill>
-            </a:endParaRPr>
+              <a:t>2025-05-15</a:t>
+            </a:r>
           </a:p>
         </p:txBody>
       </p:sp>
@@ -32408,10 +32403,9 @@
           <a:lstStyle/>
           <a:p>
             <a:r>
-              <a:rPr lang="en-US"/>
-              <a:t>2024-08-17</a:t>
-            </a:r>
-            <a:endParaRPr lang="en-CA"/>
+              <a:rPr lang="en-CA"/>
+              <a:t>2025-05-15</a:t>
+            </a:r>
           </a:p>
         </p:txBody>
       </p:sp>
@@ -32697,10 +32691,9 @@
           <a:lstStyle/>
           <a:p>
             <a:r>
-              <a:rPr lang="en-US"/>
-              <a:t>2024-08-17</a:t>
-            </a:r>
-            <a:endParaRPr lang="en-CA"/>
+              <a:rPr lang="en-CA"/>
+              <a:t>2025-05-15</a:t>
+            </a:r>
           </a:p>
         </p:txBody>
       </p:sp>
@@ -33144,10 +33137,9 @@
           <a:lstStyle/>
           <a:p>
             <a:r>
-              <a:rPr lang="en-US"/>
-              <a:t>2024-08-17</a:t>
-            </a:r>
-            <a:endParaRPr lang="en-CA"/>
+              <a:rPr lang="en-CA"/>
+              <a:t>2025-05-15</a:t>
+            </a:r>
           </a:p>
         </p:txBody>
       </p:sp>
@@ -33341,10 +33333,9 @@
           <a:lstStyle/>
           <a:p>
             <a:r>
-              <a:rPr lang="en-US"/>
-              <a:t>2024-08-17</a:t>
-            </a:r>
-            <a:endParaRPr lang="en-CA"/>
+              <a:rPr lang="en-CA"/>
+              <a:t>2025-05-15</a:t>
+            </a:r>
           </a:p>
         </p:txBody>
       </p:sp>

</xml_diff>

<commit_message>
MakeVersionInfo: add a couple notes
</commit_message>
<xml_diff>
--- a/MakeVersionInfo/MakeVersionInfo.pptx
+++ b/MakeVersionInfo/MakeVersionInfo.pptx
@@ -3347,7 +3347,7 @@
           <a:p>
             <a:fld id="{857CC94D-E614-4874-A919-F25B27309A09}" type="datetimeFigureOut">
               <a:rPr lang="en-CA" smtClean="0"/>
-              <a:t>2025-05-15</a:t>
+              <a:t>2025-07-28</a:t>
             </a:fld>
             <a:endParaRPr lang="en-CA"/>
           </a:p>
@@ -4485,7 +4485,10 @@
           <a:bodyPr/>
           <a:lstStyle/>
           <a:p>
-            <a:endParaRPr lang="en-CA"/>
+            <a:r>
+              <a:rPr lang="en-CA" dirty="0"/>
+              <a:t>[build] is generated automatically to ensure that different versions of the software have different version numbers, even when I don’t explicitly update the version numbers.</a:t>
+            </a:r>
           </a:p>
         </p:txBody>
       </p:sp>
@@ -6737,7 +6740,7 @@
           <a:noFill/>
           <a:extLst>
             <a:ext uri="{909E8E84-426E-40dd-AFC4-6F175D3DCCD1}">
-              <a14:hiddenFill xmlns:a14="http://schemas.microsoft.com/office/drawing/2010/main" xmlns="">
+              <a14:hiddenFill xmlns="" xmlns:a14="http://schemas.microsoft.com/office/drawing/2010/main">
                 <a:solidFill>
                   <a:srgbClr val="FFFFFF"/>
                 </a:solidFill>
@@ -6803,7 +6806,7 @@
             </a:ln>
             <a:extLst>
               <a:ext uri="{91240B29-F687-4f45-9708-019B960494DF}">
-                <a14:hiddenLine xmlns:a14="http://schemas.microsoft.com/office/drawing/2010/main" xmlns="" w="9525">
+                <a14:hiddenLine xmlns="" xmlns:a14="http://schemas.microsoft.com/office/drawing/2010/main" w="9525">
                   <a:solidFill>
                     <a:srgbClr val="000000"/>
                   </a:solidFill>
@@ -6893,7 +6896,7 @@
             </a:ln>
             <a:extLst>
               <a:ext uri="{91240B29-F687-4f45-9708-019B960494DF}">
-                <a14:hiddenLine xmlns:a14="http://schemas.microsoft.com/office/drawing/2010/main" xmlns="" w="9525">
+                <a14:hiddenLine xmlns="" xmlns:a14="http://schemas.microsoft.com/office/drawing/2010/main" w="9525">
                   <a:solidFill>
                     <a:srgbClr val="000000"/>
                   </a:solidFill>
@@ -6983,7 +6986,7 @@
             </a:ln>
             <a:extLst>
               <a:ext uri="{91240B29-F687-4f45-9708-019B960494DF}">
-                <a14:hiddenLine xmlns:a14="http://schemas.microsoft.com/office/drawing/2010/main" xmlns="" w="9525">
+                <a14:hiddenLine xmlns="" xmlns:a14="http://schemas.microsoft.com/office/drawing/2010/main" w="9525">
                   <a:solidFill>
                     <a:srgbClr val="000000"/>
                   </a:solidFill>
@@ -7017,7 +7020,7 @@
             </a:ln>
             <a:extLst>
               <a:ext uri="{91240B29-F687-4f45-9708-019B960494DF}">
-                <a14:hiddenLine xmlns:a14="http://schemas.microsoft.com/office/drawing/2010/main" xmlns="" w="9525">
+                <a14:hiddenLine xmlns="" xmlns:a14="http://schemas.microsoft.com/office/drawing/2010/main" w="9525">
                   <a:solidFill>
                     <a:srgbClr val="000000"/>
                   </a:solidFill>
@@ -7107,7 +7110,7 @@
             </a:ln>
             <a:extLst>
               <a:ext uri="{91240B29-F687-4f45-9708-019B960494DF}">
-                <a14:hiddenLine xmlns:a14="http://schemas.microsoft.com/office/drawing/2010/main" xmlns="" w="9525">
+                <a14:hiddenLine xmlns="" xmlns:a14="http://schemas.microsoft.com/office/drawing/2010/main" w="9525">
                   <a:solidFill>
                     <a:srgbClr val="000000"/>
                   </a:solidFill>
@@ -7169,7 +7172,7 @@
             </a:ln>
             <a:extLst>
               <a:ext uri="{91240B29-F687-4f45-9708-019B960494DF}">
-                <a14:hiddenLine xmlns:a14="http://schemas.microsoft.com/office/drawing/2010/main" xmlns="" w="9525">
+                <a14:hiddenLine xmlns="" xmlns:a14="http://schemas.microsoft.com/office/drawing/2010/main" w="9525">
                   <a:solidFill>
                     <a:srgbClr val="000000"/>
                   </a:solidFill>
@@ -7231,7 +7234,7 @@
             </a:ln>
             <a:extLst>
               <a:ext uri="{91240B29-F687-4f45-9708-019B960494DF}">
-                <a14:hiddenLine xmlns:a14="http://schemas.microsoft.com/office/drawing/2010/main" xmlns="" w="9525">
+                <a14:hiddenLine xmlns="" xmlns:a14="http://schemas.microsoft.com/office/drawing/2010/main" w="9525">
                   <a:solidFill>
                     <a:srgbClr val="000000"/>
                   </a:solidFill>
@@ -7321,7 +7324,7 @@
             </a:ln>
             <a:extLst>
               <a:ext uri="{91240B29-F687-4f45-9708-019B960494DF}">
-                <a14:hiddenLine xmlns:a14="http://schemas.microsoft.com/office/drawing/2010/main" xmlns="" w="9525">
+                <a14:hiddenLine xmlns="" xmlns:a14="http://schemas.microsoft.com/office/drawing/2010/main" w="9525">
                   <a:solidFill>
                     <a:srgbClr val="000000"/>
                   </a:solidFill>
@@ -7383,7 +7386,7 @@
             </a:ln>
             <a:extLst>
               <a:ext uri="{91240B29-F687-4f45-9708-019B960494DF}">
-                <a14:hiddenLine xmlns:a14="http://schemas.microsoft.com/office/drawing/2010/main" xmlns="" w="9525">
+                <a14:hiddenLine xmlns="" xmlns:a14="http://schemas.microsoft.com/office/drawing/2010/main" w="9525">
                   <a:solidFill>
                     <a:srgbClr val="000000"/>
                   </a:solidFill>
@@ -7445,7 +7448,7 @@
             </a:ln>
             <a:extLst>
               <a:ext uri="{91240B29-F687-4f45-9708-019B960494DF}">
-                <a14:hiddenLine xmlns:a14="http://schemas.microsoft.com/office/drawing/2010/main" xmlns="" w="9525">
+                <a14:hiddenLine xmlns="" xmlns:a14="http://schemas.microsoft.com/office/drawing/2010/main" w="9525">
                   <a:solidFill>
                     <a:srgbClr val="000000"/>
                   </a:solidFill>
@@ -7535,7 +7538,7 @@
             </a:ln>
             <a:extLst>
               <a:ext uri="{91240B29-F687-4f45-9708-019B960494DF}">
-                <a14:hiddenLine xmlns:a14="http://schemas.microsoft.com/office/drawing/2010/main" xmlns="" w="9525">
+                <a14:hiddenLine xmlns="" xmlns:a14="http://schemas.microsoft.com/office/drawing/2010/main" w="9525">
                   <a:solidFill>
                     <a:srgbClr val="000000"/>
                   </a:solidFill>
@@ -7625,7 +7628,7 @@
             </a:ln>
             <a:extLst>
               <a:ext uri="{91240B29-F687-4f45-9708-019B960494DF}">
-                <a14:hiddenLine xmlns:a14="http://schemas.microsoft.com/office/drawing/2010/main" xmlns="" w="9525">
+                <a14:hiddenLine xmlns="" xmlns:a14="http://schemas.microsoft.com/office/drawing/2010/main" w="9525">
                   <a:solidFill>
                     <a:srgbClr val="000000"/>
                   </a:solidFill>
@@ -7687,7 +7690,7 @@
             </a:ln>
             <a:extLst>
               <a:ext uri="{91240B29-F687-4f45-9708-019B960494DF}">
-                <a14:hiddenLine xmlns:a14="http://schemas.microsoft.com/office/drawing/2010/main" xmlns="" w="9525">
+                <a14:hiddenLine xmlns="" xmlns:a14="http://schemas.microsoft.com/office/drawing/2010/main" w="9525">
                   <a:solidFill>
                     <a:srgbClr val="000000"/>
                   </a:solidFill>
@@ -7797,7 +7800,7 @@
             </a:ln>
             <a:extLst>
               <a:ext uri="{91240B29-F687-4f45-9708-019B960494DF}">
-                <a14:hiddenLine xmlns:a14="http://schemas.microsoft.com/office/drawing/2010/main" xmlns="" w="9525">
+                <a14:hiddenLine xmlns="" xmlns:a14="http://schemas.microsoft.com/office/drawing/2010/main" w="9525">
                   <a:solidFill>
                     <a:srgbClr val="000000"/>
                   </a:solidFill>
@@ -7859,7 +7862,7 @@
             </a:ln>
             <a:extLst>
               <a:ext uri="{91240B29-F687-4f45-9708-019B960494DF}">
-                <a14:hiddenLine xmlns:a14="http://schemas.microsoft.com/office/drawing/2010/main" xmlns="" w="9525">
+                <a14:hiddenLine xmlns="" xmlns:a14="http://schemas.microsoft.com/office/drawing/2010/main" w="9525">
                   <a:solidFill>
                     <a:srgbClr val="000000"/>
                   </a:solidFill>
@@ -7949,7 +7952,7 @@
             </a:ln>
             <a:extLst>
               <a:ext uri="{91240B29-F687-4f45-9708-019B960494DF}">
-                <a14:hiddenLine xmlns:a14="http://schemas.microsoft.com/office/drawing/2010/main" xmlns="" w="9525">
+                <a14:hiddenLine xmlns="" xmlns:a14="http://schemas.microsoft.com/office/drawing/2010/main" w="9525">
                   <a:solidFill>
                     <a:srgbClr val="000000"/>
                   </a:solidFill>
@@ -8039,7 +8042,7 @@
             </a:ln>
             <a:extLst>
               <a:ext uri="{91240B29-F687-4f45-9708-019B960494DF}">
-                <a14:hiddenLine xmlns:a14="http://schemas.microsoft.com/office/drawing/2010/main" xmlns="" w="9525">
+                <a14:hiddenLine xmlns="" xmlns:a14="http://schemas.microsoft.com/office/drawing/2010/main" w="9525">
                   <a:solidFill>
                     <a:srgbClr val="000000"/>
                   </a:solidFill>
@@ -8101,7 +8104,7 @@
             </a:ln>
             <a:extLst>
               <a:ext uri="{91240B29-F687-4f45-9708-019B960494DF}">
-                <a14:hiddenLine xmlns:a14="http://schemas.microsoft.com/office/drawing/2010/main" xmlns="" w="9525">
+                <a14:hiddenLine xmlns="" xmlns:a14="http://schemas.microsoft.com/office/drawing/2010/main" w="9525">
                   <a:solidFill>
                     <a:srgbClr val="000000"/>
                   </a:solidFill>
@@ -8191,7 +8194,7 @@
             </a:ln>
             <a:extLst>
               <a:ext uri="{91240B29-F687-4f45-9708-019B960494DF}">
-                <a14:hiddenLine xmlns:a14="http://schemas.microsoft.com/office/drawing/2010/main" xmlns="" w="9525">
+                <a14:hiddenLine xmlns="" xmlns:a14="http://schemas.microsoft.com/office/drawing/2010/main" w="9525">
                   <a:solidFill>
                     <a:srgbClr val="000000"/>
                   </a:solidFill>
@@ -8281,7 +8284,7 @@
             </a:ln>
             <a:extLst>
               <a:ext uri="{91240B29-F687-4f45-9708-019B960494DF}">
-                <a14:hiddenLine xmlns:a14="http://schemas.microsoft.com/office/drawing/2010/main" xmlns="" w="9525">
+                <a14:hiddenLine xmlns="" xmlns:a14="http://schemas.microsoft.com/office/drawing/2010/main" w="9525">
                   <a:solidFill>
                     <a:srgbClr val="000000"/>
                   </a:solidFill>
@@ -8337,7 +8340,7 @@
             </a:ln>
             <a:extLst>
               <a:ext uri="{91240B29-F687-4f45-9708-019B960494DF}">
-                <a14:hiddenLine xmlns:a14="http://schemas.microsoft.com/office/drawing/2010/main" xmlns="" w="9525">
+                <a14:hiddenLine xmlns="" xmlns:a14="http://schemas.microsoft.com/office/drawing/2010/main" w="9525">
                   <a:solidFill>
                     <a:srgbClr val="000000"/>
                   </a:solidFill>
@@ -8427,7 +8430,7 @@
             </a:ln>
             <a:extLst>
               <a:ext uri="{91240B29-F687-4f45-9708-019B960494DF}">
-                <a14:hiddenLine xmlns:a14="http://schemas.microsoft.com/office/drawing/2010/main" xmlns="" w="9525">
+                <a14:hiddenLine xmlns="" xmlns:a14="http://schemas.microsoft.com/office/drawing/2010/main" w="9525">
                   <a:solidFill>
                     <a:srgbClr val="000000"/>
                   </a:solidFill>
@@ -8483,7 +8486,7 @@
             </a:ln>
             <a:extLst>
               <a:ext uri="{91240B29-F687-4f45-9708-019B960494DF}">
-                <a14:hiddenLine xmlns:a14="http://schemas.microsoft.com/office/drawing/2010/main" xmlns="" w="9525">
+                <a14:hiddenLine xmlns="" xmlns:a14="http://schemas.microsoft.com/office/drawing/2010/main" w="9525">
                   <a:solidFill>
                     <a:srgbClr val="000000"/>
                   </a:solidFill>
@@ -8573,7 +8576,7 @@
             </a:ln>
             <a:extLst>
               <a:ext uri="{91240B29-F687-4f45-9708-019B960494DF}">
-                <a14:hiddenLine xmlns:a14="http://schemas.microsoft.com/office/drawing/2010/main" xmlns="" w="9525">
+                <a14:hiddenLine xmlns="" xmlns:a14="http://schemas.microsoft.com/office/drawing/2010/main" w="9525">
                   <a:solidFill>
                     <a:srgbClr val="000000"/>
                   </a:solidFill>
@@ -8641,7 +8644,7 @@
             </a:ln>
             <a:extLst>
               <a:ext uri="{91240B29-F687-4f45-9708-019B960494DF}">
-                <a14:hiddenLine xmlns:a14="http://schemas.microsoft.com/office/drawing/2010/main" xmlns="" w="9525">
+                <a14:hiddenLine xmlns="" xmlns:a14="http://schemas.microsoft.com/office/drawing/2010/main" w="9525">
                   <a:solidFill>
                     <a:srgbClr val="000000"/>
                   </a:solidFill>
@@ -8731,7 +8734,7 @@
             </a:ln>
             <a:extLst>
               <a:ext uri="{91240B29-F687-4f45-9708-019B960494DF}">
-                <a14:hiddenLine xmlns:a14="http://schemas.microsoft.com/office/drawing/2010/main" xmlns="" w="9525">
+                <a14:hiddenLine xmlns="" xmlns:a14="http://schemas.microsoft.com/office/drawing/2010/main" w="9525">
                   <a:solidFill>
                     <a:srgbClr val="000000"/>
                   </a:solidFill>
@@ -8799,7 +8802,7 @@
             </a:ln>
             <a:extLst>
               <a:ext uri="{91240B29-F687-4f45-9708-019B960494DF}">
-                <a14:hiddenLine xmlns:a14="http://schemas.microsoft.com/office/drawing/2010/main" xmlns="" w="9525">
+                <a14:hiddenLine xmlns="" xmlns:a14="http://schemas.microsoft.com/office/drawing/2010/main" w="9525">
                   <a:solidFill>
                     <a:srgbClr val="000000"/>
                   </a:solidFill>
@@ -8889,7 +8892,7 @@
             </a:ln>
             <a:extLst>
               <a:ext uri="{91240B29-F687-4f45-9708-019B960494DF}">
-                <a14:hiddenLine xmlns:a14="http://schemas.microsoft.com/office/drawing/2010/main" xmlns="" w="9525">
+                <a14:hiddenLine xmlns="" xmlns:a14="http://schemas.microsoft.com/office/drawing/2010/main" w="9525">
                   <a:solidFill>
                     <a:srgbClr val="000000"/>
                   </a:solidFill>
@@ -8923,7 +8926,7 @@
             </a:ln>
             <a:extLst>
               <a:ext uri="{91240B29-F687-4f45-9708-019B960494DF}">
-                <a14:hiddenLine xmlns:a14="http://schemas.microsoft.com/office/drawing/2010/main" xmlns="" w="9525">
+                <a14:hiddenLine xmlns="" xmlns:a14="http://schemas.microsoft.com/office/drawing/2010/main" w="9525">
                   <a:solidFill>
                     <a:srgbClr val="000000"/>
                   </a:solidFill>
@@ -9013,7 +9016,7 @@
             </a:ln>
             <a:extLst>
               <a:ext uri="{91240B29-F687-4f45-9708-019B960494DF}">
-                <a14:hiddenLine xmlns:a14="http://schemas.microsoft.com/office/drawing/2010/main" xmlns="" w="9525">
+                <a14:hiddenLine xmlns="" xmlns:a14="http://schemas.microsoft.com/office/drawing/2010/main" w="9525">
                   <a:solidFill>
                     <a:srgbClr val="000000"/>
                   </a:solidFill>
@@ -9075,7 +9078,7 @@
             </a:ln>
             <a:extLst>
               <a:ext uri="{91240B29-F687-4f45-9708-019B960494DF}">
-                <a14:hiddenLine xmlns:a14="http://schemas.microsoft.com/office/drawing/2010/main" xmlns="" w="9525">
+                <a14:hiddenLine xmlns="" xmlns:a14="http://schemas.microsoft.com/office/drawing/2010/main" w="9525">
                   <a:solidFill>
                     <a:srgbClr val="000000"/>
                   </a:solidFill>
@@ -9137,7 +9140,7 @@
             </a:ln>
             <a:extLst>
               <a:ext uri="{91240B29-F687-4f45-9708-019B960494DF}">
-                <a14:hiddenLine xmlns:a14="http://schemas.microsoft.com/office/drawing/2010/main" xmlns="" w="9525">
+                <a14:hiddenLine xmlns="" xmlns:a14="http://schemas.microsoft.com/office/drawing/2010/main" w="9525">
                   <a:solidFill>
                     <a:srgbClr val="000000"/>
                   </a:solidFill>
@@ -9227,7 +9230,7 @@
             </a:ln>
             <a:extLst>
               <a:ext uri="{91240B29-F687-4f45-9708-019B960494DF}">
-                <a14:hiddenLine xmlns:a14="http://schemas.microsoft.com/office/drawing/2010/main" xmlns="" w="9525">
+                <a14:hiddenLine xmlns="" xmlns:a14="http://schemas.microsoft.com/office/drawing/2010/main" w="9525">
                   <a:solidFill>
                     <a:srgbClr val="000000"/>
                   </a:solidFill>
@@ -9295,7 +9298,7 @@
             </a:ln>
             <a:extLst>
               <a:ext uri="{91240B29-F687-4f45-9708-019B960494DF}">
-                <a14:hiddenLine xmlns:a14="http://schemas.microsoft.com/office/drawing/2010/main" xmlns="" w="9525">
+                <a14:hiddenLine xmlns="" xmlns:a14="http://schemas.microsoft.com/office/drawing/2010/main" w="9525">
                   <a:solidFill>
                     <a:srgbClr val="000000"/>
                   </a:solidFill>
@@ -9357,7 +9360,7 @@
             </a:ln>
             <a:extLst>
               <a:ext uri="{91240B29-F687-4f45-9708-019B960494DF}">
-                <a14:hiddenLine xmlns:a14="http://schemas.microsoft.com/office/drawing/2010/main" xmlns="" w="9525">
+                <a14:hiddenLine xmlns="" xmlns:a14="http://schemas.microsoft.com/office/drawing/2010/main" w="9525">
                   <a:solidFill>
                     <a:srgbClr val="000000"/>
                   </a:solidFill>
@@ -9447,7 +9450,7 @@
             </a:ln>
             <a:extLst>
               <a:ext uri="{91240B29-F687-4f45-9708-019B960494DF}">
-                <a14:hiddenLine xmlns:a14="http://schemas.microsoft.com/office/drawing/2010/main" xmlns="" w="9525">
+                <a14:hiddenLine xmlns="" xmlns:a14="http://schemas.microsoft.com/office/drawing/2010/main" w="9525">
                   <a:solidFill>
                     <a:srgbClr val="000000"/>
                   </a:solidFill>
@@ -9509,7 +9512,7 @@
             </a:ln>
             <a:extLst>
               <a:ext uri="{91240B29-F687-4f45-9708-019B960494DF}">
-                <a14:hiddenLine xmlns:a14="http://schemas.microsoft.com/office/drawing/2010/main" xmlns="" w="9525">
+                <a14:hiddenLine xmlns="" xmlns:a14="http://schemas.microsoft.com/office/drawing/2010/main" w="9525">
                   <a:solidFill>
                     <a:srgbClr val="000000"/>
                   </a:solidFill>
@@ -9599,7 +9602,7 @@
             </a:ln>
             <a:extLst>
               <a:ext uri="{91240B29-F687-4f45-9708-019B960494DF}">
-                <a14:hiddenLine xmlns:a14="http://schemas.microsoft.com/office/drawing/2010/main" xmlns="" w="9525">
+                <a14:hiddenLine xmlns="" xmlns:a14="http://schemas.microsoft.com/office/drawing/2010/main" w="9525">
                   <a:solidFill>
                     <a:srgbClr val="000000"/>
                   </a:solidFill>
@@ -9661,7 +9664,7 @@
             </a:ln>
             <a:extLst>
               <a:ext uri="{91240B29-F687-4f45-9708-019B960494DF}">
-                <a14:hiddenLine xmlns:a14="http://schemas.microsoft.com/office/drawing/2010/main" xmlns="" w="9525">
+                <a14:hiddenLine xmlns="" xmlns:a14="http://schemas.microsoft.com/office/drawing/2010/main" w="9525">
                   <a:solidFill>
                     <a:srgbClr val="000000"/>
                   </a:solidFill>
@@ -9751,7 +9754,7 @@
             </a:ln>
             <a:extLst>
               <a:ext uri="{91240B29-F687-4f45-9708-019B960494DF}">
-                <a14:hiddenLine xmlns:a14="http://schemas.microsoft.com/office/drawing/2010/main" xmlns="" w="9525">
+                <a14:hiddenLine xmlns="" xmlns:a14="http://schemas.microsoft.com/office/drawing/2010/main" w="9525">
                   <a:solidFill>
                     <a:srgbClr val="000000"/>
                   </a:solidFill>
@@ -9785,7 +9788,7 @@
             </a:ln>
             <a:extLst>
               <a:ext uri="{91240B29-F687-4f45-9708-019B960494DF}">
-                <a14:hiddenLine xmlns:a14="http://schemas.microsoft.com/office/drawing/2010/main" xmlns="" w="9525">
+                <a14:hiddenLine xmlns="" xmlns:a14="http://schemas.microsoft.com/office/drawing/2010/main" w="9525">
                   <a:solidFill>
                     <a:srgbClr val="000000"/>
                   </a:solidFill>
@@ -9850,7 +9853,7 @@
             </a:ln>
             <a:extLst>
               <a:ext uri="{91240B29-F687-4f45-9708-019B960494DF}">
-                <a14:hiddenLine xmlns:a14="http://schemas.microsoft.com/office/drawing/2010/main" xmlns="" w="9525">
+                <a14:hiddenLine xmlns="" xmlns:a14="http://schemas.microsoft.com/office/drawing/2010/main" w="9525">
                   <a:solidFill>
                     <a:srgbClr val="000000"/>
                   </a:solidFill>
@@ -9940,7 +9943,7 @@
             </a:ln>
             <a:extLst>
               <a:ext uri="{91240B29-F687-4f45-9708-019B960494DF}">
-                <a14:hiddenLine xmlns:a14="http://schemas.microsoft.com/office/drawing/2010/main" xmlns="" w="9525">
+                <a14:hiddenLine xmlns="" xmlns:a14="http://schemas.microsoft.com/office/drawing/2010/main" w="9525">
                   <a:solidFill>
                     <a:srgbClr val="000000"/>
                   </a:solidFill>
@@ -10002,7 +10005,7 @@
             </a:ln>
             <a:extLst>
               <a:ext uri="{91240B29-F687-4f45-9708-019B960494DF}">
-                <a14:hiddenLine xmlns:a14="http://schemas.microsoft.com/office/drawing/2010/main" xmlns="" w="9525">
+                <a14:hiddenLine xmlns="" xmlns:a14="http://schemas.microsoft.com/office/drawing/2010/main" w="9525">
                   <a:solidFill>
                     <a:srgbClr val="000000"/>
                   </a:solidFill>
@@ -10092,7 +10095,7 @@
             </a:ln>
             <a:extLst>
               <a:ext uri="{91240B29-F687-4f45-9708-019B960494DF}">
-                <a14:hiddenLine xmlns:a14="http://schemas.microsoft.com/office/drawing/2010/main" xmlns="" w="9525">
+                <a14:hiddenLine xmlns="" xmlns:a14="http://schemas.microsoft.com/office/drawing/2010/main" w="9525">
                   <a:solidFill>
                     <a:srgbClr val="000000"/>
                   </a:solidFill>
@@ -10182,7 +10185,7 @@
             </a:ln>
             <a:extLst>
               <a:ext uri="{91240B29-F687-4f45-9708-019B960494DF}">
-                <a14:hiddenLine xmlns:a14="http://schemas.microsoft.com/office/drawing/2010/main" xmlns="" w="9525">
+                <a14:hiddenLine xmlns="" xmlns:a14="http://schemas.microsoft.com/office/drawing/2010/main" w="9525">
                   <a:solidFill>
                     <a:srgbClr val="000000"/>
                   </a:solidFill>
@@ -10247,7 +10250,7 @@
             </a:ln>
             <a:extLst>
               <a:ext uri="{91240B29-F687-4f45-9708-019B960494DF}">
-                <a14:hiddenLine xmlns:a14="http://schemas.microsoft.com/office/drawing/2010/main" xmlns="" w="9525">
+                <a14:hiddenLine xmlns="" xmlns:a14="http://schemas.microsoft.com/office/drawing/2010/main" w="9525">
                   <a:solidFill>
                     <a:srgbClr val="000000"/>
                   </a:solidFill>
@@ -10309,7 +10312,7 @@
             </a:ln>
             <a:extLst>
               <a:ext uri="{91240B29-F687-4f45-9708-019B960494DF}">
-                <a14:hiddenLine xmlns:a14="http://schemas.microsoft.com/office/drawing/2010/main" xmlns="" w="9525">
+                <a14:hiddenLine xmlns="" xmlns:a14="http://schemas.microsoft.com/office/drawing/2010/main" w="9525">
                   <a:solidFill>
                     <a:srgbClr val="000000"/>
                   </a:solidFill>
@@ -10399,7 +10402,7 @@
             </a:ln>
             <a:extLst>
               <a:ext uri="{91240B29-F687-4f45-9708-019B960494DF}">
-                <a14:hiddenLine xmlns:a14="http://schemas.microsoft.com/office/drawing/2010/main" xmlns="" w="9525">
+                <a14:hiddenLine xmlns="" xmlns:a14="http://schemas.microsoft.com/office/drawing/2010/main" w="9525">
                   <a:solidFill>
                     <a:srgbClr val="000000"/>
                   </a:solidFill>
@@ -10489,7 +10492,7 @@
             </a:ln>
             <a:extLst>
               <a:ext uri="{91240B29-F687-4f45-9708-019B960494DF}">
-                <a14:hiddenLine xmlns:a14="http://schemas.microsoft.com/office/drawing/2010/main" xmlns="" w="9525">
+                <a14:hiddenLine xmlns="" xmlns:a14="http://schemas.microsoft.com/office/drawing/2010/main" w="9525">
                   <a:solidFill>
                     <a:srgbClr val="000000"/>
                   </a:solidFill>
@@ -10551,7 +10554,7 @@
             </a:ln>
             <a:extLst>
               <a:ext uri="{91240B29-F687-4f45-9708-019B960494DF}">
-                <a14:hiddenLine xmlns:a14="http://schemas.microsoft.com/office/drawing/2010/main" xmlns="" w="9525">
+                <a14:hiddenLine xmlns="" xmlns:a14="http://schemas.microsoft.com/office/drawing/2010/main" w="9525">
                   <a:solidFill>
                     <a:srgbClr val="000000"/>
                   </a:solidFill>
@@ -10671,7 +10674,7 @@
             </a:ln>
             <a:extLst>
               <a:ext uri="{91240B29-F687-4f45-9708-019B960494DF}">
-                <a14:hiddenLine xmlns:a14="http://schemas.microsoft.com/office/drawing/2010/main" xmlns="" w="9525">
+                <a14:hiddenLine xmlns="" xmlns:a14="http://schemas.microsoft.com/office/drawing/2010/main" w="9525">
                   <a:solidFill>
                     <a:srgbClr val="000000"/>
                   </a:solidFill>
@@ -10739,7 +10742,7 @@
             </a:ln>
             <a:extLst>
               <a:ext uri="{91240B29-F687-4f45-9708-019B960494DF}">
-                <a14:hiddenLine xmlns:a14="http://schemas.microsoft.com/office/drawing/2010/main" xmlns="" w="9525">
+                <a14:hiddenLine xmlns="" xmlns:a14="http://schemas.microsoft.com/office/drawing/2010/main" w="9525">
                   <a:solidFill>
                     <a:srgbClr val="000000"/>
                   </a:solidFill>
@@ -10829,7 +10832,7 @@
             </a:ln>
             <a:extLst>
               <a:ext uri="{91240B29-F687-4f45-9708-019B960494DF}">
-                <a14:hiddenLine xmlns:a14="http://schemas.microsoft.com/office/drawing/2010/main" xmlns="" w="9525">
+                <a14:hiddenLine xmlns="" xmlns:a14="http://schemas.microsoft.com/office/drawing/2010/main" w="9525">
                   <a:solidFill>
                     <a:srgbClr val="000000"/>
                   </a:solidFill>
@@ -16948,7 +16951,7 @@
           <a:noFill/>
           <a:extLst>
             <a:ext uri="{909E8E84-426E-40dd-AFC4-6F175D3DCCD1}">
-              <a14:hiddenFill xmlns:a14="http://schemas.microsoft.com/office/drawing/2010/main" xmlns="">
+              <a14:hiddenFill xmlns="" xmlns:a14="http://schemas.microsoft.com/office/drawing/2010/main">
                 <a:solidFill>
                   <a:srgbClr val="FFFFFF"/>
                 </a:solidFill>
@@ -17028,7 +17031,7 @@
               </a:ln>
               <a:extLst>
                 <a:ext uri="{91240B29-F687-4f45-9708-019B960494DF}">
-                  <a14:hiddenLine xmlns:a14="http://schemas.microsoft.com/office/drawing/2010/main" xmlns="" w="9525">
+                  <a14:hiddenLine xmlns="" xmlns:a14="http://schemas.microsoft.com/office/drawing/2010/main" w="9525">
                     <a:solidFill>
                       <a:srgbClr val="000000"/>
                     </a:solidFill>
@@ -17118,7 +17121,7 @@
               </a:ln>
               <a:extLst>
                 <a:ext uri="{91240B29-F687-4f45-9708-019B960494DF}">
-                  <a14:hiddenLine xmlns:a14="http://schemas.microsoft.com/office/drawing/2010/main" xmlns="" w="9525">
+                  <a14:hiddenLine xmlns="" xmlns:a14="http://schemas.microsoft.com/office/drawing/2010/main" w="9525">
                     <a:solidFill>
                       <a:srgbClr val="000000"/>
                     </a:solidFill>
@@ -17208,7 +17211,7 @@
               </a:ln>
               <a:extLst>
                 <a:ext uri="{91240B29-F687-4f45-9708-019B960494DF}">
-                  <a14:hiddenLine xmlns:a14="http://schemas.microsoft.com/office/drawing/2010/main" xmlns="" w="9525">
+                  <a14:hiddenLine xmlns="" xmlns:a14="http://schemas.microsoft.com/office/drawing/2010/main" w="9525">
                     <a:solidFill>
                       <a:srgbClr val="000000"/>
                     </a:solidFill>
@@ -17270,7 +17273,7 @@
               </a:ln>
               <a:extLst>
                 <a:ext uri="{91240B29-F687-4f45-9708-019B960494DF}">
-                  <a14:hiddenLine xmlns:a14="http://schemas.microsoft.com/office/drawing/2010/main" xmlns="" w="9525">
+                  <a14:hiddenLine xmlns="" xmlns:a14="http://schemas.microsoft.com/office/drawing/2010/main" w="9525">
                     <a:solidFill>
                       <a:srgbClr val="000000"/>
                     </a:solidFill>
@@ -17360,7 +17363,7 @@
               </a:ln>
               <a:extLst>
                 <a:ext uri="{91240B29-F687-4f45-9708-019B960494DF}">
-                  <a14:hiddenLine xmlns:a14="http://schemas.microsoft.com/office/drawing/2010/main" xmlns="" w="9525">
+                  <a14:hiddenLine xmlns="" xmlns:a14="http://schemas.microsoft.com/office/drawing/2010/main" w="9525">
                     <a:solidFill>
                       <a:srgbClr val="000000"/>
                     </a:solidFill>
@@ -17422,7 +17425,7 @@
               </a:ln>
               <a:extLst>
                 <a:ext uri="{91240B29-F687-4f45-9708-019B960494DF}">
-                  <a14:hiddenLine xmlns:a14="http://schemas.microsoft.com/office/drawing/2010/main" xmlns="" w="9525">
+                  <a14:hiddenLine xmlns="" xmlns:a14="http://schemas.microsoft.com/office/drawing/2010/main" w="9525">
                     <a:solidFill>
                       <a:srgbClr val="000000"/>
                     </a:solidFill>
@@ -17484,7 +17487,7 @@
               </a:ln>
               <a:extLst>
                 <a:ext uri="{91240B29-F687-4f45-9708-019B960494DF}">
-                  <a14:hiddenLine xmlns:a14="http://schemas.microsoft.com/office/drawing/2010/main" xmlns="" w="9525">
+                  <a14:hiddenLine xmlns="" xmlns:a14="http://schemas.microsoft.com/office/drawing/2010/main" w="9525">
                     <a:solidFill>
                       <a:srgbClr val="000000"/>
                     </a:solidFill>
@@ -17574,7 +17577,7 @@
               </a:ln>
               <a:extLst>
                 <a:ext uri="{91240B29-F687-4f45-9708-019B960494DF}">
-                  <a14:hiddenLine xmlns:a14="http://schemas.microsoft.com/office/drawing/2010/main" xmlns="" w="9525">
+                  <a14:hiddenLine xmlns="" xmlns:a14="http://schemas.microsoft.com/office/drawing/2010/main" w="9525">
                     <a:solidFill>
                       <a:srgbClr val="000000"/>
                     </a:solidFill>
@@ -17664,7 +17667,7 @@
               </a:ln>
               <a:extLst>
                 <a:ext uri="{91240B29-F687-4f45-9708-019B960494DF}">
-                  <a14:hiddenLine xmlns:a14="http://schemas.microsoft.com/office/drawing/2010/main" xmlns="" w="9525">
+                  <a14:hiddenLine xmlns="" xmlns:a14="http://schemas.microsoft.com/office/drawing/2010/main" w="9525">
                     <a:solidFill>
                       <a:srgbClr val="000000"/>
                     </a:solidFill>
@@ -17726,7 +17729,7 @@
               </a:ln>
               <a:extLst>
                 <a:ext uri="{91240B29-F687-4f45-9708-019B960494DF}">
-                  <a14:hiddenLine xmlns:a14="http://schemas.microsoft.com/office/drawing/2010/main" xmlns="" w="9525">
+                  <a14:hiddenLine xmlns="" xmlns:a14="http://schemas.microsoft.com/office/drawing/2010/main" w="9525">
                     <a:solidFill>
                       <a:srgbClr val="000000"/>
                     </a:solidFill>
@@ -17836,7 +17839,7 @@
               </a:ln>
               <a:extLst>
                 <a:ext uri="{91240B29-F687-4f45-9708-019B960494DF}">
-                  <a14:hiddenLine xmlns:a14="http://schemas.microsoft.com/office/drawing/2010/main" xmlns="" w="9525">
+                  <a14:hiddenLine xmlns="" xmlns:a14="http://schemas.microsoft.com/office/drawing/2010/main" w="9525">
                     <a:solidFill>
                       <a:srgbClr val="000000"/>
                     </a:solidFill>
@@ -17920,7 +17923,7 @@
               </a:ln>
               <a:extLst>
                 <a:ext uri="{91240B29-F687-4f45-9708-019B960494DF}">
-                  <a14:hiddenLine xmlns:a14="http://schemas.microsoft.com/office/drawing/2010/main" xmlns="" w="9525">
+                  <a14:hiddenLine xmlns="" xmlns:a14="http://schemas.microsoft.com/office/drawing/2010/main" w="9525">
                     <a:solidFill>
                       <a:srgbClr val="000000"/>
                     </a:solidFill>
@@ -17982,7 +17985,7 @@
               </a:ln>
               <a:extLst>
                 <a:ext uri="{91240B29-F687-4f45-9708-019B960494DF}">
-                  <a14:hiddenLine xmlns:a14="http://schemas.microsoft.com/office/drawing/2010/main" xmlns="" w="9525">
+                  <a14:hiddenLine xmlns="" xmlns:a14="http://schemas.microsoft.com/office/drawing/2010/main" w="9525">
                     <a:solidFill>
                       <a:srgbClr val="000000"/>
                     </a:solidFill>
@@ -18044,7 +18047,7 @@
               </a:ln>
               <a:extLst>
                 <a:ext uri="{91240B29-F687-4f45-9708-019B960494DF}">
-                  <a14:hiddenLine xmlns:a14="http://schemas.microsoft.com/office/drawing/2010/main" xmlns="" w="9525">
+                  <a14:hiddenLine xmlns="" xmlns:a14="http://schemas.microsoft.com/office/drawing/2010/main" w="9525">
                     <a:solidFill>
                       <a:srgbClr val="000000"/>
                     </a:solidFill>
@@ -18134,7 +18137,7 @@
               </a:ln>
               <a:extLst>
                 <a:ext uri="{91240B29-F687-4f45-9708-019B960494DF}">
-                  <a14:hiddenLine xmlns:a14="http://schemas.microsoft.com/office/drawing/2010/main" xmlns="" w="9525">
+                  <a14:hiddenLine xmlns="" xmlns:a14="http://schemas.microsoft.com/office/drawing/2010/main" w="9525">
                     <a:solidFill>
                       <a:srgbClr val="000000"/>
                     </a:solidFill>
@@ -18168,7 +18171,7 @@
               </a:ln>
               <a:extLst>
                 <a:ext uri="{91240B29-F687-4f45-9708-019B960494DF}">
-                  <a14:hiddenLine xmlns:a14="http://schemas.microsoft.com/office/drawing/2010/main" xmlns="" w="9525">
+                  <a14:hiddenLine xmlns="" xmlns:a14="http://schemas.microsoft.com/office/drawing/2010/main" w="9525">
                     <a:solidFill>
                       <a:srgbClr val="000000"/>
                     </a:solidFill>
@@ -18233,7 +18236,7 @@
               </a:ln>
               <a:extLst>
                 <a:ext uri="{91240B29-F687-4f45-9708-019B960494DF}">
-                  <a14:hiddenLine xmlns:a14="http://schemas.microsoft.com/office/drawing/2010/main" xmlns="" w="9525">
+                  <a14:hiddenLine xmlns="" xmlns:a14="http://schemas.microsoft.com/office/drawing/2010/main" w="9525">
                     <a:solidFill>
                       <a:srgbClr val="000000"/>
                     </a:solidFill>
@@ -18323,7 +18326,7 @@
               </a:ln>
               <a:extLst>
                 <a:ext uri="{91240B29-F687-4f45-9708-019B960494DF}">
-                  <a14:hiddenLine xmlns:a14="http://schemas.microsoft.com/office/drawing/2010/main" xmlns="" w="9525">
+                  <a14:hiddenLine xmlns="" xmlns:a14="http://schemas.microsoft.com/office/drawing/2010/main" w="9525">
                     <a:solidFill>
                       <a:srgbClr val="000000"/>
                     </a:solidFill>
@@ -18385,7 +18388,7 @@
               </a:ln>
               <a:extLst>
                 <a:ext uri="{91240B29-F687-4f45-9708-019B960494DF}">
-                  <a14:hiddenLine xmlns:a14="http://schemas.microsoft.com/office/drawing/2010/main" xmlns="" w="9525">
+                  <a14:hiddenLine xmlns="" xmlns:a14="http://schemas.microsoft.com/office/drawing/2010/main" w="9525">
                     <a:solidFill>
                       <a:srgbClr val="000000"/>
                     </a:solidFill>
@@ -18475,7 +18478,7 @@
               </a:ln>
               <a:extLst>
                 <a:ext uri="{91240B29-F687-4f45-9708-019B960494DF}">
-                  <a14:hiddenLine xmlns:a14="http://schemas.microsoft.com/office/drawing/2010/main" xmlns="" w="9525">
+                  <a14:hiddenLine xmlns="" xmlns:a14="http://schemas.microsoft.com/office/drawing/2010/main" w="9525">
                     <a:solidFill>
                       <a:srgbClr val="000000"/>
                     </a:solidFill>
@@ -18540,7 +18543,7 @@
               </a:ln>
               <a:extLst>
                 <a:ext uri="{91240B29-F687-4f45-9708-019B960494DF}">
-                  <a14:hiddenLine xmlns:a14="http://schemas.microsoft.com/office/drawing/2010/main" xmlns="" w="9525">
+                  <a14:hiddenLine xmlns="" xmlns:a14="http://schemas.microsoft.com/office/drawing/2010/main" w="9525">
                     <a:solidFill>
                       <a:srgbClr val="000000"/>
                     </a:solidFill>
@@ -18602,7 +18605,7 @@
               </a:ln>
               <a:extLst>
                 <a:ext uri="{91240B29-F687-4f45-9708-019B960494DF}">
-                  <a14:hiddenLine xmlns:a14="http://schemas.microsoft.com/office/drawing/2010/main" xmlns="" w="9525">
+                  <a14:hiddenLine xmlns="" xmlns:a14="http://schemas.microsoft.com/office/drawing/2010/main" w="9525">
                     <a:solidFill>
                       <a:srgbClr val="000000"/>
                     </a:solidFill>
@@ -18692,7 +18695,7 @@
               </a:ln>
               <a:extLst>
                 <a:ext uri="{91240B29-F687-4f45-9708-019B960494DF}">
-                  <a14:hiddenLine xmlns:a14="http://schemas.microsoft.com/office/drawing/2010/main" xmlns="" w="9525">
+                  <a14:hiddenLine xmlns="" xmlns:a14="http://schemas.microsoft.com/office/drawing/2010/main" w="9525">
                     <a:solidFill>
                       <a:srgbClr val="000000"/>
                     </a:solidFill>
@@ -18782,7 +18785,7 @@
               </a:ln>
               <a:extLst>
                 <a:ext uri="{91240B29-F687-4f45-9708-019B960494DF}">
-                  <a14:hiddenLine xmlns:a14="http://schemas.microsoft.com/office/drawing/2010/main" xmlns="" w="9525">
+                  <a14:hiddenLine xmlns="" xmlns:a14="http://schemas.microsoft.com/office/drawing/2010/main" w="9525">
                     <a:solidFill>
                       <a:srgbClr val="000000"/>
                     </a:solidFill>
@@ -18847,7 +18850,7 @@
               </a:ln>
               <a:extLst>
                 <a:ext uri="{91240B29-F687-4f45-9708-019B960494DF}">
-                  <a14:hiddenLine xmlns:a14="http://schemas.microsoft.com/office/drawing/2010/main" xmlns="" w="9525">
+                  <a14:hiddenLine xmlns="" xmlns:a14="http://schemas.microsoft.com/office/drawing/2010/main" w="9525">
                     <a:solidFill>
                       <a:srgbClr val="000000"/>
                     </a:solidFill>
@@ -18967,7 +18970,7 @@
               </a:ln>
               <a:extLst>
                 <a:ext uri="{91240B29-F687-4f45-9708-019B960494DF}">
-                  <a14:hiddenLine xmlns:a14="http://schemas.microsoft.com/office/drawing/2010/main" xmlns="" w="9525">
+                  <a14:hiddenLine xmlns="" xmlns:a14="http://schemas.microsoft.com/office/drawing/2010/main" w="9525">
                     <a:solidFill>
                       <a:srgbClr val="000000"/>
                     </a:solidFill>
@@ -19065,7 +19068,7 @@
               </a:ln>
               <a:extLst>
                 <a:ext uri="{91240B29-F687-4f45-9708-019B960494DF}">
-                  <a14:hiddenLine xmlns:a14="http://schemas.microsoft.com/office/drawing/2010/main" xmlns="" w="9525">
+                  <a14:hiddenLine xmlns="" xmlns:a14="http://schemas.microsoft.com/office/drawing/2010/main" w="9525">
                     <a:solidFill>
                       <a:srgbClr val="000000"/>
                     </a:solidFill>
@@ -19180,7 +19183,7 @@
               </a:ln>
               <a:extLst>
                 <a:ext uri="{91240B29-F687-4f45-9708-019B960494DF}">
-                  <a14:hiddenLine xmlns:a14="http://schemas.microsoft.com/office/drawing/2010/main" xmlns="" w="9525">
+                  <a14:hiddenLine xmlns="" xmlns:a14="http://schemas.microsoft.com/office/drawing/2010/main" w="9525">
                     <a:solidFill>
                       <a:srgbClr val="000000"/>
                     </a:solidFill>
@@ -19270,7 +19273,7 @@
               </a:ln>
               <a:extLst>
                 <a:ext uri="{91240B29-F687-4f45-9708-019B960494DF}">
-                  <a14:hiddenLine xmlns:a14="http://schemas.microsoft.com/office/drawing/2010/main" xmlns="" w="9525">
+                  <a14:hiddenLine xmlns="" xmlns:a14="http://schemas.microsoft.com/office/drawing/2010/main" w="9525">
                     <a:solidFill>
                       <a:srgbClr val="000000"/>
                     </a:solidFill>
@@ -19335,7 +19338,7 @@
               </a:ln>
               <a:extLst>
                 <a:ext uri="{91240B29-F687-4f45-9708-019B960494DF}">
-                  <a14:hiddenLine xmlns:a14="http://schemas.microsoft.com/office/drawing/2010/main" xmlns="" w="9525">
+                  <a14:hiddenLine xmlns="" xmlns:a14="http://schemas.microsoft.com/office/drawing/2010/main" w="9525">
                     <a:solidFill>
                       <a:srgbClr val="000000"/>
                     </a:solidFill>
@@ -19425,7 +19428,7 @@
               </a:ln>
               <a:extLst>
                 <a:ext uri="{91240B29-F687-4f45-9708-019B960494DF}">
-                  <a14:hiddenLine xmlns:a14="http://schemas.microsoft.com/office/drawing/2010/main" xmlns="" w="9525">
+                  <a14:hiddenLine xmlns="" xmlns:a14="http://schemas.microsoft.com/office/drawing/2010/main" w="9525">
                     <a:solidFill>
                       <a:srgbClr val="000000"/>
                     </a:solidFill>
@@ -19493,7 +19496,7 @@
               </a:ln>
               <a:extLst>
                 <a:ext uri="{91240B29-F687-4f45-9708-019B960494DF}">
-                  <a14:hiddenLine xmlns:a14="http://schemas.microsoft.com/office/drawing/2010/main" xmlns="" w="9525">
+                  <a14:hiddenLine xmlns="" xmlns:a14="http://schemas.microsoft.com/office/drawing/2010/main" w="9525">
                     <a:solidFill>
                       <a:srgbClr val="000000"/>
                     </a:solidFill>
@@ -19583,7 +19586,7 @@
               </a:ln>
               <a:extLst>
                 <a:ext uri="{91240B29-F687-4f45-9708-019B960494DF}">
-                  <a14:hiddenLine xmlns:a14="http://schemas.microsoft.com/office/drawing/2010/main" xmlns="" w="9525">
+                  <a14:hiddenLine xmlns="" xmlns:a14="http://schemas.microsoft.com/office/drawing/2010/main" w="9525">
                     <a:solidFill>
                       <a:srgbClr val="000000"/>
                     </a:solidFill>
@@ -19651,7 +19654,7 @@
               </a:ln>
               <a:extLst>
                 <a:ext uri="{91240B29-F687-4f45-9708-019B960494DF}">
-                  <a14:hiddenLine xmlns:a14="http://schemas.microsoft.com/office/drawing/2010/main" xmlns="" w="9525">
+                  <a14:hiddenLine xmlns="" xmlns:a14="http://schemas.microsoft.com/office/drawing/2010/main" w="9525">
                     <a:solidFill>
                       <a:srgbClr val="000000"/>
                     </a:solidFill>
@@ -19741,7 +19744,7 @@
               </a:ln>
               <a:extLst>
                 <a:ext uri="{91240B29-F687-4f45-9708-019B960494DF}">
-                  <a14:hiddenLine xmlns:a14="http://schemas.microsoft.com/office/drawing/2010/main" xmlns="" w="9525">
+                  <a14:hiddenLine xmlns="" xmlns:a14="http://schemas.microsoft.com/office/drawing/2010/main" w="9525">
                     <a:solidFill>
                       <a:srgbClr val="000000"/>
                     </a:solidFill>
@@ -19775,7 +19778,7 @@
               </a:ln>
               <a:extLst>
                 <a:ext uri="{91240B29-F687-4f45-9708-019B960494DF}">
-                  <a14:hiddenLine xmlns:a14="http://schemas.microsoft.com/office/drawing/2010/main" xmlns="" w="9525">
+                  <a14:hiddenLine xmlns="" xmlns:a14="http://schemas.microsoft.com/office/drawing/2010/main" w="9525">
                     <a:solidFill>
                       <a:srgbClr val="000000"/>
                     </a:solidFill>

</xml_diff>

<commit_message>
MakeVersionInfo: change a couple words
</commit_message>
<xml_diff>
--- a/MakeVersionInfo/MakeVersionInfo.pptx
+++ b/MakeVersionInfo/MakeVersionInfo.pptx
@@ -3347,7 +3347,7 @@
           <a:p>
             <a:fld id="{857CC94D-E614-4874-A919-F25B27309A09}" type="datetimeFigureOut">
               <a:rPr lang="en-CA" smtClean="0"/>
-              <a:t>2025-07-28</a:t>
+              <a:t>2025-08-01</a:t>
             </a:fld>
             <a:endParaRPr lang="en-CA"/>
           </a:p>
@@ -6740,7 +6740,7 @@
           <a:noFill/>
           <a:extLst>
             <a:ext uri="{909E8E84-426E-40dd-AFC4-6F175D3DCCD1}">
-              <a14:hiddenFill xmlns="" xmlns:a14="http://schemas.microsoft.com/office/drawing/2010/main">
+              <a14:hiddenFill xmlns:a14="http://schemas.microsoft.com/office/drawing/2010/main" xmlns="">
                 <a:solidFill>
                   <a:srgbClr val="FFFFFF"/>
                 </a:solidFill>
@@ -6806,7 +6806,7 @@
             </a:ln>
             <a:extLst>
               <a:ext uri="{91240B29-F687-4f45-9708-019B960494DF}">
-                <a14:hiddenLine xmlns="" xmlns:a14="http://schemas.microsoft.com/office/drawing/2010/main" w="9525">
+                <a14:hiddenLine xmlns:a14="http://schemas.microsoft.com/office/drawing/2010/main" xmlns="" w="9525">
                   <a:solidFill>
                     <a:srgbClr val="000000"/>
                   </a:solidFill>
@@ -6896,7 +6896,7 @@
             </a:ln>
             <a:extLst>
               <a:ext uri="{91240B29-F687-4f45-9708-019B960494DF}">
-                <a14:hiddenLine xmlns="" xmlns:a14="http://schemas.microsoft.com/office/drawing/2010/main" w="9525">
+                <a14:hiddenLine xmlns:a14="http://schemas.microsoft.com/office/drawing/2010/main" xmlns="" w="9525">
                   <a:solidFill>
                     <a:srgbClr val="000000"/>
                   </a:solidFill>
@@ -6986,7 +6986,7 @@
             </a:ln>
             <a:extLst>
               <a:ext uri="{91240B29-F687-4f45-9708-019B960494DF}">
-                <a14:hiddenLine xmlns="" xmlns:a14="http://schemas.microsoft.com/office/drawing/2010/main" w="9525">
+                <a14:hiddenLine xmlns:a14="http://schemas.microsoft.com/office/drawing/2010/main" xmlns="" w="9525">
                   <a:solidFill>
                     <a:srgbClr val="000000"/>
                   </a:solidFill>
@@ -7020,7 +7020,7 @@
             </a:ln>
             <a:extLst>
               <a:ext uri="{91240B29-F687-4f45-9708-019B960494DF}">
-                <a14:hiddenLine xmlns="" xmlns:a14="http://schemas.microsoft.com/office/drawing/2010/main" w="9525">
+                <a14:hiddenLine xmlns:a14="http://schemas.microsoft.com/office/drawing/2010/main" xmlns="" w="9525">
                   <a:solidFill>
                     <a:srgbClr val="000000"/>
                   </a:solidFill>
@@ -7110,7 +7110,7 @@
             </a:ln>
             <a:extLst>
               <a:ext uri="{91240B29-F687-4f45-9708-019B960494DF}">
-                <a14:hiddenLine xmlns="" xmlns:a14="http://schemas.microsoft.com/office/drawing/2010/main" w="9525">
+                <a14:hiddenLine xmlns:a14="http://schemas.microsoft.com/office/drawing/2010/main" xmlns="" w="9525">
                   <a:solidFill>
                     <a:srgbClr val="000000"/>
                   </a:solidFill>
@@ -7172,7 +7172,7 @@
             </a:ln>
             <a:extLst>
               <a:ext uri="{91240B29-F687-4f45-9708-019B960494DF}">
-                <a14:hiddenLine xmlns="" xmlns:a14="http://schemas.microsoft.com/office/drawing/2010/main" w="9525">
+                <a14:hiddenLine xmlns:a14="http://schemas.microsoft.com/office/drawing/2010/main" xmlns="" w="9525">
                   <a:solidFill>
                     <a:srgbClr val="000000"/>
                   </a:solidFill>
@@ -7234,7 +7234,7 @@
             </a:ln>
             <a:extLst>
               <a:ext uri="{91240B29-F687-4f45-9708-019B960494DF}">
-                <a14:hiddenLine xmlns="" xmlns:a14="http://schemas.microsoft.com/office/drawing/2010/main" w="9525">
+                <a14:hiddenLine xmlns:a14="http://schemas.microsoft.com/office/drawing/2010/main" xmlns="" w="9525">
                   <a:solidFill>
                     <a:srgbClr val="000000"/>
                   </a:solidFill>
@@ -7324,7 +7324,7 @@
             </a:ln>
             <a:extLst>
               <a:ext uri="{91240B29-F687-4f45-9708-019B960494DF}">
-                <a14:hiddenLine xmlns="" xmlns:a14="http://schemas.microsoft.com/office/drawing/2010/main" w="9525">
+                <a14:hiddenLine xmlns:a14="http://schemas.microsoft.com/office/drawing/2010/main" xmlns="" w="9525">
                   <a:solidFill>
                     <a:srgbClr val="000000"/>
                   </a:solidFill>
@@ -7386,7 +7386,7 @@
             </a:ln>
             <a:extLst>
               <a:ext uri="{91240B29-F687-4f45-9708-019B960494DF}">
-                <a14:hiddenLine xmlns="" xmlns:a14="http://schemas.microsoft.com/office/drawing/2010/main" w="9525">
+                <a14:hiddenLine xmlns:a14="http://schemas.microsoft.com/office/drawing/2010/main" xmlns="" w="9525">
                   <a:solidFill>
                     <a:srgbClr val="000000"/>
                   </a:solidFill>
@@ -7448,7 +7448,7 @@
             </a:ln>
             <a:extLst>
               <a:ext uri="{91240B29-F687-4f45-9708-019B960494DF}">
-                <a14:hiddenLine xmlns="" xmlns:a14="http://schemas.microsoft.com/office/drawing/2010/main" w="9525">
+                <a14:hiddenLine xmlns:a14="http://schemas.microsoft.com/office/drawing/2010/main" xmlns="" w="9525">
                   <a:solidFill>
                     <a:srgbClr val="000000"/>
                   </a:solidFill>
@@ -7538,7 +7538,7 @@
             </a:ln>
             <a:extLst>
               <a:ext uri="{91240B29-F687-4f45-9708-019B960494DF}">
-                <a14:hiddenLine xmlns="" xmlns:a14="http://schemas.microsoft.com/office/drawing/2010/main" w="9525">
+                <a14:hiddenLine xmlns:a14="http://schemas.microsoft.com/office/drawing/2010/main" xmlns="" w="9525">
                   <a:solidFill>
                     <a:srgbClr val="000000"/>
                   </a:solidFill>
@@ -7628,7 +7628,7 @@
             </a:ln>
             <a:extLst>
               <a:ext uri="{91240B29-F687-4f45-9708-019B960494DF}">
-                <a14:hiddenLine xmlns="" xmlns:a14="http://schemas.microsoft.com/office/drawing/2010/main" w="9525">
+                <a14:hiddenLine xmlns:a14="http://schemas.microsoft.com/office/drawing/2010/main" xmlns="" w="9525">
                   <a:solidFill>
                     <a:srgbClr val="000000"/>
                   </a:solidFill>
@@ -7690,7 +7690,7 @@
             </a:ln>
             <a:extLst>
               <a:ext uri="{91240B29-F687-4f45-9708-019B960494DF}">
-                <a14:hiddenLine xmlns="" xmlns:a14="http://schemas.microsoft.com/office/drawing/2010/main" w="9525">
+                <a14:hiddenLine xmlns:a14="http://schemas.microsoft.com/office/drawing/2010/main" xmlns="" w="9525">
                   <a:solidFill>
                     <a:srgbClr val="000000"/>
                   </a:solidFill>
@@ -7800,7 +7800,7 @@
             </a:ln>
             <a:extLst>
               <a:ext uri="{91240B29-F687-4f45-9708-019B960494DF}">
-                <a14:hiddenLine xmlns="" xmlns:a14="http://schemas.microsoft.com/office/drawing/2010/main" w="9525">
+                <a14:hiddenLine xmlns:a14="http://schemas.microsoft.com/office/drawing/2010/main" xmlns="" w="9525">
                   <a:solidFill>
                     <a:srgbClr val="000000"/>
                   </a:solidFill>
@@ -7862,7 +7862,7 @@
             </a:ln>
             <a:extLst>
               <a:ext uri="{91240B29-F687-4f45-9708-019B960494DF}">
-                <a14:hiddenLine xmlns="" xmlns:a14="http://schemas.microsoft.com/office/drawing/2010/main" w="9525">
+                <a14:hiddenLine xmlns:a14="http://schemas.microsoft.com/office/drawing/2010/main" xmlns="" w="9525">
                   <a:solidFill>
                     <a:srgbClr val="000000"/>
                   </a:solidFill>
@@ -7952,7 +7952,7 @@
             </a:ln>
             <a:extLst>
               <a:ext uri="{91240B29-F687-4f45-9708-019B960494DF}">
-                <a14:hiddenLine xmlns="" xmlns:a14="http://schemas.microsoft.com/office/drawing/2010/main" w="9525">
+                <a14:hiddenLine xmlns:a14="http://schemas.microsoft.com/office/drawing/2010/main" xmlns="" w="9525">
                   <a:solidFill>
                     <a:srgbClr val="000000"/>
                   </a:solidFill>
@@ -8042,7 +8042,7 @@
             </a:ln>
             <a:extLst>
               <a:ext uri="{91240B29-F687-4f45-9708-019B960494DF}">
-                <a14:hiddenLine xmlns="" xmlns:a14="http://schemas.microsoft.com/office/drawing/2010/main" w="9525">
+                <a14:hiddenLine xmlns:a14="http://schemas.microsoft.com/office/drawing/2010/main" xmlns="" w="9525">
                   <a:solidFill>
                     <a:srgbClr val="000000"/>
                   </a:solidFill>
@@ -8104,7 +8104,7 @@
             </a:ln>
             <a:extLst>
               <a:ext uri="{91240B29-F687-4f45-9708-019B960494DF}">
-                <a14:hiddenLine xmlns="" xmlns:a14="http://schemas.microsoft.com/office/drawing/2010/main" w="9525">
+                <a14:hiddenLine xmlns:a14="http://schemas.microsoft.com/office/drawing/2010/main" xmlns="" w="9525">
                   <a:solidFill>
                     <a:srgbClr val="000000"/>
                   </a:solidFill>
@@ -8194,7 +8194,7 @@
             </a:ln>
             <a:extLst>
               <a:ext uri="{91240B29-F687-4f45-9708-019B960494DF}">
-                <a14:hiddenLine xmlns="" xmlns:a14="http://schemas.microsoft.com/office/drawing/2010/main" w="9525">
+                <a14:hiddenLine xmlns:a14="http://schemas.microsoft.com/office/drawing/2010/main" xmlns="" w="9525">
                   <a:solidFill>
                     <a:srgbClr val="000000"/>
                   </a:solidFill>
@@ -8284,7 +8284,7 @@
             </a:ln>
             <a:extLst>
               <a:ext uri="{91240B29-F687-4f45-9708-019B960494DF}">
-                <a14:hiddenLine xmlns="" xmlns:a14="http://schemas.microsoft.com/office/drawing/2010/main" w="9525">
+                <a14:hiddenLine xmlns:a14="http://schemas.microsoft.com/office/drawing/2010/main" xmlns="" w="9525">
                   <a:solidFill>
                     <a:srgbClr val="000000"/>
                   </a:solidFill>
@@ -8340,7 +8340,7 @@
             </a:ln>
             <a:extLst>
               <a:ext uri="{91240B29-F687-4f45-9708-019B960494DF}">
-                <a14:hiddenLine xmlns="" xmlns:a14="http://schemas.microsoft.com/office/drawing/2010/main" w="9525">
+                <a14:hiddenLine xmlns:a14="http://schemas.microsoft.com/office/drawing/2010/main" xmlns="" w="9525">
                   <a:solidFill>
                     <a:srgbClr val="000000"/>
                   </a:solidFill>
@@ -8430,7 +8430,7 @@
             </a:ln>
             <a:extLst>
               <a:ext uri="{91240B29-F687-4f45-9708-019B960494DF}">
-                <a14:hiddenLine xmlns="" xmlns:a14="http://schemas.microsoft.com/office/drawing/2010/main" w="9525">
+                <a14:hiddenLine xmlns:a14="http://schemas.microsoft.com/office/drawing/2010/main" xmlns="" w="9525">
                   <a:solidFill>
                     <a:srgbClr val="000000"/>
                   </a:solidFill>
@@ -8486,7 +8486,7 @@
             </a:ln>
             <a:extLst>
               <a:ext uri="{91240B29-F687-4f45-9708-019B960494DF}">
-                <a14:hiddenLine xmlns="" xmlns:a14="http://schemas.microsoft.com/office/drawing/2010/main" w="9525">
+                <a14:hiddenLine xmlns:a14="http://schemas.microsoft.com/office/drawing/2010/main" xmlns="" w="9525">
                   <a:solidFill>
                     <a:srgbClr val="000000"/>
                   </a:solidFill>
@@ -8576,7 +8576,7 @@
             </a:ln>
             <a:extLst>
               <a:ext uri="{91240B29-F687-4f45-9708-019B960494DF}">
-                <a14:hiddenLine xmlns="" xmlns:a14="http://schemas.microsoft.com/office/drawing/2010/main" w="9525">
+                <a14:hiddenLine xmlns:a14="http://schemas.microsoft.com/office/drawing/2010/main" xmlns="" w="9525">
                   <a:solidFill>
                     <a:srgbClr val="000000"/>
                   </a:solidFill>
@@ -8644,7 +8644,7 @@
             </a:ln>
             <a:extLst>
               <a:ext uri="{91240B29-F687-4f45-9708-019B960494DF}">
-                <a14:hiddenLine xmlns="" xmlns:a14="http://schemas.microsoft.com/office/drawing/2010/main" w="9525">
+                <a14:hiddenLine xmlns:a14="http://schemas.microsoft.com/office/drawing/2010/main" xmlns="" w="9525">
                   <a:solidFill>
                     <a:srgbClr val="000000"/>
                   </a:solidFill>
@@ -8734,7 +8734,7 @@
             </a:ln>
             <a:extLst>
               <a:ext uri="{91240B29-F687-4f45-9708-019B960494DF}">
-                <a14:hiddenLine xmlns="" xmlns:a14="http://schemas.microsoft.com/office/drawing/2010/main" w="9525">
+                <a14:hiddenLine xmlns:a14="http://schemas.microsoft.com/office/drawing/2010/main" xmlns="" w="9525">
                   <a:solidFill>
                     <a:srgbClr val="000000"/>
                   </a:solidFill>
@@ -8802,7 +8802,7 @@
             </a:ln>
             <a:extLst>
               <a:ext uri="{91240B29-F687-4f45-9708-019B960494DF}">
-                <a14:hiddenLine xmlns="" xmlns:a14="http://schemas.microsoft.com/office/drawing/2010/main" w="9525">
+                <a14:hiddenLine xmlns:a14="http://schemas.microsoft.com/office/drawing/2010/main" xmlns="" w="9525">
                   <a:solidFill>
                     <a:srgbClr val="000000"/>
                   </a:solidFill>
@@ -8892,7 +8892,7 @@
             </a:ln>
             <a:extLst>
               <a:ext uri="{91240B29-F687-4f45-9708-019B960494DF}">
-                <a14:hiddenLine xmlns="" xmlns:a14="http://schemas.microsoft.com/office/drawing/2010/main" w="9525">
+                <a14:hiddenLine xmlns:a14="http://schemas.microsoft.com/office/drawing/2010/main" xmlns="" w="9525">
                   <a:solidFill>
                     <a:srgbClr val="000000"/>
                   </a:solidFill>
@@ -8926,7 +8926,7 @@
             </a:ln>
             <a:extLst>
               <a:ext uri="{91240B29-F687-4f45-9708-019B960494DF}">
-                <a14:hiddenLine xmlns="" xmlns:a14="http://schemas.microsoft.com/office/drawing/2010/main" w="9525">
+                <a14:hiddenLine xmlns:a14="http://schemas.microsoft.com/office/drawing/2010/main" xmlns="" w="9525">
                   <a:solidFill>
                     <a:srgbClr val="000000"/>
                   </a:solidFill>
@@ -9016,7 +9016,7 @@
             </a:ln>
             <a:extLst>
               <a:ext uri="{91240B29-F687-4f45-9708-019B960494DF}">
-                <a14:hiddenLine xmlns="" xmlns:a14="http://schemas.microsoft.com/office/drawing/2010/main" w="9525">
+                <a14:hiddenLine xmlns:a14="http://schemas.microsoft.com/office/drawing/2010/main" xmlns="" w="9525">
                   <a:solidFill>
                     <a:srgbClr val="000000"/>
                   </a:solidFill>
@@ -9078,7 +9078,7 @@
             </a:ln>
             <a:extLst>
               <a:ext uri="{91240B29-F687-4f45-9708-019B960494DF}">
-                <a14:hiddenLine xmlns="" xmlns:a14="http://schemas.microsoft.com/office/drawing/2010/main" w="9525">
+                <a14:hiddenLine xmlns:a14="http://schemas.microsoft.com/office/drawing/2010/main" xmlns="" w="9525">
                   <a:solidFill>
                     <a:srgbClr val="000000"/>
                   </a:solidFill>
@@ -9140,7 +9140,7 @@
             </a:ln>
             <a:extLst>
               <a:ext uri="{91240B29-F687-4f45-9708-019B960494DF}">
-                <a14:hiddenLine xmlns="" xmlns:a14="http://schemas.microsoft.com/office/drawing/2010/main" w="9525">
+                <a14:hiddenLine xmlns:a14="http://schemas.microsoft.com/office/drawing/2010/main" xmlns="" w="9525">
                   <a:solidFill>
                     <a:srgbClr val="000000"/>
                   </a:solidFill>
@@ -9230,7 +9230,7 @@
             </a:ln>
             <a:extLst>
               <a:ext uri="{91240B29-F687-4f45-9708-019B960494DF}">
-                <a14:hiddenLine xmlns="" xmlns:a14="http://schemas.microsoft.com/office/drawing/2010/main" w="9525">
+                <a14:hiddenLine xmlns:a14="http://schemas.microsoft.com/office/drawing/2010/main" xmlns="" w="9525">
                   <a:solidFill>
                     <a:srgbClr val="000000"/>
                   </a:solidFill>
@@ -9298,7 +9298,7 @@
             </a:ln>
             <a:extLst>
               <a:ext uri="{91240B29-F687-4f45-9708-019B960494DF}">
-                <a14:hiddenLine xmlns="" xmlns:a14="http://schemas.microsoft.com/office/drawing/2010/main" w="9525">
+                <a14:hiddenLine xmlns:a14="http://schemas.microsoft.com/office/drawing/2010/main" xmlns="" w="9525">
                   <a:solidFill>
                     <a:srgbClr val="000000"/>
                   </a:solidFill>
@@ -9360,7 +9360,7 @@
             </a:ln>
             <a:extLst>
               <a:ext uri="{91240B29-F687-4f45-9708-019B960494DF}">
-                <a14:hiddenLine xmlns="" xmlns:a14="http://schemas.microsoft.com/office/drawing/2010/main" w="9525">
+                <a14:hiddenLine xmlns:a14="http://schemas.microsoft.com/office/drawing/2010/main" xmlns="" w="9525">
                   <a:solidFill>
                     <a:srgbClr val="000000"/>
                   </a:solidFill>
@@ -9450,7 +9450,7 @@
             </a:ln>
             <a:extLst>
               <a:ext uri="{91240B29-F687-4f45-9708-019B960494DF}">
-                <a14:hiddenLine xmlns="" xmlns:a14="http://schemas.microsoft.com/office/drawing/2010/main" w="9525">
+                <a14:hiddenLine xmlns:a14="http://schemas.microsoft.com/office/drawing/2010/main" xmlns="" w="9525">
                   <a:solidFill>
                     <a:srgbClr val="000000"/>
                   </a:solidFill>
@@ -9512,7 +9512,7 @@
             </a:ln>
             <a:extLst>
               <a:ext uri="{91240B29-F687-4f45-9708-019B960494DF}">
-                <a14:hiddenLine xmlns="" xmlns:a14="http://schemas.microsoft.com/office/drawing/2010/main" w="9525">
+                <a14:hiddenLine xmlns:a14="http://schemas.microsoft.com/office/drawing/2010/main" xmlns="" w="9525">
                   <a:solidFill>
                     <a:srgbClr val="000000"/>
                   </a:solidFill>
@@ -9602,7 +9602,7 @@
             </a:ln>
             <a:extLst>
               <a:ext uri="{91240B29-F687-4f45-9708-019B960494DF}">
-                <a14:hiddenLine xmlns="" xmlns:a14="http://schemas.microsoft.com/office/drawing/2010/main" w="9525">
+                <a14:hiddenLine xmlns:a14="http://schemas.microsoft.com/office/drawing/2010/main" xmlns="" w="9525">
                   <a:solidFill>
                     <a:srgbClr val="000000"/>
                   </a:solidFill>
@@ -9664,7 +9664,7 @@
             </a:ln>
             <a:extLst>
               <a:ext uri="{91240B29-F687-4f45-9708-019B960494DF}">
-                <a14:hiddenLine xmlns="" xmlns:a14="http://schemas.microsoft.com/office/drawing/2010/main" w="9525">
+                <a14:hiddenLine xmlns:a14="http://schemas.microsoft.com/office/drawing/2010/main" xmlns="" w="9525">
                   <a:solidFill>
                     <a:srgbClr val="000000"/>
                   </a:solidFill>
@@ -9754,7 +9754,7 @@
             </a:ln>
             <a:extLst>
               <a:ext uri="{91240B29-F687-4f45-9708-019B960494DF}">
-                <a14:hiddenLine xmlns="" xmlns:a14="http://schemas.microsoft.com/office/drawing/2010/main" w="9525">
+                <a14:hiddenLine xmlns:a14="http://schemas.microsoft.com/office/drawing/2010/main" xmlns="" w="9525">
                   <a:solidFill>
                     <a:srgbClr val="000000"/>
                   </a:solidFill>
@@ -9788,7 +9788,7 @@
             </a:ln>
             <a:extLst>
               <a:ext uri="{91240B29-F687-4f45-9708-019B960494DF}">
-                <a14:hiddenLine xmlns="" xmlns:a14="http://schemas.microsoft.com/office/drawing/2010/main" w="9525">
+                <a14:hiddenLine xmlns:a14="http://schemas.microsoft.com/office/drawing/2010/main" xmlns="" w="9525">
                   <a:solidFill>
                     <a:srgbClr val="000000"/>
                   </a:solidFill>
@@ -9853,7 +9853,7 @@
             </a:ln>
             <a:extLst>
               <a:ext uri="{91240B29-F687-4f45-9708-019B960494DF}">
-                <a14:hiddenLine xmlns="" xmlns:a14="http://schemas.microsoft.com/office/drawing/2010/main" w="9525">
+                <a14:hiddenLine xmlns:a14="http://schemas.microsoft.com/office/drawing/2010/main" xmlns="" w="9525">
                   <a:solidFill>
                     <a:srgbClr val="000000"/>
                   </a:solidFill>
@@ -9943,7 +9943,7 @@
             </a:ln>
             <a:extLst>
               <a:ext uri="{91240B29-F687-4f45-9708-019B960494DF}">
-                <a14:hiddenLine xmlns="" xmlns:a14="http://schemas.microsoft.com/office/drawing/2010/main" w="9525">
+                <a14:hiddenLine xmlns:a14="http://schemas.microsoft.com/office/drawing/2010/main" xmlns="" w="9525">
                   <a:solidFill>
                     <a:srgbClr val="000000"/>
                   </a:solidFill>
@@ -10005,7 +10005,7 @@
             </a:ln>
             <a:extLst>
               <a:ext uri="{91240B29-F687-4f45-9708-019B960494DF}">
-                <a14:hiddenLine xmlns="" xmlns:a14="http://schemas.microsoft.com/office/drawing/2010/main" w="9525">
+                <a14:hiddenLine xmlns:a14="http://schemas.microsoft.com/office/drawing/2010/main" xmlns="" w="9525">
                   <a:solidFill>
                     <a:srgbClr val="000000"/>
                   </a:solidFill>
@@ -10095,7 +10095,7 @@
             </a:ln>
             <a:extLst>
               <a:ext uri="{91240B29-F687-4f45-9708-019B960494DF}">
-                <a14:hiddenLine xmlns="" xmlns:a14="http://schemas.microsoft.com/office/drawing/2010/main" w="9525">
+                <a14:hiddenLine xmlns:a14="http://schemas.microsoft.com/office/drawing/2010/main" xmlns="" w="9525">
                   <a:solidFill>
                     <a:srgbClr val="000000"/>
                   </a:solidFill>
@@ -10185,7 +10185,7 @@
             </a:ln>
             <a:extLst>
               <a:ext uri="{91240B29-F687-4f45-9708-019B960494DF}">
-                <a14:hiddenLine xmlns="" xmlns:a14="http://schemas.microsoft.com/office/drawing/2010/main" w="9525">
+                <a14:hiddenLine xmlns:a14="http://schemas.microsoft.com/office/drawing/2010/main" xmlns="" w="9525">
                   <a:solidFill>
                     <a:srgbClr val="000000"/>
                   </a:solidFill>
@@ -10250,7 +10250,7 @@
             </a:ln>
             <a:extLst>
               <a:ext uri="{91240B29-F687-4f45-9708-019B960494DF}">
-                <a14:hiddenLine xmlns="" xmlns:a14="http://schemas.microsoft.com/office/drawing/2010/main" w="9525">
+                <a14:hiddenLine xmlns:a14="http://schemas.microsoft.com/office/drawing/2010/main" xmlns="" w="9525">
                   <a:solidFill>
                     <a:srgbClr val="000000"/>
                   </a:solidFill>
@@ -10312,7 +10312,7 @@
             </a:ln>
             <a:extLst>
               <a:ext uri="{91240B29-F687-4f45-9708-019B960494DF}">
-                <a14:hiddenLine xmlns="" xmlns:a14="http://schemas.microsoft.com/office/drawing/2010/main" w="9525">
+                <a14:hiddenLine xmlns:a14="http://schemas.microsoft.com/office/drawing/2010/main" xmlns="" w="9525">
                   <a:solidFill>
                     <a:srgbClr val="000000"/>
                   </a:solidFill>
@@ -10402,7 +10402,7 @@
             </a:ln>
             <a:extLst>
               <a:ext uri="{91240B29-F687-4f45-9708-019B960494DF}">
-                <a14:hiddenLine xmlns="" xmlns:a14="http://schemas.microsoft.com/office/drawing/2010/main" w="9525">
+                <a14:hiddenLine xmlns:a14="http://schemas.microsoft.com/office/drawing/2010/main" xmlns="" w="9525">
                   <a:solidFill>
                     <a:srgbClr val="000000"/>
                   </a:solidFill>
@@ -10492,7 +10492,7 @@
             </a:ln>
             <a:extLst>
               <a:ext uri="{91240B29-F687-4f45-9708-019B960494DF}">
-                <a14:hiddenLine xmlns="" xmlns:a14="http://schemas.microsoft.com/office/drawing/2010/main" w="9525">
+                <a14:hiddenLine xmlns:a14="http://schemas.microsoft.com/office/drawing/2010/main" xmlns="" w="9525">
                   <a:solidFill>
                     <a:srgbClr val="000000"/>
                   </a:solidFill>
@@ -10554,7 +10554,7 @@
             </a:ln>
             <a:extLst>
               <a:ext uri="{91240B29-F687-4f45-9708-019B960494DF}">
-                <a14:hiddenLine xmlns="" xmlns:a14="http://schemas.microsoft.com/office/drawing/2010/main" w="9525">
+                <a14:hiddenLine xmlns:a14="http://schemas.microsoft.com/office/drawing/2010/main" xmlns="" w="9525">
                   <a:solidFill>
                     <a:srgbClr val="000000"/>
                   </a:solidFill>
@@ -10674,7 +10674,7 @@
             </a:ln>
             <a:extLst>
               <a:ext uri="{91240B29-F687-4f45-9708-019B960494DF}">
-                <a14:hiddenLine xmlns="" xmlns:a14="http://schemas.microsoft.com/office/drawing/2010/main" w="9525">
+                <a14:hiddenLine xmlns:a14="http://schemas.microsoft.com/office/drawing/2010/main" xmlns="" w="9525">
                   <a:solidFill>
                     <a:srgbClr val="000000"/>
                   </a:solidFill>
@@ -10742,7 +10742,7 @@
             </a:ln>
             <a:extLst>
               <a:ext uri="{91240B29-F687-4f45-9708-019B960494DF}">
-                <a14:hiddenLine xmlns="" xmlns:a14="http://schemas.microsoft.com/office/drawing/2010/main" w="9525">
+                <a14:hiddenLine xmlns:a14="http://schemas.microsoft.com/office/drawing/2010/main" xmlns="" w="9525">
                   <a:solidFill>
                     <a:srgbClr val="000000"/>
                   </a:solidFill>
@@ -10832,7 +10832,7 @@
             </a:ln>
             <a:extLst>
               <a:ext uri="{91240B29-F687-4f45-9708-019B960494DF}">
-                <a14:hiddenLine xmlns="" xmlns:a14="http://schemas.microsoft.com/office/drawing/2010/main" w="9525">
+                <a14:hiddenLine xmlns:a14="http://schemas.microsoft.com/office/drawing/2010/main" xmlns="" w="9525">
                   <a:solidFill>
                     <a:srgbClr val="000000"/>
                   </a:solidFill>
@@ -16951,7 +16951,7 @@
           <a:noFill/>
           <a:extLst>
             <a:ext uri="{909E8E84-426E-40dd-AFC4-6F175D3DCCD1}">
-              <a14:hiddenFill xmlns="" xmlns:a14="http://schemas.microsoft.com/office/drawing/2010/main">
+              <a14:hiddenFill xmlns:a14="http://schemas.microsoft.com/office/drawing/2010/main" xmlns="">
                 <a:solidFill>
                   <a:srgbClr val="FFFFFF"/>
                 </a:solidFill>
@@ -17031,7 +17031,7 @@
               </a:ln>
               <a:extLst>
                 <a:ext uri="{91240B29-F687-4f45-9708-019B960494DF}">
-                  <a14:hiddenLine xmlns="" xmlns:a14="http://schemas.microsoft.com/office/drawing/2010/main" w="9525">
+                  <a14:hiddenLine xmlns:a14="http://schemas.microsoft.com/office/drawing/2010/main" xmlns="" w="9525">
                     <a:solidFill>
                       <a:srgbClr val="000000"/>
                     </a:solidFill>
@@ -17121,7 +17121,7 @@
               </a:ln>
               <a:extLst>
                 <a:ext uri="{91240B29-F687-4f45-9708-019B960494DF}">
-                  <a14:hiddenLine xmlns="" xmlns:a14="http://schemas.microsoft.com/office/drawing/2010/main" w="9525">
+                  <a14:hiddenLine xmlns:a14="http://schemas.microsoft.com/office/drawing/2010/main" xmlns="" w="9525">
                     <a:solidFill>
                       <a:srgbClr val="000000"/>
                     </a:solidFill>
@@ -17211,7 +17211,7 @@
               </a:ln>
               <a:extLst>
                 <a:ext uri="{91240B29-F687-4f45-9708-019B960494DF}">
-                  <a14:hiddenLine xmlns="" xmlns:a14="http://schemas.microsoft.com/office/drawing/2010/main" w="9525">
+                  <a14:hiddenLine xmlns:a14="http://schemas.microsoft.com/office/drawing/2010/main" xmlns="" w="9525">
                     <a:solidFill>
                       <a:srgbClr val="000000"/>
                     </a:solidFill>
@@ -17273,7 +17273,7 @@
               </a:ln>
               <a:extLst>
                 <a:ext uri="{91240B29-F687-4f45-9708-019B960494DF}">
-                  <a14:hiddenLine xmlns="" xmlns:a14="http://schemas.microsoft.com/office/drawing/2010/main" w="9525">
+                  <a14:hiddenLine xmlns:a14="http://schemas.microsoft.com/office/drawing/2010/main" xmlns="" w="9525">
                     <a:solidFill>
                       <a:srgbClr val="000000"/>
                     </a:solidFill>
@@ -17363,7 +17363,7 @@
               </a:ln>
               <a:extLst>
                 <a:ext uri="{91240B29-F687-4f45-9708-019B960494DF}">
-                  <a14:hiddenLine xmlns="" xmlns:a14="http://schemas.microsoft.com/office/drawing/2010/main" w="9525">
+                  <a14:hiddenLine xmlns:a14="http://schemas.microsoft.com/office/drawing/2010/main" xmlns="" w="9525">
                     <a:solidFill>
                       <a:srgbClr val="000000"/>
                     </a:solidFill>
@@ -17425,7 +17425,7 @@
               </a:ln>
               <a:extLst>
                 <a:ext uri="{91240B29-F687-4f45-9708-019B960494DF}">
-                  <a14:hiddenLine xmlns="" xmlns:a14="http://schemas.microsoft.com/office/drawing/2010/main" w="9525">
+                  <a14:hiddenLine xmlns:a14="http://schemas.microsoft.com/office/drawing/2010/main" xmlns="" w="9525">
                     <a:solidFill>
                       <a:srgbClr val="000000"/>
                     </a:solidFill>
@@ -17487,7 +17487,7 @@
               </a:ln>
               <a:extLst>
                 <a:ext uri="{91240B29-F687-4f45-9708-019B960494DF}">
-                  <a14:hiddenLine xmlns="" xmlns:a14="http://schemas.microsoft.com/office/drawing/2010/main" w="9525">
+                  <a14:hiddenLine xmlns:a14="http://schemas.microsoft.com/office/drawing/2010/main" xmlns="" w="9525">
                     <a:solidFill>
                       <a:srgbClr val="000000"/>
                     </a:solidFill>
@@ -17577,7 +17577,7 @@
               </a:ln>
               <a:extLst>
                 <a:ext uri="{91240B29-F687-4f45-9708-019B960494DF}">
-                  <a14:hiddenLine xmlns="" xmlns:a14="http://schemas.microsoft.com/office/drawing/2010/main" w="9525">
+                  <a14:hiddenLine xmlns:a14="http://schemas.microsoft.com/office/drawing/2010/main" xmlns="" w="9525">
                     <a:solidFill>
                       <a:srgbClr val="000000"/>
                     </a:solidFill>
@@ -17667,7 +17667,7 @@
               </a:ln>
               <a:extLst>
                 <a:ext uri="{91240B29-F687-4f45-9708-019B960494DF}">
-                  <a14:hiddenLine xmlns="" xmlns:a14="http://schemas.microsoft.com/office/drawing/2010/main" w="9525">
+                  <a14:hiddenLine xmlns:a14="http://schemas.microsoft.com/office/drawing/2010/main" xmlns="" w="9525">
                     <a:solidFill>
                       <a:srgbClr val="000000"/>
                     </a:solidFill>
@@ -17729,7 +17729,7 @@
               </a:ln>
               <a:extLst>
                 <a:ext uri="{91240B29-F687-4f45-9708-019B960494DF}">
-                  <a14:hiddenLine xmlns="" xmlns:a14="http://schemas.microsoft.com/office/drawing/2010/main" w="9525">
+                  <a14:hiddenLine xmlns:a14="http://schemas.microsoft.com/office/drawing/2010/main" xmlns="" w="9525">
                     <a:solidFill>
                       <a:srgbClr val="000000"/>
                     </a:solidFill>
@@ -17839,7 +17839,7 @@
               </a:ln>
               <a:extLst>
                 <a:ext uri="{91240B29-F687-4f45-9708-019B960494DF}">
-                  <a14:hiddenLine xmlns="" xmlns:a14="http://schemas.microsoft.com/office/drawing/2010/main" w="9525">
+                  <a14:hiddenLine xmlns:a14="http://schemas.microsoft.com/office/drawing/2010/main" xmlns="" w="9525">
                     <a:solidFill>
                       <a:srgbClr val="000000"/>
                     </a:solidFill>
@@ -17923,7 +17923,7 @@
               </a:ln>
               <a:extLst>
                 <a:ext uri="{91240B29-F687-4f45-9708-019B960494DF}">
-                  <a14:hiddenLine xmlns="" xmlns:a14="http://schemas.microsoft.com/office/drawing/2010/main" w="9525">
+                  <a14:hiddenLine xmlns:a14="http://schemas.microsoft.com/office/drawing/2010/main" xmlns="" w="9525">
                     <a:solidFill>
                       <a:srgbClr val="000000"/>
                     </a:solidFill>
@@ -17985,7 +17985,7 @@
               </a:ln>
               <a:extLst>
                 <a:ext uri="{91240B29-F687-4f45-9708-019B960494DF}">
-                  <a14:hiddenLine xmlns="" xmlns:a14="http://schemas.microsoft.com/office/drawing/2010/main" w="9525">
+                  <a14:hiddenLine xmlns:a14="http://schemas.microsoft.com/office/drawing/2010/main" xmlns="" w="9525">
                     <a:solidFill>
                       <a:srgbClr val="000000"/>
                     </a:solidFill>
@@ -18047,7 +18047,7 @@
               </a:ln>
               <a:extLst>
                 <a:ext uri="{91240B29-F687-4f45-9708-019B960494DF}">
-                  <a14:hiddenLine xmlns="" xmlns:a14="http://schemas.microsoft.com/office/drawing/2010/main" w="9525">
+                  <a14:hiddenLine xmlns:a14="http://schemas.microsoft.com/office/drawing/2010/main" xmlns="" w="9525">
                     <a:solidFill>
                       <a:srgbClr val="000000"/>
                     </a:solidFill>
@@ -18137,7 +18137,7 @@
               </a:ln>
               <a:extLst>
                 <a:ext uri="{91240B29-F687-4f45-9708-019B960494DF}">
-                  <a14:hiddenLine xmlns="" xmlns:a14="http://schemas.microsoft.com/office/drawing/2010/main" w="9525">
+                  <a14:hiddenLine xmlns:a14="http://schemas.microsoft.com/office/drawing/2010/main" xmlns="" w="9525">
                     <a:solidFill>
                       <a:srgbClr val="000000"/>
                     </a:solidFill>
@@ -18171,7 +18171,7 @@
               </a:ln>
               <a:extLst>
                 <a:ext uri="{91240B29-F687-4f45-9708-019B960494DF}">
-                  <a14:hiddenLine xmlns="" xmlns:a14="http://schemas.microsoft.com/office/drawing/2010/main" w="9525">
+                  <a14:hiddenLine xmlns:a14="http://schemas.microsoft.com/office/drawing/2010/main" xmlns="" w="9525">
                     <a:solidFill>
                       <a:srgbClr val="000000"/>
                     </a:solidFill>
@@ -18236,7 +18236,7 @@
               </a:ln>
               <a:extLst>
                 <a:ext uri="{91240B29-F687-4f45-9708-019B960494DF}">
-                  <a14:hiddenLine xmlns="" xmlns:a14="http://schemas.microsoft.com/office/drawing/2010/main" w="9525">
+                  <a14:hiddenLine xmlns:a14="http://schemas.microsoft.com/office/drawing/2010/main" xmlns="" w="9525">
                     <a:solidFill>
                       <a:srgbClr val="000000"/>
                     </a:solidFill>
@@ -18326,7 +18326,7 @@
               </a:ln>
               <a:extLst>
                 <a:ext uri="{91240B29-F687-4f45-9708-019B960494DF}">
-                  <a14:hiddenLine xmlns="" xmlns:a14="http://schemas.microsoft.com/office/drawing/2010/main" w="9525">
+                  <a14:hiddenLine xmlns:a14="http://schemas.microsoft.com/office/drawing/2010/main" xmlns="" w="9525">
                     <a:solidFill>
                       <a:srgbClr val="000000"/>
                     </a:solidFill>
@@ -18388,7 +18388,7 @@
               </a:ln>
               <a:extLst>
                 <a:ext uri="{91240B29-F687-4f45-9708-019B960494DF}">
-                  <a14:hiddenLine xmlns="" xmlns:a14="http://schemas.microsoft.com/office/drawing/2010/main" w="9525">
+                  <a14:hiddenLine xmlns:a14="http://schemas.microsoft.com/office/drawing/2010/main" xmlns="" w="9525">
                     <a:solidFill>
                       <a:srgbClr val="000000"/>
                     </a:solidFill>
@@ -18478,7 +18478,7 @@
               </a:ln>
               <a:extLst>
                 <a:ext uri="{91240B29-F687-4f45-9708-019B960494DF}">
-                  <a14:hiddenLine xmlns="" xmlns:a14="http://schemas.microsoft.com/office/drawing/2010/main" w="9525">
+                  <a14:hiddenLine xmlns:a14="http://schemas.microsoft.com/office/drawing/2010/main" xmlns="" w="9525">
                     <a:solidFill>
                       <a:srgbClr val="000000"/>
                     </a:solidFill>
@@ -18543,7 +18543,7 @@
               </a:ln>
               <a:extLst>
                 <a:ext uri="{91240B29-F687-4f45-9708-019B960494DF}">
-                  <a14:hiddenLine xmlns="" xmlns:a14="http://schemas.microsoft.com/office/drawing/2010/main" w="9525">
+                  <a14:hiddenLine xmlns:a14="http://schemas.microsoft.com/office/drawing/2010/main" xmlns="" w="9525">
                     <a:solidFill>
                       <a:srgbClr val="000000"/>
                     </a:solidFill>
@@ -18605,7 +18605,7 @@
               </a:ln>
               <a:extLst>
                 <a:ext uri="{91240B29-F687-4f45-9708-019B960494DF}">
-                  <a14:hiddenLine xmlns="" xmlns:a14="http://schemas.microsoft.com/office/drawing/2010/main" w="9525">
+                  <a14:hiddenLine xmlns:a14="http://schemas.microsoft.com/office/drawing/2010/main" xmlns="" w="9525">
                     <a:solidFill>
                       <a:srgbClr val="000000"/>
                     </a:solidFill>
@@ -18695,7 +18695,7 @@
               </a:ln>
               <a:extLst>
                 <a:ext uri="{91240B29-F687-4f45-9708-019B960494DF}">
-                  <a14:hiddenLine xmlns="" xmlns:a14="http://schemas.microsoft.com/office/drawing/2010/main" w="9525">
+                  <a14:hiddenLine xmlns:a14="http://schemas.microsoft.com/office/drawing/2010/main" xmlns="" w="9525">
                     <a:solidFill>
                       <a:srgbClr val="000000"/>
                     </a:solidFill>
@@ -18785,7 +18785,7 @@
               </a:ln>
               <a:extLst>
                 <a:ext uri="{91240B29-F687-4f45-9708-019B960494DF}">
-                  <a14:hiddenLine xmlns="" xmlns:a14="http://schemas.microsoft.com/office/drawing/2010/main" w="9525">
+                  <a14:hiddenLine xmlns:a14="http://schemas.microsoft.com/office/drawing/2010/main" xmlns="" w="9525">
                     <a:solidFill>
                       <a:srgbClr val="000000"/>
                     </a:solidFill>
@@ -18850,7 +18850,7 @@
               </a:ln>
               <a:extLst>
                 <a:ext uri="{91240B29-F687-4f45-9708-019B960494DF}">
-                  <a14:hiddenLine xmlns="" xmlns:a14="http://schemas.microsoft.com/office/drawing/2010/main" w="9525">
+                  <a14:hiddenLine xmlns:a14="http://schemas.microsoft.com/office/drawing/2010/main" xmlns="" w="9525">
                     <a:solidFill>
                       <a:srgbClr val="000000"/>
                     </a:solidFill>
@@ -18970,7 +18970,7 @@
               </a:ln>
               <a:extLst>
                 <a:ext uri="{91240B29-F687-4f45-9708-019B960494DF}">
-                  <a14:hiddenLine xmlns="" xmlns:a14="http://schemas.microsoft.com/office/drawing/2010/main" w="9525">
+                  <a14:hiddenLine xmlns:a14="http://schemas.microsoft.com/office/drawing/2010/main" xmlns="" w="9525">
                     <a:solidFill>
                       <a:srgbClr val="000000"/>
                     </a:solidFill>
@@ -19068,7 +19068,7 @@
               </a:ln>
               <a:extLst>
                 <a:ext uri="{91240B29-F687-4f45-9708-019B960494DF}">
-                  <a14:hiddenLine xmlns="" xmlns:a14="http://schemas.microsoft.com/office/drawing/2010/main" w="9525">
+                  <a14:hiddenLine xmlns:a14="http://schemas.microsoft.com/office/drawing/2010/main" xmlns="" w="9525">
                     <a:solidFill>
                       <a:srgbClr val="000000"/>
                     </a:solidFill>
@@ -19183,7 +19183,7 @@
               </a:ln>
               <a:extLst>
                 <a:ext uri="{91240B29-F687-4f45-9708-019B960494DF}">
-                  <a14:hiddenLine xmlns="" xmlns:a14="http://schemas.microsoft.com/office/drawing/2010/main" w="9525">
+                  <a14:hiddenLine xmlns:a14="http://schemas.microsoft.com/office/drawing/2010/main" xmlns="" w="9525">
                     <a:solidFill>
                       <a:srgbClr val="000000"/>
                     </a:solidFill>
@@ -19273,7 +19273,7 @@
               </a:ln>
               <a:extLst>
                 <a:ext uri="{91240B29-F687-4f45-9708-019B960494DF}">
-                  <a14:hiddenLine xmlns="" xmlns:a14="http://schemas.microsoft.com/office/drawing/2010/main" w="9525">
+                  <a14:hiddenLine xmlns:a14="http://schemas.microsoft.com/office/drawing/2010/main" xmlns="" w="9525">
                     <a:solidFill>
                       <a:srgbClr val="000000"/>
                     </a:solidFill>
@@ -19338,7 +19338,7 @@
               </a:ln>
               <a:extLst>
                 <a:ext uri="{91240B29-F687-4f45-9708-019B960494DF}">
-                  <a14:hiddenLine xmlns="" xmlns:a14="http://schemas.microsoft.com/office/drawing/2010/main" w="9525">
+                  <a14:hiddenLine xmlns:a14="http://schemas.microsoft.com/office/drawing/2010/main" xmlns="" w="9525">
                     <a:solidFill>
                       <a:srgbClr val="000000"/>
                     </a:solidFill>
@@ -19428,7 +19428,7 @@
               </a:ln>
               <a:extLst>
                 <a:ext uri="{91240B29-F687-4f45-9708-019B960494DF}">
-                  <a14:hiddenLine xmlns="" xmlns:a14="http://schemas.microsoft.com/office/drawing/2010/main" w="9525">
+                  <a14:hiddenLine xmlns:a14="http://schemas.microsoft.com/office/drawing/2010/main" xmlns="" w="9525">
                     <a:solidFill>
                       <a:srgbClr val="000000"/>
                     </a:solidFill>
@@ -19496,7 +19496,7 @@
               </a:ln>
               <a:extLst>
                 <a:ext uri="{91240B29-F687-4f45-9708-019B960494DF}">
-                  <a14:hiddenLine xmlns="" xmlns:a14="http://schemas.microsoft.com/office/drawing/2010/main" w="9525">
+                  <a14:hiddenLine xmlns:a14="http://schemas.microsoft.com/office/drawing/2010/main" xmlns="" w="9525">
                     <a:solidFill>
                       <a:srgbClr val="000000"/>
                     </a:solidFill>
@@ -19586,7 +19586,7 @@
               </a:ln>
               <a:extLst>
                 <a:ext uri="{91240B29-F687-4f45-9708-019B960494DF}">
-                  <a14:hiddenLine xmlns="" xmlns:a14="http://schemas.microsoft.com/office/drawing/2010/main" w="9525">
+                  <a14:hiddenLine xmlns:a14="http://schemas.microsoft.com/office/drawing/2010/main" xmlns="" w="9525">
                     <a:solidFill>
                       <a:srgbClr val="000000"/>
                     </a:solidFill>
@@ -19654,7 +19654,7 @@
               </a:ln>
               <a:extLst>
                 <a:ext uri="{91240B29-F687-4f45-9708-019B960494DF}">
-                  <a14:hiddenLine xmlns="" xmlns:a14="http://schemas.microsoft.com/office/drawing/2010/main" w="9525">
+                  <a14:hiddenLine xmlns:a14="http://schemas.microsoft.com/office/drawing/2010/main" xmlns="" w="9525">
                     <a:solidFill>
                       <a:srgbClr val="000000"/>
                     </a:solidFill>
@@ -19744,7 +19744,7 @@
               </a:ln>
               <a:extLst>
                 <a:ext uri="{91240B29-F687-4f45-9708-019B960494DF}">
-                  <a14:hiddenLine xmlns="" xmlns:a14="http://schemas.microsoft.com/office/drawing/2010/main" w="9525">
+                  <a14:hiddenLine xmlns:a14="http://schemas.microsoft.com/office/drawing/2010/main" xmlns="" w="9525">
                     <a:solidFill>
                       <a:srgbClr val="000000"/>
                     </a:solidFill>
@@ -19778,7 +19778,7 @@
               </a:ln>
               <a:extLst>
                 <a:ext uri="{91240B29-F687-4f45-9708-019B960494DF}">
-                  <a14:hiddenLine xmlns="" xmlns:a14="http://schemas.microsoft.com/office/drawing/2010/main" w="9525">
+                  <a14:hiddenLine xmlns:a14="http://schemas.microsoft.com/office/drawing/2010/main" xmlns="" w="9525">
                     <a:solidFill>
                       <a:srgbClr val="000000"/>
                     </a:solidFill>
@@ -30637,7 +30637,7 @@
             <a:pPr lvl="0"/>
             <a:r>
               <a:rPr lang="en-CA" dirty="0"/>
-              <a:t>CMake implementation: </a:t>
+              <a:t>CMake example: </a:t>
             </a:r>
             <a:r>
               <a:rPr lang="en-CA" dirty="0">
@@ -30650,8 +30650,12 @@
           <a:p>
             <a:pPr lvl="0"/>
             <a:r>
+              <a:rPr lang="en-CA" dirty="0" err="1"/>
+              <a:t>Makefile</a:t>
+            </a:r>
+            <a:r>
               <a:rPr lang="en-CA" dirty="0"/>
-              <a:t>Makefile implementation: </a:t>
+              <a:t> example: </a:t>
             </a:r>
             <a:r>
               <a:rPr lang="en-CA" dirty="0">

</xml_diff>